<commit_message>
add logo to template
</commit_message>
<xml_diff>
--- a/project/poster_ada.pptx
+++ b/project/poster_ada.pptx
@@ -2993,7 +2993,7 @@
         </p:blipFill>
         <p:spPr>
           <a:xfrm>
-            <a:off x="1226368" y="805627"/>
+            <a:off x="1226366" y="834761"/>
             <a:ext cx="5469400" cy="2277458"/>
           </a:xfrm>
           <a:prstGeom prst="rect">
@@ -3343,8 +3343,8 @@
         </p:nvSpPr>
         <p:spPr>
           <a:xfrm>
-            <a:off x="11871894" y="15749199"/>
-            <a:ext cx="6738269" cy="9111480"/>
+            <a:off x="11871893" y="15585165"/>
+            <a:ext cx="6738269" cy="9275514"/>
           </a:xfrm>
           <a:prstGeom prst="roundRect">
             <a:avLst/>
@@ -3491,7 +3491,7 @@
         </p:nvSpPr>
         <p:spPr>
           <a:xfrm>
-            <a:off x="11871894" y="31823258"/>
+            <a:off x="11871892" y="31754989"/>
             <a:ext cx="6738269" cy="890882"/>
           </a:xfrm>
           <a:prstGeom prst="rect">
@@ -3547,8 +3547,8 @@
         </p:nvSpPr>
         <p:spPr>
           <a:xfrm>
-            <a:off x="10471356" y="9212802"/>
-            <a:ext cx="18789444" cy="5983814"/>
+            <a:off x="10471355" y="9086401"/>
+            <a:ext cx="18789444" cy="6236615"/>
           </a:xfrm>
           <a:prstGeom prst="roundRect">
             <a:avLst/>
@@ -3639,8 +3639,8 @@
         </p:nvSpPr>
         <p:spPr>
           <a:xfrm>
-            <a:off x="1226366" y="25286861"/>
-            <a:ext cx="18789444" cy="6041946"/>
+            <a:off x="1226366" y="25092192"/>
+            <a:ext cx="18789444" cy="6236615"/>
           </a:xfrm>
           <a:prstGeom prst="roundRect">
             <a:avLst/>
@@ -3685,8 +3685,8 @@
         </p:nvSpPr>
         <p:spPr>
           <a:xfrm>
-            <a:off x="20315882" y="15622798"/>
-            <a:ext cx="8944917" cy="15789198"/>
+            <a:off x="20315882" y="15749198"/>
+            <a:ext cx="8944917" cy="15662797"/>
           </a:xfrm>
           <a:prstGeom prst="roundRect">
             <a:avLst/>
@@ -3731,7 +3731,7 @@
         </p:nvSpPr>
         <p:spPr>
           <a:xfrm>
-            <a:off x="17412678" y="9086401"/>
+            <a:off x="17412677" y="9139690"/>
             <a:ext cx="4906800" cy="895990"/>
           </a:xfrm>
           <a:prstGeom prst="rect">
@@ -3787,7 +3787,7 @@
         </p:nvSpPr>
         <p:spPr>
           <a:xfrm>
-            <a:off x="22329835" y="22465041"/>
+            <a:off x="22334940" y="15749199"/>
             <a:ext cx="4906800" cy="895990"/>
           </a:xfrm>
           <a:prstGeom prst="rect">
@@ -3843,7 +3843,7 @@
         </p:nvSpPr>
         <p:spPr>
           <a:xfrm>
-            <a:off x="8167688" y="25286861"/>
+            <a:off x="8167688" y="25136716"/>
             <a:ext cx="4906800" cy="895990"/>
           </a:xfrm>
           <a:prstGeom prst="rect">
@@ -3891,6 +3891,34 @@
           </a:p>
         </p:txBody>
       </p:sp>
+      <p:pic>
+        <p:nvPicPr>
+          <p:cNvPr id="129" name="Shape 71"/>
+          <p:cNvPicPr preferRelativeResize="0"/>
+          <p:nvPr/>
+        </p:nvPicPr>
+        <p:blipFill>
+          <a:blip r:embed="rId3">
+            <a:alphaModFix/>
+          </a:blip>
+          <a:stretch>
+            <a:fillRect/>
+          </a:stretch>
+        </p:blipFill>
+        <p:spPr>
+          <a:xfrm>
+            <a:off x="27241740" y="961511"/>
+            <a:ext cx="2019059" cy="2150708"/>
+          </a:xfrm>
+          <a:prstGeom prst="rect">
+            <a:avLst/>
+          </a:prstGeom>
+          <a:noFill/>
+          <a:ln>
+            <a:noFill/>
+          </a:ln>
+        </p:spPr>
+      </p:pic>
     </p:spTree>
     <p:extLst>
       <p:ext uri="{BB962C8B-B14F-4D97-AF65-F5344CB8AC3E}">

</xml_diff>

<commit_message>
Genre and time done for poster
</commit_message>
<xml_diff>
--- a/project/poster_ada.pptx
+++ b/project/poster_ada.pptx
@@ -3040,23 +3040,14 @@
           <a:lstStyle/>
           <a:p>
             <a:r>
-              <a:rPr lang="en-US" sz="3970" b="1" dirty="0" smtClean="0">
-                <a:latin typeface="Avenir LT Std 35 Light" panose="020B0402020203020204" pitchFamily="34" charset="0"/>
-              </a:rPr>
-              <a:t>Applied </a:t>
-            </a:r>
-            <a:r>
               <a:rPr lang="en-US" sz="3970" b="1" smtClean="0">
                 <a:latin typeface="Avenir LT Std 35 Light" panose="020B0402020203020204" pitchFamily="34" charset="0"/>
               </a:rPr>
-              <a:t>Data Analysis Project </a:t>
-            </a:r>
-            <a:r>
-              <a:rPr lang="en-US" sz="3970" b="1" dirty="0">
-                <a:latin typeface="Avenir LT Std 35 Light" panose="020B0402020203020204" pitchFamily="34" charset="0"/>
-              </a:rPr>
-              <a:t>2017</a:t>
-            </a:r>
+              <a:t>Applied Data Analysis Project 2017</a:t>
+            </a:r>
+            <a:endParaRPr lang="en-US" sz="3970" b="1" dirty="0">
+              <a:latin typeface="Avenir LT Std 35 Light" panose="020B0402020203020204" pitchFamily="34" charset="0"/>
+            </a:endParaRPr>
           </a:p>
         </p:txBody>
       </p:sp>
@@ -3539,6 +3530,68 @@
           </a:p>
         </p:txBody>
       </p:sp>
+      <p:pic>
+        <p:nvPicPr>
+          <p:cNvPr id="44" name="Image 43"/>
+          <p:cNvPicPr>
+            <a:picLocks noChangeAspect="1"/>
+          </p:cNvPicPr>
+          <p:nvPr/>
+        </p:nvPicPr>
+        <p:blipFill>
+          <a:blip r:embed="rId3">
+            <a:extLst>
+              <a:ext uri="{28A0092B-C50C-407E-A947-70E740481C1C}">
+                <a14:useLocalDpi xmlns:a14="http://schemas.microsoft.com/office/drawing/2010/main" val="0"/>
+              </a:ext>
+            </a:extLst>
+          </a:blip>
+          <a:stretch>
+            <a:fillRect/>
+          </a:stretch>
+        </p:blipFill>
+        <p:spPr>
+          <a:xfrm>
+            <a:off x="20970329" y="16421148"/>
+            <a:ext cx="7624800" cy="4244368"/>
+          </a:xfrm>
+          <a:prstGeom prst="rect">
+            <a:avLst/>
+          </a:prstGeom>
+        </p:spPr>
+      </p:pic>
+      <p:pic>
+        <p:nvPicPr>
+          <p:cNvPr id="38" name="Image 37"/>
+          <p:cNvPicPr>
+            <a:picLocks noChangeAspect="1"/>
+          </p:cNvPicPr>
+          <p:nvPr/>
+        </p:nvPicPr>
+        <p:blipFill rotWithShape="1">
+          <a:blip r:embed="rId4">
+            <a:extLst>
+              <a:ext uri="{28A0092B-C50C-407E-A947-70E740481C1C}">
+                <a14:useLocalDpi xmlns:a14="http://schemas.microsoft.com/office/drawing/2010/main" val="0"/>
+              </a:ext>
+            </a:extLst>
+          </a:blip>
+          <a:srcRect l="16113" r="15034"/>
+          <a:stretch/>
+        </p:blipFill>
+        <p:spPr>
+          <a:xfrm>
+            <a:off x="2213189" y="26080939"/>
+            <a:ext cx="7561944" cy="4654800"/>
+          </a:xfrm>
+          <a:prstGeom prst="rect">
+            <a:avLst/>
+          </a:prstGeom>
+          <a:ln>
+            <a:noFill/>
+          </a:ln>
+        </p:spPr>
+      </p:pic>
       <p:sp>
         <p:nvSpPr>
           <p:cNvPr id="116" name="Rectangle: Rounded Corners 124"/>
@@ -3685,7 +3738,7 @@
         </p:nvSpPr>
         <p:spPr>
           <a:xfrm>
-            <a:off x="20315882" y="15749198"/>
+            <a:off x="20310772" y="15621026"/>
             <a:ext cx="8944917" cy="15662797"/>
           </a:xfrm>
           <a:prstGeom prst="roundRect">
@@ -3731,7 +3784,7 @@
         </p:nvSpPr>
         <p:spPr>
           <a:xfrm>
-            <a:off x="17412677" y="9139690"/>
+            <a:off x="17412677" y="9090640"/>
             <a:ext cx="4906800" cy="895990"/>
           </a:xfrm>
           <a:prstGeom prst="rect">
@@ -3787,7 +3840,7 @@
         </p:nvSpPr>
         <p:spPr>
           <a:xfrm>
-            <a:off x="22334940" y="15749199"/>
+            <a:off x="22334940" y="15647624"/>
             <a:ext cx="4906800" cy="895990"/>
           </a:xfrm>
           <a:prstGeom prst="rect">
@@ -3843,7 +3896,7 @@
         </p:nvSpPr>
         <p:spPr>
           <a:xfrm>
-            <a:off x="8167688" y="25136716"/>
+            <a:off x="8167688" y="25092192"/>
             <a:ext cx="4906800" cy="895990"/>
           </a:xfrm>
           <a:prstGeom prst="rect">
@@ -3898,7 +3951,7 @@
           <p:nvPr/>
         </p:nvPicPr>
         <p:blipFill>
-          <a:blip r:embed="rId3">
+          <a:blip r:embed="rId5">
             <a:alphaModFix/>
           </a:blip>
           <a:stretch>
@@ -3919,6 +3972,672 @@
           </a:ln>
         </p:spPr>
       </p:pic>
+      <p:sp>
+        <p:nvSpPr>
+          <p:cNvPr id="130" name="ZoneTexte 129"/>
+          <p:cNvSpPr txBox="1"/>
+          <p:nvPr/>
+        </p:nvSpPr>
+        <p:spPr>
+          <a:xfrm>
+            <a:off x="4397515" y="25557719"/>
+            <a:ext cx="2765753" cy="461665"/>
+          </a:xfrm>
+          <a:prstGeom prst="rect">
+            <a:avLst/>
+          </a:prstGeom>
+          <a:noFill/>
+        </p:spPr>
+        <p:txBody>
+          <a:bodyPr wrap="square" rtlCol="0">
+            <a:spAutoFit/>
+          </a:bodyPr>
+          <a:lstStyle/>
+          <a:p>
+            <a:pPr algn="ctr"/>
+            <a:r>
+              <a:rPr lang="fr-FR" sz="2400" dirty="0" smtClean="0">
+                <a:latin typeface="Avenir Book" charset="0"/>
+                <a:ea typeface="Avenir Book" charset="0"/>
+                <a:cs typeface="Avenir Book" charset="0"/>
+              </a:rPr>
+              <a:t>For </a:t>
+            </a:r>
+            <a:r>
+              <a:rPr lang="fr-FR" sz="2400" dirty="0" err="1" smtClean="0">
+                <a:latin typeface="Avenir Book" charset="0"/>
+                <a:ea typeface="Avenir Book" charset="0"/>
+                <a:cs typeface="Avenir Book" charset="0"/>
+              </a:rPr>
+              <a:t>cover</a:t>
+            </a:r>
+            <a:r>
+              <a:rPr lang="fr-FR" sz="2400" dirty="0" smtClean="0">
+                <a:latin typeface="Avenir Book" charset="0"/>
+                <a:ea typeface="Avenir Book" charset="0"/>
+                <a:cs typeface="Avenir Book" charset="0"/>
+              </a:rPr>
+              <a:t> </a:t>
+            </a:r>
+            <a:r>
+              <a:rPr lang="fr-FR" sz="2400" dirty="0" err="1" smtClean="0">
+                <a:latin typeface="Avenir Book" charset="0"/>
+                <a:ea typeface="Avenir Book" charset="0"/>
+                <a:cs typeface="Avenir Book" charset="0"/>
+              </a:rPr>
+              <a:t>songs</a:t>
+            </a:r>
+            <a:endParaRPr lang="fr-FR" sz="2400" dirty="0">
+              <a:latin typeface="Avenir Book" charset="0"/>
+              <a:ea typeface="Avenir Book" charset="0"/>
+              <a:cs typeface="Avenir Book" charset="0"/>
+            </a:endParaRPr>
+          </a:p>
+        </p:txBody>
+      </p:sp>
+      <p:pic>
+        <p:nvPicPr>
+          <p:cNvPr id="41" name="Image 40"/>
+          <p:cNvPicPr>
+            <a:picLocks noChangeAspect="1"/>
+          </p:cNvPicPr>
+          <p:nvPr/>
+        </p:nvPicPr>
+        <p:blipFill rotWithShape="1">
+          <a:blip r:embed="rId6">
+            <a:extLst>
+              <a:ext uri="{28A0092B-C50C-407E-A947-70E740481C1C}">
+                <a14:useLocalDpi xmlns:a14="http://schemas.microsoft.com/office/drawing/2010/main" val="0"/>
+              </a:ext>
+            </a:extLst>
+          </a:blip>
+          <a:srcRect l="10103" r="13830"/>
+          <a:stretch/>
+        </p:blipFill>
+        <p:spPr>
+          <a:xfrm>
+            <a:off x="11063905" y="26080939"/>
+            <a:ext cx="8354242" cy="4654800"/>
+          </a:xfrm>
+          <a:prstGeom prst="rect">
+            <a:avLst/>
+          </a:prstGeom>
+        </p:spPr>
+      </p:pic>
+      <p:sp>
+        <p:nvSpPr>
+          <p:cNvPr id="131" name="ZoneTexte 130"/>
+          <p:cNvSpPr txBox="1"/>
+          <p:nvPr/>
+        </p:nvSpPr>
+        <p:spPr>
+          <a:xfrm>
+            <a:off x="14078908" y="25560750"/>
+            <a:ext cx="3126240" cy="461665"/>
+          </a:xfrm>
+          <a:prstGeom prst="rect">
+            <a:avLst/>
+          </a:prstGeom>
+          <a:noFill/>
+        </p:spPr>
+        <p:txBody>
+          <a:bodyPr wrap="square" rtlCol="0">
+            <a:spAutoFit/>
+          </a:bodyPr>
+          <a:lstStyle/>
+          <a:p>
+            <a:pPr algn="ctr"/>
+            <a:r>
+              <a:rPr lang="fr-FR" sz="2400" dirty="0" smtClean="0">
+                <a:latin typeface="Avenir Book" charset="0"/>
+                <a:ea typeface="Avenir Book" charset="0"/>
+                <a:cs typeface="Avenir Book" charset="0"/>
+              </a:rPr>
+              <a:t>For original </a:t>
+            </a:r>
+            <a:r>
+              <a:rPr lang="fr-FR" sz="2400" dirty="0" err="1" smtClean="0">
+                <a:latin typeface="Avenir Book" charset="0"/>
+                <a:ea typeface="Avenir Book" charset="0"/>
+                <a:cs typeface="Avenir Book" charset="0"/>
+              </a:rPr>
+              <a:t>songs</a:t>
+            </a:r>
+            <a:endParaRPr lang="fr-FR" sz="2400" dirty="0">
+              <a:latin typeface="Avenir Book" charset="0"/>
+              <a:ea typeface="Avenir Book" charset="0"/>
+              <a:cs typeface="Avenir Book" charset="0"/>
+            </a:endParaRPr>
+          </a:p>
+        </p:txBody>
+      </p:sp>
+      <p:pic>
+        <p:nvPicPr>
+          <p:cNvPr id="45" name="Image 44"/>
+          <p:cNvPicPr>
+            <a:picLocks noChangeAspect="1"/>
+          </p:cNvPicPr>
+          <p:nvPr/>
+        </p:nvPicPr>
+        <p:blipFill>
+          <a:blip r:embed="rId7">
+            <a:extLst>
+              <a:ext uri="{28A0092B-C50C-407E-A947-70E740481C1C}">
+                <a14:useLocalDpi xmlns:a14="http://schemas.microsoft.com/office/drawing/2010/main" val="0"/>
+              </a:ext>
+            </a:extLst>
+          </a:blip>
+          <a:stretch>
+            <a:fillRect/>
+          </a:stretch>
+        </p:blipFill>
+        <p:spPr>
+          <a:xfrm>
+            <a:off x="20970329" y="20675017"/>
+            <a:ext cx="7624800" cy="4244368"/>
+          </a:xfrm>
+          <a:prstGeom prst="rect">
+            <a:avLst/>
+          </a:prstGeom>
+        </p:spPr>
+      </p:pic>
+      <p:pic>
+        <p:nvPicPr>
+          <p:cNvPr id="46" name="Image 45"/>
+          <p:cNvPicPr>
+            <a:picLocks noChangeAspect="1"/>
+          </p:cNvPicPr>
+          <p:nvPr/>
+        </p:nvPicPr>
+        <p:blipFill>
+          <a:blip r:embed="rId8">
+            <a:extLst>
+              <a:ext uri="{28A0092B-C50C-407E-A947-70E740481C1C}">
+                <a14:useLocalDpi xmlns:a14="http://schemas.microsoft.com/office/drawing/2010/main" val="0"/>
+              </a:ext>
+            </a:extLst>
+          </a:blip>
+          <a:stretch>
+            <a:fillRect/>
+          </a:stretch>
+        </p:blipFill>
+        <p:spPr>
+          <a:xfrm>
+            <a:off x="20970329" y="24928886"/>
+            <a:ext cx="7624800" cy="4244368"/>
+          </a:xfrm>
+          <a:prstGeom prst="rect">
+            <a:avLst/>
+          </a:prstGeom>
+        </p:spPr>
+      </p:pic>
+      <p:sp>
+        <p:nvSpPr>
+          <p:cNvPr id="48" name="ZoneTexte 47"/>
+          <p:cNvSpPr txBox="1"/>
+          <p:nvPr/>
+        </p:nvSpPr>
+        <p:spPr>
+          <a:xfrm>
+            <a:off x="2272199" y="30735739"/>
+            <a:ext cx="16703130" cy="523220"/>
+          </a:xfrm>
+          <a:prstGeom prst="rect">
+            <a:avLst/>
+          </a:prstGeom>
+          <a:noFill/>
+        </p:spPr>
+        <p:txBody>
+          <a:bodyPr wrap="square" rtlCol="0">
+            <a:spAutoFit/>
+          </a:bodyPr>
+          <a:lstStyle/>
+          <a:p>
+            <a:pPr algn="ctr"/>
+            <a:r>
+              <a:rPr lang="fr-FR" sz="2800" b="1" dirty="0" smtClean="0">
+                <a:latin typeface="Avenir Book" charset="0"/>
+                <a:ea typeface="Avenir Book" charset="0"/>
+                <a:cs typeface="Avenir Book" charset="0"/>
+              </a:rPr>
+              <a:t>90% </a:t>
+            </a:r>
+            <a:r>
+              <a:rPr lang="fr-FR" sz="2800" b="1" dirty="0">
+                <a:latin typeface="Avenir Book" charset="0"/>
+                <a:ea typeface="Avenir Book" charset="0"/>
+                <a:cs typeface="Avenir Book" charset="0"/>
+              </a:rPr>
+              <a:t>of </a:t>
+            </a:r>
+            <a:r>
+              <a:rPr lang="fr-FR" sz="2800" b="1" dirty="0" err="1" smtClean="0">
+                <a:latin typeface="Avenir Book" charset="0"/>
+                <a:ea typeface="Avenir Book" charset="0"/>
+                <a:cs typeface="Avenir Book" charset="0"/>
+              </a:rPr>
+              <a:t>covers</a:t>
+            </a:r>
+            <a:r>
+              <a:rPr lang="fr-FR" sz="2800" b="1" dirty="0" smtClean="0">
+                <a:latin typeface="Avenir Book" charset="0"/>
+                <a:ea typeface="Avenir Book" charset="0"/>
+                <a:cs typeface="Avenir Book" charset="0"/>
+              </a:rPr>
+              <a:t> are </a:t>
+            </a:r>
+            <a:r>
+              <a:rPr lang="fr-FR" sz="2800" b="1" dirty="0">
+                <a:latin typeface="Avenir Book" charset="0"/>
+                <a:ea typeface="Avenir Book" charset="0"/>
+                <a:cs typeface="Avenir Book" charset="0"/>
+              </a:rPr>
+              <a:t>in a </a:t>
+            </a:r>
+            <a:r>
+              <a:rPr lang="fr-FR" sz="2800" b="1" dirty="0" err="1">
+                <a:latin typeface="Avenir Book" charset="0"/>
+                <a:ea typeface="Avenir Book" charset="0"/>
+                <a:cs typeface="Avenir Book" charset="0"/>
+              </a:rPr>
+              <a:t>different</a:t>
+            </a:r>
+            <a:r>
+              <a:rPr lang="fr-FR" sz="2800" b="1" dirty="0">
+                <a:latin typeface="Avenir Book" charset="0"/>
+                <a:ea typeface="Avenir Book" charset="0"/>
+                <a:cs typeface="Avenir Book" charset="0"/>
+              </a:rPr>
+              <a:t> genre </a:t>
+            </a:r>
+            <a:r>
+              <a:rPr lang="fr-FR" sz="2800" b="1" dirty="0" err="1">
+                <a:latin typeface="Avenir Book" charset="0"/>
+                <a:ea typeface="Avenir Book" charset="0"/>
+                <a:cs typeface="Avenir Book" charset="0"/>
+              </a:rPr>
+              <a:t>than</a:t>
+            </a:r>
+            <a:r>
+              <a:rPr lang="fr-FR" sz="2800" b="1" dirty="0">
+                <a:latin typeface="Avenir Book" charset="0"/>
+                <a:ea typeface="Avenir Book" charset="0"/>
+                <a:cs typeface="Avenir Book" charset="0"/>
+              </a:rPr>
+              <a:t> the original </a:t>
+            </a:r>
+            <a:r>
+              <a:rPr lang="fr-FR" sz="2800" b="1" dirty="0" err="1" smtClean="0">
+                <a:latin typeface="Avenir Book" charset="0"/>
+                <a:ea typeface="Avenir Book" charset="0"/>
+                <a:cs typeface="Avenir Book" charset="0"/>
+              </a:rPr>
+              <a:t>song</a:t>
+            </a:r>
+            <a:endParaRPr lang="fr-FR" sz="2800" b="1" dirty="0">
+              <a:latin typeface="Avenir Book" charset="0"/>
+              <a:ea typeface="Avenir Book" charset="0"/>
+              <a:cs typeface="Avenir Book" charset="0"/>
+            </a:endParaRPr>
+          </a:p>
+        </p:txBody>
+      </p:sp>
+      <p:sp>
+        <p:nvSpPr>
+          <p:cNvPr id="49" name="ZoneTexte 48"/>
+          <p:cNvSpPr txBox="1"/>
+          <p:nvPr/>
+        </p:nvSpPr>
+        <p:spPr>
+          <a:xfrm>
+            <a:off x="21658529" y="30000075"/>
+            <a:ext cx="6248400" cy="954107"/>
+          </a:xfrm>
+          <a:prstGeom prst="rect">
+            <a:avLst/>
+          </a:prstGeom>
+          <a:noFill/>
+        </p:spPr>
+        <p:txBody>
+          <a:bodyPr wrap="square" rtlCol="0">
+            <a:spAutoFit/>
+          </a:bodyPr>
+          <a:lstStyle/>
+          <a:p>
+            <a:pPr algn="ctr"/>
+            <a:r>
+              <a:rPr lang="fr-FR" sz="2800" b="1" dirty="0" smtClean="0">
+                <a:latin typeface="Avenir Book" charset="0"/>
+                <a:ea typeface="Avenir Book" charset="0"/>
+                <a:cs typeface="Avenir Book" charset="0"/>
+              </a:rPr>
+              <a:t>80% of </a:t>
+            </a:r>
+            <a:r>
+              <a:rPr lang="fr-FR" sz="2800" b="1" dirty="0" err="1">
+                <a:latin typeface="Avenir Book" charset="0"/>
+                <a:ea typeface="Avenir Book" charset="0"/>
+                <a:cs typeface="Avenir Book" charset="0"/>
+              </a:rPr>
+              <a:t>covers</a:t>
+            </a:r>
+            <a:r>
+              <a:rPr lang="fr-FR" sz="2800" b="1" dirty="0">
+                <a:latin typeface="Avenir Book" charset="0"/>
+                <a:ea typeface="Avenir Book" charset="0"/>
+                <a:cs typeface="Avenir Book" charset="0"/>
+              </a:rPr>
+              <a:t> </a:t>
+            </a:r>
+            <a:r>
+              <a:rPr lang="fr-FR" sz="2800" b="1" dirty="0" smtClean="0">
+                <a:latin typeface="Avenir Book" charset="0"/>
+                <a:ea typeface="Avenir Book" charset="0"/>
+                <a:cs typeface="Avenir Book" charset="0"/>
+              </a:rPr>
+              <a:t>are </a:t>
+            </a:r>
+            <a:r>
+              <a:rPr lang="fr-FR" sz="2800" b="1" dirty="0" err="1" smtClean="0">
+                <a:latin typeface="Avenir Book" charset="0"/>
+                <a:ea typeface="Avenir Book" charset="0"/>
+                <a:cs typeface="Avenir Book" charset="0"/>
+              </a:rPr>
+              <a:t>recorded</a:t>
+            </a:r>
+            <a:r>
+              <a:rPr lang="fr-FR" sz="2800" b="1" dirty="0" smtClean="0">
+                <a:latin typeface="Avenir Book" charset="0"/>
+                <a:ea typeface="Avenir Book" charset="0"/>
+                <a:cs typeface="Avenir Book" charset="0"/>
+              </a:rPr>
+              <a:t> </a:t>
+            </a:r>
+            <a:r>
+              <a:rPr lang="fr-FR" sz="2800" b="1" dirty="0">
+                <a:latin typeface="Avenir Book" charset="0"/>
+                <a:ea typeface="Avenir Book" charset="0"/>
+                <a:cs typeface="Avenir Book" charset="0"/>
+              </a:rPr>
+              <a:t>more </a:t>
+            </a:r>
+            <a:r>
+              <a:rPr lang="fr-FR" sz="2800" b="1" dirty="0" err="1">
+                <a:latin typeface="Avenir Book" charset="0"/>
+                <a:ea typeface="Avenir Book" charset="0"/>
+                <a:cs typeface="Avenir Book" charset="0"/>
+              </a:rPr>
+              <a:t>than</a:t>
+            </a:r>
+            <a:r>
+              <a:rPr lang="fr-FR" sz="2800" b="1" dirty="0">
+                <a:latin typeface="Avenir Book" charset="0"/>
+                <a:ea typeface="Avenir Book" charset="0"/>
+                <a:cs typeface="Avenir Book" charset="0"/>
+              </a:rPr>
+              <a:t> 10 </a:t>
+            </a:r>
+            <a:r>
+              <a:rPr lang="fr-FR" sz="2800" b="1" dirty="0" err="1">
+                <a:latin typeface="Avenir Book" charset="0"/>
+                <a:ea typeface="Avenir Book" charset="0"/>
+                <a:cs typeface="Avenir Book" charset="0"/>
+              </a:rPr>
+              <a:t>years</a:t>
+            </a:r>
+            <a:r>
+              <a:rPr lang="fr-FR" sz="2800" b="1" dirty="0">
+                <a:latin typeface="Avenir Book" charset="0"/>
+                <a:ea typeface="Avenir Book" charset="0"/>
+                <a:cs typeface="Avenir Book" charset="0"/>
+              </a:rPr>
+              <a:t> </a:t>
+            </a:r>
+            <a:r>
+              <a:rPr lang="fr-FR" sz="2800" b="1" dirty="0" err="1">
+                <a:latin typeface="Avenir Book" charset="0"/>
+                <a:ea typeface="Avenir Book" charset="0"/>
+                <a:cs typeface="Avenir Book" charset="0"/>
+              </a:rPr>
+              <a:t>after</a:t>
+            </a:r>
+            <a:r>
+              <a:rPr lang="fr-FR" sz="2800" b="1" dirty="0">
+                <a:latin typeface="Avenir Book" charset="0"/>
+                <a:ea typeface="Avenir Book" charset="0"/>
+                <a:cs typeface="Avenir Book" charset="0"/>
+              </a:rPr>
+              <a:t> the </a:t>
+            </a:r>
+            <a:r>
+              <a:rPr lang="fr-FR" sz="2800" b="1" dirty="0" smtClean="0">
+                <a:latin typeface="Avenir Book" charset="0"/>
+                <a:ea typeface="Avenir Book" charset="0"/>
+                <a:cs typeface="Avenir Book" charset="0"/>
+              </a:rPr>
+              <a:t>original</a:t>
+            </a:r>
+            <a:endParaRPr lang="fr-FR" sz="2800" b="1" dirty="0">
+              <a:latin typeface="Avenir Book" charset="0"/>
+              <a:ea typeface="Avenir Book" charset="0"/>
+              <a:cs typeface="Avenir Book" charset="0"/>
+            </a:endParaRPr>
+          </a:p>
+        </p:txBody>
+      </p:sp>
+      <p:sp>
+        <p:nvSpPr>
+          <p:cNvPr id="133" name="ZoneTexte 132"/>
+          <p:cNvSpPr txBox="1"/>
+          <p:nvPr/>
+        </p:nvSpPr>
+        <p:spPr>
+          <a:xfrm>
+            <a:off x="22439570" y="20416653"/>
+            <a:ext cx="4687320" cy="400110"/>
+          </a:xfrm>
+          <a:prstGeom prst="rect">
+            <a:avLst/>
+          </a:prstGeom>
+          <a:noFill/>
+        </p:spPr>
+        <p:txBody>
+          <a:bodyPr wrap="square" rtlCol="0">
+            <a:spAutoFit/>
+          </a:bodyPr>
+          <a:lstStyle/>
+          <a:p>
+            <a:pPr algn="ctr"/>
+            <a:r>
+              <a:rPr lang="fr-FR" sz="2000" dirty="0" smtClean="0">
+                <a:latin typeface="Avenir Book" charset="0"/>
+                <a:ea typeface="Avenir Book" charset="0"/>
+                <a:cs typeface="Avenir Book" charset="0"/>
+              </a:rPr>
+              <a:t>Distribution of </a:t>
+            </a:r>
+            <a:r>
+              <a:rPr lang="fr-FR" sz="2000" dirty="0" err="1" smtClean="0">
+                <a:latin typeface="Avenir Book" charset="0"/>
+                <a:ea typeface="Avenir Book" charset="0"/>
+                <a:cs typeface="Avenir Book" charset="0"/>
+              </a:rPr>
+              <a:t>originals</a:t>
+            </a:r>
+            <a:endParaRPr lang="fr-FR" sz="2000" dirty="0">
+              <a:latin typeface="Avenir Book" charset="0"/>
+              <a:ea typeface="Avenir Book" charset="0"/>
+              <a:cs typeface="Avenir Book" charset="0"/>
+            </a:endParaRPr>
+          </a:p>
+        </p:txBody>
+      </p:sp>
+      <p:sp>
+        <p:nvSpPr>
+          <p:cNvPr id="136" name="ZoneTexte 135"/>
+          <p:cNvSpPr txBox="1"/>
+          <p:nvPr/>
+        </p:nvSpPr>
+        <p:spPr>
+          <a:xfrm>
+            <a:off x="22439570" y="24692082"/>
+            <a:ext cx="4687320" cy="400110"/>
+          </a:xfrm>
+          <a:prstGeom prst="rect">
+            <a:avLst/>
+          </a:prstGeom>
+          <a:noFill/>
+        </p:spPr>
+        <p:txBody>
+          <a:bodyPr wrap="square" rtlCol="0">
+            <a:spAutoFit/>
+          </a:bodyPr>
+          <a:lstStyle/>
+          <a:p>
+            <a:pPr algn="ctr"/>
+            <a:r>
+              <a:rPr lang="fr-FR" sz="2000" dirty="0" smtClean="0">
+                <a:latin typeface="Avenir Book" charset="0"/>
+                <a:ea typeface="Avenir Book" charset="0"/>
+                <a:cs typeface="Avenir Book" charset="0"/>
+              </a:rPr>
+              <a:t>Distribution of </a:t>
+            </a:r>
+            <a:r>
+              <a:rPr lang="fr-FR" sz="2000" dirty="0" err="1" smtClean="0">
+                <a:latin typeface="Avenir Book" charset="0"/>
+                <a:ea typeface="Avenir Book" charset="0"/>
+                <a:cs typeface="Avenir Book" charset="0"/>
+              </a:rPr>
+              <a:t>covers</a:t>
+            </a:r>
+            <a:endParaRPr lang="fr-FR" sz="2000" dirty="0">
+              <a:latin typeface="Avenir Book" charset="0"/>
+              <a:ea typeface="Avenir Book" charset="0"/>
+              <a:cs typeface="Avenir Book" charset="0"/>
+            </a:endParaRPr>
+          </a:p>
+        </p:txBody>
+      </p:sp>
+      <p:sp>
+        <p:nvSpPr>
+          <p:cNvPr id="141" name="ZoneTexte 140"/>
+          <p:cNvSpPr txBox="1"/>
+          <p:nvPr/>
+        </p:nvSpPr>
+        <p:spPr>
+          <a:xfrm>
+            <a:off x="22439570" y="28962548"/>
+            <a:ext cx="4687320" cy="707886"/>
+          </a:xfrm>
+          <a:prstGeom prst="rect">
+            <a:avLst/>
+          </a:prstGeom>
+          <a:noFill/>
+        </p:spPr>
+        <p:txBody>
+          <a:bodyPr wrap="square" rtlCol="0">
+            <a:spAutoFit/>
+          </a:bodyPr>
+          <a:lstStyle/>
+          <a:p>
+            <a:pPr algn="ctr"/>
+            <a:r>
+              <a:rPr lang="fr-FR" sz="2000" dirty="0" err="1" smtClean="0">
+                <a:latin typeface="Avenir Book" charset="0"/>
+                <a:ea typeface="Avenir Book" charset="0"/>
+                <a:cs typeface="Avenir Book" charset="0"/>
+              </a:rPr>
+              <a:t>Number</a:t>
+            </a:r>
+            <a:r>
+              <a:rPr lang="fr-FR" sz="2000" dirty="0" smtClean="0">
+                <a:latin typeface="Avenir Book" charset="0"/>
+                <a:ea typeface="Avenir Book" charset="0"/>
+                <a:cs typeface="Avenir Book" charset="0"/>
+              </a:rPr>
+              <a:t> of </a:t>
+            </a:r>
+            <a:r>
+              <a:rPr lang="fr-FR" sz="2000" dirty="0" err="1" smtClean="0">
+                <a:latin typeface="Avenir Book" charset="0"/>
+                <a:ea typeface="Avenir Book" charset="0"/>
+                <a:cs typeface="Avenir Book" charset="0"/>
+              </a:rPr>
+              <a:t>covers</a:t>
+            </a:r>
+            <a:r>
+              <a:rPr lang="fr-FR" sz="2000" dirty="0" smtClean="0">
+                <a:latin typeface="Avenir Book" charset="0"/>
+                <a:ea typeface="Avenir Book" charset="0"/>
+                <a:cs typeface="Avenir Book" charset="0"/>
+              </a:rPr>
+              <a:t> of </a:t>
+            </a:r>
+            <a:r>
+              <a:rPr lang="fr-FR" sz="2000" dirty="0" err="1" smtClean="0">
+                <a:latin typeface="Avenir Book" charset="0"/>
+                <a:ea typeface="Avenir Book" charset="0"/>
+                <a:cs typeface="Avenir Book" charset="0"/>
+              </a:rPr>
+              <a:t>originals</a:t>
+            </a:r>
+            <a:r>
+              <a:rPr lang="fr-FR" sz="2000" dirty="0" smtClean="0">
+                <a:latin typeface="Avenir Book" charset="0"/>
+                <a:ea typeface="Avenir Book" charset="0"/>
+                <a:cs typeface="Avenir Book" charset="0"/>
+              </a:rPr>
+              <a:t> </a:t>
+            </a:r>
+            <a:r>
+              <a:rPr lang="fr-FR" sz="2000" dirty="0" err="1" smtClean="0">
+                <a:latin typeface="Avenir Book" charset="0"/>
+                <a:ea typeface="Avenir Book" charset="0"/>
+                <a:cs typeface="Avenir Book" charset="0"/>
+              </a:rPr>
+              <a:t>recorded</a:t>
+            </a:r>
+            <a:r>
+              <a:rPr lang="fr-FR" sz="2000" dirty="0" smtClean="0">
+                <a:latin typeface="Avenir Book" charset="0"/>
+                <a:ea typeface="Avenir Book" charset="0"/>
+                <a:cs typeface="Avenir Book" charset="0"/>
+              </a:rPr>
+              <a:t> in </a:t>
+            </a:r>
+            <a:r>
+              <a:rPr lang="fr-FR" sz="2000" dirty="0" err="1" smtClean="0">
+                <a:latin typeface="Avenir Book" charset="0"/>
+                <a:ea typeface="Avenir Book" charset="0"/>
+                <a:cs typeface="Avenir Book" charset="0"/>
+              </a:rPr>
+              <a:t>that</a:t>
+            </a:r>
+            <a:r>
+              <a:rPr lang="fr-FR" sz="2000" dirty="0" smtClean="0">
+                <a:latin typeface="Avenir Book" charset="0"/>
+                <a:ea typeface="Avenir Book" charset="0"/>
+                <a:cs typeface="Avenir Book" charset="0"/>
+              </a:rPr>
+              <a:t> </a:t>
+            </a:r>
+            <a:r>
+              <a:rPr lang="fr-FR" sz="2000" dirty="0" err="1" smtClean="0">
+                <a:latin typeface="Avenir Book" charset="0"/>
+                <a:ea typeface="Avenir Book" charset="0"/>
+                <a:cs typeface="Avenir Book" charset="0"/>
+              </a:rPr>
+              <a:t>year</a:t>
+            </a:r>
+            <a:endParaRPr lang="fr-FR" sz="2000" dirty="0">
+              <a:latin typeface="Avenir Book" charset="0"/>
+              <a:ea typeface="Avenir Book" charset="0"/>
+              <a:cs typeface="Avenir Book" charset="0"/>
+            </a:endParaRPr>
+          </a:p>
+        </p:txBody>
+      </p:sp>
     </p:spTree>
     <p:extLst>
       <p:ext uri="{BB962C8B-B14F-4D97-AF65-F5344CB8AC3E}">

</xml_diff>

<commit_message>
top 10 array to do + add general stats
</commit_message>
<xml_diff>
--- a/project/poster_ada.pptx
+++ b/project/poster_ada.pptx
@@ -3334,8 +3334,8 @@
         </p:nvSpPr>
         <p:spPr>
           <a:xfrm>
-            <a:off x="11871893" y="15585165"/>
-            <a:ext cx="6738269" cy="9275514"/>
+            <a:off x="11871893" y="16543614"/>
+            <a:ext cx="6738269" cy="7322226"/>
           </a:xfrm>
           <a:prstGeom prst="roundRect">
             <a:avLst/>
@@ -4631,6 +4631,743 @@
               <a:t>year</a:t>
             </a:r>
             <a:endParaRPr lang="fr-FR" sz="2000" dirty="0">
+              <a:latin typeface="Avenir Book" charset="0"/>
+              <a:ea typeface="Avenir Book" charset="0"/>
+              <a:cs typeface="Avenir Book" charset="0"/>
+            </a:endParaRPr>
+          </a:p>
+        </p:txBody>
+      </p:sp>
+      <p:sp>
+        <p:nvSpPr>
+          <p:cNvPr id="142" name="ZoneTexte 141"/>
+          <p:cNvSpPr txBox="1"/>
+          <p:nvPr/>
+        </p:nvSpPr>
+        <p:spPr>
+          <a:xfrm>
+            <a:off x="11514512" y="14369830"/>
+            <a:ext cx="16703130" cy="523220"/>
+          </a:xfrm>
+          <a:prstGeom prst="rect">
+            <a:avLst/>
+          </a:prstGeom>
+          <a:noFill/>
+        </p:spPr>
+        <p:txBody>
+          <a:bodyPr wrap="square" rtlCol="0">
+            <a:spAutoFit/>
+          </a:bodyPr>
+          <a:lstStyle/>
+          <a:p>
+            <a:pPr algn="ctr"/>
+            <a:r>
+              <a:rPr lang="fr-FR" sz="2800" b="1" dirty="0" smtClean="0">
+                <a:latin typeface="Avenir Book" charset="0"/>
+                <a:ea typeface="Avenir Book" charset="0"/>
+                <a:cs typeface="Avenir Book" charset="0"/>
+              </a:rPr>
+              <a:t>65% </a:t>
+            </a:r>
+            <a:r>
+              <a:rPr lang="fr-FR" sz="2800" b="1" dirty="0">
+                <a:latin typeface="Avenir Book" charset="0"/>
+                <a:ea typeface="Avenir Book" charset="0"/>
+                <a:cs typeface="Avenir Book" charset="0"/>
+              </a:rPr>
+              <a:t>of </a:t>
+            </a:r>
+            <a:r>
+              <a:rPr lang="fr-FR" sz="2800" b="1" dirty="0" err="1" smtClean="0">
+                <a:latin typeface="Avenir Book" charset="0"/>
+                <a:ea typeface="Avenir Book" charset="0"/>
+                <a:cs typeface="Avenir Book" charset="0"/>
+              </a:rPr>
+              <a:t>covers</a:t>
+            </a:r>
+            <a:r>
+              <a:rPr lang="fr-FR" sz="2800" b="1" dirty="0" smtClean="0">
+                <a:latin typeface="Avenir Book" charset="0"/>
+                <a:ea typeface="Avenir Book" charset="0"/>
+                <a:cs typeface="Avenir Book" charset="0"/>
+              </a:rPr>
+              <a:t> are </a:t>
+            </a:r>
+            <a:r>
+              <a:rPr lang="fr-FR" sz="2800" b="1" dirty="0" err="1" smtClean="0">
+                <a:latin typeface="Avenir Book" charset="0"/>
+                <a:ea typeface="Avenir Book" charset="0"/>
+                <a:cs typeface="Avenir Book" charset="0"/>
+              </a:rPr>
+              <a:t>recorded</a:t>
+            </a:r>
+            <a:r>
+              <a:rPr lang="fr-FR" sz="2800" b="1" dirty="0" smtClean="0">
+                <a:latin typeface="Avenir Book" charset="0"/>
+                <a:ea typeface="Avenir Book" charset="0"/>
+                <a:cs typeface="Avenir Book" charset="0"/>
+              </a:rPr>
+              <a:t> in </a:t>
+            </a:r>
+            <a:r>
+              <a:rPr lang="fr-FR" sz="2800" b="1" dirty="0">
+                <a:latin typeface="Avenir Book" charset="0"/>
+                <a:ea typeface="Avenir Book" charset="0"/>
+                <a:cs typeface="Avenir Book" charset="0"/>
+              </a:rPr>
+              <a:t>a </a:t>
+            </a:r>
+            <a:r>
+              <a:rPr lang="fr-FR" sz="2800" b="1" dirty="0" err="1">
+                <a:latin typeface="Avenir Book" charset="0"/>
+                <a:ea typeface="Avenir Book" charset="0"/>
+                <a:cs typeface="Avenir Book" charset="0"/>
+              </a:rPr>
+              <a:t>different</a:t>
+            </a:r>
+            <a:r>
+              <a:rPr lang="fr-FR" sz="2800" b="1" dirty="0">
+                <a:latin typeface="Avenir Book" charset="0"/>
+                <a:ea typeface="Avenir Book" charset="0"/>
+                <a:cs typeface="Avenir Book" charset="0"/>
+              </a:rPr>
+              <a:t> </a:t>
+            </a:r>
+            <a:r>
+              <a:rPr lang="fr-FR" sz="2800" b="1" dirty="0" smtClean="0">
+                <a:latin typeface="Avenir Book" charset="0"/>
+                <a:ea typeface="Avenir Book" charset="0"/>
+                <a:cs typeface="Avenir Book" charset="0"/>
+              </a:rPr>
+              <a:t>country </a:t>
+            </a:r>
+            <a:r>
+              <a:rPr lang="fr-FR" sz="2800" b="1" dirty="0" err="1" smtClean="0">
+                <a:latin typeface="Avenir Book" charset="0"/>
+                <a:ea typeface="Avenir Book" charset="0"/>
+                <a:cs typeface="Avenir Book" charset="0"/>
+              </a:rPr>
+              <a:t>from</a:t>
+            </a:r>
+            <a:r>
+              <a:rPr lang="fr-FR" sz="2800" b="1" dirty="0" smtClean="0">
+                <a:latin typeface="Avenir Book" charset="0"/>
+                <a:ea typeface="Avenir Book" charset="0"/>
+                <a:cs typeface="Avenir Book" charset="0"/>
+              </a:rPr>
+              <a:t> the </a:t>
+            </a:r>
+            <a:r>
+              <a:rPr lang="fr-FR" sz="2800" b="1" dirty="0">
+                <a:latin typeface="Avenir Book" charset="0"/>
+                <a:ea typeface="Avenir Book" charset="0"/>
+                <a:cs typeface="Avenir Book" charset="0"/>
+              </a:rPr>
+              <a:t>original </a:t>
+            </a:r>
+            <a:r>
+              <a:rPr lang="fr-FR" sz="2800" b="1" dirty="0" smtClean="0">
+                <a:latin typeface="Avenir Book" charset="0"/>
+                <a:ea typeface="Avenir Book" charset="0"/>
+                <a:cs typeface="Avenir Book" charset="0"/>
+              </a:rPr>
+              <a:t>one</a:t>
+            </a:r>
+            <a:endParaRPr lang="fr-FR" sz="2800" b="1" dirty="0">
+              <a:latin typeface="Avenir Book" charset="0"/>
+              <a:ea typeface="Avenir Book" charset="0"/>
+              <a:cs typeface="Avenir Book" charset="0"/>
+            </a:endParaRPr>
+          </a:p>
+        </p:txBody>
+      </p:sp>
+      <p:sp>
+        <p:nvSpPr>
+          <p:cNvPr id="52" name="ZoneTexte 51"/>
+          <p:cNvSpPr txBox="1"/>
+          <p:nvPr/>
+        </p:nvSpPr>
+        <p:spPr>
+          <a:xfrm>
+            <a:off x="2213188" y="10447918"/>
+            <a:ext cx="7561945" cy="4401205"/>
+          </a:xfrm>
+          <a:prstGeom prst="rect">
+            <a:avLst/>
+          </a:prstGeom>
+          <a:noFill/>
+        </p:spPr>
+        <p:txBody>
+          <a:bodyPr wrap="square" rtlCol="0">
+            <a:spAutoFit/>
+          </a:bodyPr>
+          <a:lstStyle/>
+          <a:p>
+            <a:pPr marL="285750" indent="-285750">
+              <a:buFont typeface="Arial" charset="0"/>
+              <a:buChar char="•"/>
+            </a:pPr>
+            <a:r>
+              <a:rPr lang="fr-FR" sz="4000" dirty="0" smtClean="0">
+                <a:latin typeface="Avenir Book" charset="0"/>
+                <a:ea typeface="Avenir Book" charset="0"/>
+                <a:cs typeface="Avenir Book" charset="0"/>
+              </a:rPr>
+              <a:t>17541 </a:t>
+            </a:r>
+            <a:r>
+              <a:rPr lang="fr-FR" sz="4000" dirty="0" err="1" smtClean="0">
+                <a:latin typeface="Avenir Book" charset="0"/>
+                <a:ea typeface="Avenir Book" charset="0"/>
+                <a:cs typeface="Avenir Book" charset="0"/>
+              </a:rPr>
+              <a:t>songs</a:t>
+            </a:r>
+            <a:endParaRPr lang="fr-FR" sz="4000" dirty="0" smtClean="0">
+              <a:latin typeface="Avenir Book" charset="0"/>
+              <a:ea typeface="Avenir Book" charset="0"/>
+              <a:cs typeface="Avenir Book" charset="0"/>
+            </a:endParaRPr>
+          </a:p>
+          <a:p>
+            <a:pPr marL="285750" indent="-285750">
+              <a:buFont typeface="Arial" charset="0"/>
+              <a:buChar char="•"/>
+            </a:pPr>
+            <a:r>
+              <a:rPr lang="is-IS" sz="4000" dirty="0" smtClean="0">
+                <a:latin typeface="Avenir Book" charset="0"/>
+                <a:ea typeface="Avenir Book" charset="0"/>
+                <a:cs typeface="Avenir Book" charset="0"/>
+              </a:rPr>
+              <a:t>5420 artists</a:t>
+            </a:r>
+          </a:p>
+          <a:p>
+            <a:pPr marL="285750" indent="-285750">
+              <a:buFont typeface="Arial" charset="0"/>
+              <a:buChar char="•"/>
+            </a:pPr>
+            <a:r>
+              <a:rPr lang="is-IS" sz="4000" dirty="0" smtClean="0">
+                <a:latin typeface="Avenir Book" charset="0"/>
+                <a:ea typeface="Avenir Book" charset="0"/>
+                <a:cs typeface="Avenir Book" charset="0"/>
+              </a:rPr>
+              <a:t>5659 cliques</a:t>
+            </a:r>
+          </a:p>
+          <a:p>
+            <a:pPr marL="285750" indent="-285750">
+              <a:buFont typeface="Arial" charset="0"/>
+              <a:buChar char="•"/>
+            </a:pPr>
+            <a:r>
+              <a:rPr lang="is-IS" sz="4000" dirty="0" smtClean="0">
+                <a:latin typeface="Avenir Book" charset="0"/>
+                <a:ea typeface="Avenir Book" charset="0"/>
+                <a:cs typeface="Avenir Book" charset="0"/>
+              </a:rPr>
+              <a:t>From 1911 to 2015</a:t>
+            </a:r>
+          </a:p>
+          <a:p>
+            <a:pPr marL="285750" indent="-285750">
+              <a:buFont typeface="Arial" charset="0"/>
+              <a:buChar char="•"/>
+            </a:pPr>
+            <a:r>
+              <a:rPr lang="fr-FR" sz="4000" dirty="0" smtClean="0">
+                <a:latin typeface="Avenir Book" charset="0"/>
+                <a:ea typeface="Avenir Book" charset="0"/>
+                <a:cs typeface="Avenir Book" charset="0"/>
+              </a:rPr>
+              <a:t>52 countries</a:t>
+            </a:r>
+          </a:p>
+          <a:p>
+            <a:pPr marL="285750" indent="-285750">
+              <a:buFont typeface="Arial" charset="0"/>
+              <a:buChar char="•"/>
+            </a:pPr>
+            <a:r>
+              <a:rPr lang="fr-FR" sz="4000" dirty="0" smtClean="0">
+                <a:latin typeface="Avenir Book" charset="0"/>
+                <a:ea typeface="Avenir Book" charset="0"/>
+                <a:cs typeface="Avenir Book" charset="0"/>
+              </a:rPr>
+              <a:t>21 </a:t>
+            </a:r>
+            <a:r>
+              <a:rPr lang="fr-FR" sz="4000" dirty="0" err="1" smtClean="0">
+                <a:latin typeface="Avenir Book" charset="0"/>
+                <a:ea typeface="Avenir Book" charset="0"/>
+                <a:cs typeface="Avenir Book" charset="0"/>
+              </a:rPr>
+              <a:t>languages</a:t>
+            </a:r>
+            <a:endParaRPr lang="fr-FR" sz="4000" dirty="0" smtClean="0">
+              <a:latin typeface="Avenir Book" charset="0"/>
+              <a:ea typeface="Avenir Book" charset="0"/>
+              <a:cs typeface="Avenir Book" charset="0"/>
+            </a:endParaRPr>
+          </a:p>
+          <a:p>
+            <a:pPr marL="285750" indent="-285750">
+              <a:buFont typeface="Arial" charset="0"/>
+              <a:buChar char="•"/>
+            </a:pPr>
+            <a:r>
+              <a:rPr lang="fr-FR" sz="4000" dirty="0" smtClean="0">
+                <a:latin typeface="Avenir Book" charset="0"/>
+                <a:ea typeface="Avenir Book" charset="0"/>
+                <a:cs typeface="Avenir Book" charset="0"/>
+              </a:rPr>
+              <a:t>33 genres</a:t>
+            </a:r>
+          </a:p>
+        </p:txBody>
+      </p:sp>
+      <p:sp>
+        <p:nvSpPr>
+          <p:cNvPr id="53" name="ZoneTexte 52"/>
+          <p:cNvSpPr txBox="1"/>
+          <p:nvPr/>
+        </p:nvSpPr>
+        <p:spPr>
+          <a:xfrm>
+            <a:off x="1332506" y="16503533"/>
+            <a:ext cx="8895769" cy="3970318"/>
+          </a:xfrm>
+          <a:prstGeom prst="rect">
+            <a:avLst/>
+          </a:prstGeom>
+          <a:noFill/>
+        </p:spPr>
+        <p:txBody>
+          <a:bodyPr wrap="none" rtlCol="0">
+            <a:spAutoFit/>
+          </a:bodyPr>
+          <a:lstStyle/>
+          <a:p>
+            <a:endParaRPr lang="fr-FR" dirty="0">
+              <a:latin typeface="Avenir Book" charset="0"/>
+              <a:ea typeface="Avenir Book" charset="0"/>
+              <a:cs typeface="Avenir Book" charset="0"/>
+            </a:endParaRPr>
+          </a:p>
+          <a:p>
+            <a:pPr algn="ctr"/>
+            <a:r>
+              <a:rPr lang="fr-FR" b="1" dirty="0">
+                <a:latin typeface="Avenir Book" charset="0"/>
+                <a:ea typeface="Avenir Book" charset="0"/>
+                <a:cs typeface="Avenir Book" charset="0"/>
+              </a:rPr>
+              <a:t>TOP 10 </a:t>
+            </a:r>
+            <a:r>
+              <a:rPr lang="fr-FR" b="1" dirty="0" smtClean="0">
+                <a:latin typeface="Avenir Book" charset="0"/>
+                <a:ea typeface="Avenir Book" charset="0"/>
+                <a:cs typeface="Avenir Book" charset="0"/>
+              </a:rPr>
+              <a:t>SONGS</a:t>
+            </a:r>
+          </a:p>
+          <a:p>
+            <a:pPr algn="ctr"/>
+            <a:endParaRPr lang="fr-FR" dirty="0" smtClean="0">
+              <a:latin typeface="Avenir Book" charset="0"/>
+              <a:ea typeface="Avenir Book" charset="0"/>
+              <a:cs typeface="Avenir Book" charset="0"/>
+            </a:endParaRPr>
+          </a:p>
+          <a:p>
+            <a:pPr marL="342900" indent="-342900">
+              <a:buAutoNum type="arabicPeriod"/>
+            </a:pPr>
+            <a:r>
+              <a:rPr lang="fr-FR" dirty="0" err="1" smtClean="0">
+                <a:latin typeface="Avenir Book" charset="0"/>
+                <a:ea typeface="Avenir Book" charset="0"/>
+                <a:cs typeface="Avenir Book" charset="0"/>
+              </a:rPr>
+              <a:t>Silent</a:t>
+            </a:r>
+            <a:r>
+              <a:rPr lang="fr-FR" dirty="0" smtClean="0">
+                <a:latin typeface="Avenir Book" charset="0"/>
+                <a:ea typeface="Avenir Book" charset="0"/>
+                <a:cs typeface="Avenir Book" charset="0"/>
+              </a:rPr>
+              <a:t> </a:t>
+            </a:r>
+            <a:r>
+              <a:rPr lang="fr-FR" dirty="0">
+                <a:latin typeface="Avenir Book" charset="0"/>
+                <a:ea typeface="Avenir Book" charset="0"/>
+                <a:cs typeface="Avenir Book" charset="0"/>
+              </a:rPr>
+              <a:t>Night, 1961, </a:t>
+            </a:r>
+            <a:r>
+              <a:rPr lang="fr-FR" dirty="0" err="1">
+                <a:latin typeface="Avenir Book" charset="0"/>
+                <a:ea typeface="Avenir Book" charset="0"/>
+                <a:cs typeface="Avenir Book" charset="0"/>
+              </a:rPr>
+              <a:t>Chet</a:t>
+            </a:r>
+            <a:r>
+              <a:rPr lang="fr-FR" dirty="0">
+                <a:latin typeface="Avenir Book" charset="0"/>
+                <a:ea typeface="Avenir Book" charset="0"/>
+                <a:cs typeface="Avenir Book" charset="0"/>
+              </a:rPr>
+              <a:t> Atkins, 42 </a:t>
+            </a:r>
+            <a:endParaRPr lang="fr-FR" dirty="0" smtClean="0">
+              <a:latin typeface="Avenir Book" charset="0"/>
+              <a:ea typeface="Avenir Book" charset="0"/>
+              <a:cs typeface="Avenir Book" charset="0"/>
+            </a:endParaRPr>
+          </a:p>
+          <a:p>
+            <a:pPr marL="342900" indent="-342900">
+              <a:buAutoNum type="arabicPeriod"/>
+            </a:pPr>
+            <a:r>
+              <a:rPr lang="fr-FR" dirty="0" smtClean="0">
+                <a:latin typeface="Avenir Book" charset="0"/>
+                <a:ea typeface="Avenir Book" charset="0"/>
+                <a:cs typeface="Avenir Book" charset="0"/>
+              </a:rPr>
+              <a:t>White </a:t>
+            </a:r>
+            <a:r>
+              <a:rPr lang="fr-FR" dirty="0">
+                <a:latin typeface="Avenir Book" charset="0"/>
+                <a:ea typeface="Avenir Book" charset="0"/>
+                <a:cs typeface="Avenir Book" charset="0"/>
+              </a:rPr>
+              <a:t>Christmas, 1942, Bing Crosby, 36 </a:t>
+            </a:r>
+          </a:p>
+          <a:p>
+            <a:pPr marL="342900" indent="-342900">
+              <a:buAutoNum type="arabicPeriod"/>
+            </a:pPr>
+            <a:r>
+              <a:rPr lang="fr-FR" dirty="0" err="1" smtClean="0">
+                <a:latin typeface="Avenir Book" charset="0"/>
+                <a:ea typeface="Avenir Book" charset="0"/>
+                <a:cs typeface="Avenir Book" charset="0"/>
+              </a:rPr>
+              <a:t>Unchained</a:t>
+            </a:r>
+            <a:r>
+              <a:rPr lang="fr-FR" dirty="0" smtClean="0">
+                <a:latin typeface="Avenir Book" charset="0"/>
+                <a:ea typeface="Avenir Book" charset="0"/>
+                <a:cs typeface="Avenir Book" charset="0"/>
+              </a:rPr>
+              <a:t> </a:t>
+            </a:r>
+            <a:r>
+              <a:rPr lang="fr-FR" dirty="0">
+                <a:latin typeface="Avenir Book" charset="0"/>
+                <a:ea typeface="Avenir Book" charset="0"/>
+                <a:cs typeface="Avenir Book" charset="0"/>
+              </a:rPr>
+              <a:t>Melody, 1955, Les Baxter, 25 </a:t>
+            </a:r>
+          </a:p>
+          <a:p>
+            <a:pPr marL="342900" indent="-342900">
+              <a:buAutoNum type="arabicPeriod"/>
+            </a:pPr>
+            <a:r>
+              <a:rPr lang="fr-FR" dirty="0" smtClean="0">
+                <a:latin typeface="Avenir Book" charset="0"/>
+                <a:ea typeface="Avenir Book" charset="0"/>
+                <a:cs typeface="Avenir Book" charset="0"/>
+              </a:rPr>
+              <a:t>O </a:t>
+            </a:r>
+            <a:r>
+              <a:rPr lang="fr-FR" dirty="0">
+                <a:latin typeface="Avenir Book" charset="0"/>
+                <a:ea typeface="Avenir Book" charset="0"/>
+                <a:cs typeface="Avenir Book" charset="0"/>
+              </a:rPr>
+              <a:t>Holy Night, 1958, Tennessee Ernie Ford, 24 </a:t>
+            </a:r>
+          </a:p>
+          <a:p>
+            <a:pPr marL="342900" indent="-342900">
+              <a:buAutoNum type="arabicPeriod"/>
+            </a:pPr>
+            <a:r>
+              <a:rPr lang="fr-FR" dirty="0" smtClean="0">
+                <a:latin typeface="Avenir Book" charset="0"/>
+                <a:ea typeface="Avenir Book" charset="0"/>
+                <a:cs typeface="Avenir Book" charset="0"/>
+              </a:rPr>
+              <a:t>Georgia </a:t>
+            </a:r>
+            <a:r>
+              <a:rPr lang="fr-FR" dirty="0">
+                <a:latin typeface="Avenir Book" charset="0"/>
+                <a:ea typeface="Avenir Book" charset="0"/>
+                <a:cs typeface="Avenir Book" charset="0"/>
+              </a:rPr>
+              <a:t>On </a:t>
+            </a:r>
+            <a:r>
+              <a:rPr lang="fr-FR" dirty="0" err="1">
+                <a:latin typeface="Avenir Book" charset="0"/>
+                <a:ea typeface="Avenir Book" charset="0"/>
+                <a:cs typeface="Avenir Book" charset="0"/>
+              </a:rPr>
+              <a:t>My</a:t>
+            </a:r>
+            <a:r>
+              <a:rPr lang="fr-FR" dirty="0">
+                <a:latin typeface="Avenir Book" charset="0"/>
+                <a:ea typeface="Avenir Book" charset="0"/>
+                <a:cs typeface="Avenir Book" charset="0"/>
+              </a:rPr>
+              <a:t> </a:t>
+            </a:r>
+            <a:r>
+              <a:rPr lang="fr-FR" dirty="0" err="1">
+                <a:latin typeface="Avenir Book" charset="0"/>
+                <a:ea typeface="Avenir Book" charset="0"/>
+                <a:cs typeface="Avenir Book" charset="0"/>
+              </a:rPr>
+              <a:t>Mind</a:t>
+            </a:r>
+            <a:r>
+              <a:rPr lang="fr-FR" dirty="0">
+                <a:latin typeface="Avenir Book" charset="0"/>
+                <a:ea typeface="Avenir Book" charset="0"/>
+                <a:cs typeface="Avenir Book" charset="0"/>
+              </a:rPr>
+              <a:t>, 1930, </a:t>
+            </a:r>
+            <a:r>
+              <a:rPr lang="fr-FR" dirty="0" err="1">
+                <a:latin typeface="Avenir Book" charset="0"/>
+                <a:ea typeface="Avenir Book" charset="0"/>
+                <a:cs typeface="Avenir Book" charset="0"/>
+              </a:rPr>
+              <a:t>Hoagy</a:t>
+            </a:r>
+            <a:r>
+              <a:rPr lang="fr-FR" dirty="0">
+                <a:latin typeface="Avenir Book" charset="0"/>
+                <a:ea typeface="Avenir Book" charset="0"/>
+                <a:cs typeface="Avenir Book" charset="0"/>
+              </a:rPr>
+              <a:t> Carmichael, 22 </a:t>
+            </a:r>
+          </a:p>
+          <a:p>
+            <a:pPr marL="342900" indent="-342900">
+              <a:buAutoNum type="arabicPeriod"/>
+            </a:pPr>
+            <a:r>
+              <a:rPr lang="fr-FR" dirty="0" err="1" smtClean="0">
+                <a:latin typeface="Avenir Book" charset="0"/>
+                <a:ea typeface="Avenir Book" charset="0"/>
+                <a:cs typeface="Avenir Book" charset="0"/>
+              </a:rPr>
+              <a:t>I'll</a:t>
+            </a:r>
+            <a:r>
+              <a:rPr lang="fr-FR" dirty="0" smtClean="0">
+                <a:latin typeface="Avenir Book" charset="0"/>
+                <a:ea typeface="Avenir Book" charset="0"/>
+                <a:cs typeface="Avenir Book" charset="0"/>
+              </a:rPr>
+              <a:t> </a:t>
+            </a:r>
+            <a:r>
+              <a:rPr lang="fr-FR" dirty="0">
+                <a:latin typeface="Avenir Book" charset="0"/>
+                <a:ea typeface="Avenir Book" charset="0"/>
+                <a:cs typeface="Avenir Book" charset="0"/>
+              </a:rPr>
+              <a:t>Be Home For Christmas, 1943, Bing Crosby, 21 </a:t>
+            </a:r>
+          </a:p>
+          <a:p>
+            <a:pPr marL="342900" indent="-342900">
+              <a:buAutoNum type="arabicPeriod"/>
+            </a:pPr>
+            <a:r>
+              <a:rPr lang="fr-FR" dirty="0" smtClean="0">
+                <a:latin typeface="Avenir Book" charset="0"/>
+                <a:ea typeface="Avenir Book" charset="0"/>
+                <a:cs typeface="Avenir Book" charset="0"/>
+              </a:rPr>
+              <a:t>The </a:t>
+            </a:r>
+            <a:r>
+              <a:rPr lang="fr-FR" dirty="0">
+                <a:latin typeface="Avenir Book" charset="0"/>
+                <a:ea typeface="Avenir Book" charset="0"/>
+                <a:cs typeface="Avenir Book" charset="0"/>
+              </a:rPr>
+              <a:t>Christmas Song, 1946, Nat King Cole, 20 </a:t>
+            </a:r>
+          </a:p>
+          <a:p>
+            <a:pPr marL="342900" indent="-342900">
+              <a:buAutoNum type="arabicPeriod"/>
+            </a:pPr>
+            <a:r>
+              <a:rPr lang="fr-FR" dirty="0" smtClean="0">
+                <a:latin typeface="Avenir Book" charset="0"/>
+                <a:ea typeface="Avenir Book" charset="0"/>
+                <a:cs typeface="Avenir Book" charset="0"/>
+              </a:rPr>
+              <a:t>Have </a:t>
+            </a:r>
+            <a:r>
+              <a:rPr lang="fr-FR" dirty="0" err="1">
+                <a:latin typeface="Avenir Book" charset="0"/>
+                <a:ea typeface="Avenir Book" charset="0"/>
+                <a:cs typeface="Avenir Book" charset="0"/>
+              </a:rPr>
+              <a:t>Yourself</a:t>
+            </a:r>
+            <a:r>
+              <a:rPr lang="fr-FR" dirty="0">
+                <a:latin typeface="Avenir Book" charset="0"/>
+                <a:ea typeface="Avenir Book" charset="0"/>
+                <a:cs typeface="Avenir Book" charset="0"/>
+              </a:rPr>
+              <a:t> A </a:t>
+            </a:r>
+            <a:r>
+              <a:rPr lang="fr-FR" dirty="0" err="1">
+                <a:latin typeface="Avenir Book" charset="0"/>
+                <a:ea typeface="Avenir Book" charset="0"/>
+                <a:cs typeface="Avenir Book" charset="0"/>
+              </a:rPr>
+              <a:t>Merry</a:t>
+            </a:r>
+            <a:r>
+              <a:rPr lang="fr-FR" dirty="0">
+                <a:latin typeface="Avenir Book" charset="0"/>
+                <a:ea typeface="Avenir Book" charset="0"/>
+                <a:cs typeface="Avenir Book" charset="0"/>
+              </a:rPr>
+              <a:t> </a:t>
+            </a:r>
+            <a:r>
+              <a:rPr lang="fr-FR" dirty="0" err="1">
+                <a:latin typeface="Avenir Book" charset="0"/>
+                <a:ea typeface="Avenir Book" charset="0"/>
+                <a:cs typeface="Avenir Book" charset="0"/>
+              </a:rPr>
+              <a:t>Little</a:t>
+            </a:r>
+            <a:r>
+              <a:rPr lang="fr-FR" dirty="0">
+                <a:latin typeface="Avenir Book" charset="0"/>
+                <a:ea typeface="Avenir Book" charset="0"/>
+                <a:cs typeface="Avenir Book" charset="0"/>
+              </a:rPr>
+              <a:t> Christmas, 1967, Barbra </a:t>
+            </a:r>
+            <a:r>
+              <a:rPr lang="fr-FR" dirty="0" err="1">
+                <a:latin typeface="Avenir Book" charset="0"/>
+                <a:ea typeface="Avenir Book" charset="0"/>
+                <a:cs typeface="Avenir Book" charset="0"/>
+              </a:rPr>
+              <a:t>Streisand;Yves</a:t>
+            </a:r>
+            <a:r>
+              <a:rPr lang="fr-FR" dirty="0">
+                <a:latin typeface="Avenir Book" charset="0"/>
+                <a:ea typeface="Avenir Book" charset="0"/>
+                <a:cs typeface="Avenir Book" charset="0"/>
+              </a:rPr>
+              <a:t> Montand, 20 </a:t>
+            </a:r>
+          </a:p>
+          <a:p>
+            <a:pPr marL="342900" indent="-342900">
+              <a:buAutoNum type="arabicPeriod"/>
+            </a:pPr>
+            <a:r>
+              <a:rPr lang="fr-FR" dirty="0" smtClean="0">
+                <a:latin typeface="Avenir Book" charset="0"/>
+                <a:ea typeface="Avenir Book" charset="0"/>
+                <a:cs typeface="Avenir Book" charset="0"/>
+              </a:rPr>
+              <a:t>Over </a:t>
+            </a:r>
+            <a:r>
+              <a:rPr lang="fr-FR" dirty="0">
+                <a:latin typeface="Avenir Book" charset="0"/>
+                <a:ea typeface="Avenir Book" charset="0"/>
+                <a:cs typeface="Avenir Book" charset="0"/>
+              </a:rPr>
+              <a:t>The Rainbow, 1939, Judy Garland, 18 </a:t>
+            </a:r>
+          </a:p>
+          <a:p>
+            <a:pPr marL="342900" indent="-342900">
+              <a:buAutoNum type="arabicPeriod"/>
+            </a:pPr>
+            <a:r>
+              <a:rPr lang="fr-FR" dirty="0" smtClean="0">
+                <a:latin typeface="Avenir Book" charset="0"/>
+                <a:ea typeface="Avenir Book" charset="0"/>
+                <a:cs typeface="Avenir Book" charset="0"/>
+              </a:rPr>
+              <a:t>The </a:t>
+            </a:r>
+            <a:r>
+              <a:rPr lang="fr-FR" dirty="0" err="1">
+                <a:latin typeface="Avenir Book" charset="0"/>
+                <a:ea typeface="Avenir Book" charset="0"/>
+                <a:cs typeface="Avenir Book" charset="0"/>
+              </a:rPr>
+              <a:t>Way</a:t>
+            </a:r>
+            <a:r>
+              <a:rPr lang="fr-FR" dirty="0">
+                <a:latin typeface="Avenir Book" charset="0"/>
+                <a:ea typeface="Avenir Book" charset="0"/>
+                <a:cs typeface="Avenir Book" charset="0"/>
+              </a:rPr>
+              <a:t> You Look </a:t>
+            </a:r>
+            <a:r>
+              <a:rPr lang="fr-FR" dirty="0" err="1">
+                <a:latin typeface="Avenir Book" charset="0"/>
+                <a:ea typeface="Avenir Book" charset="0"/>
+                <a:cs typeface="Avenir Book" charset="0"/>
+              </a:rPr>
+              <a:t>Tonight</a:t>
+            </a:r>
+            <a:r>
+              <a:rPr lang="fr-FR" dirty="0">
+                <a:latin typeface="Avenir Book" charset="0"/>
+                <a:ea typeface="Avenir Book" charset="0"/>
+                <a:cs typeface="Avenir Book" charset="0"/>
+              </a:rPr>
+              <a:t>, 1936, Fred Astaire and Ginger Rogers, 17 </a:t>
+            </a:r>
+          </a:p>
+          <a:p>
+            <a:endParaRPr lang="fr-FR" dirty="0">
               <a:latin typeface="Avenir Book" charset="0"/>
               <a:ea typeface="Avenir Book" charset="0"/>
               <a:cs typeface="Avenir Book" charset="0"/>

</xml_diff>

<commit_message>
idk how to do top 10
</commit_message>
<xml_diff>
--- a/project/poster_ada.pptx
+++ b/project/poster_ada.pptx
@@ -2973,566 +2973,31 @@
       </p:grpSpPr>
       <p:pic>
         <p:nvPicPr>
-          <p:cNvPr id="23" name="Picture 22"/>
+          <p:cNvPr id="54" name="Image 53"/>
           <p:cNvPicPr>
             <a:picLocks noChangeAspect="1"/>
           </p:cNvPicPr>
           <p:nvPr/>
         </p:nvPicPr>
         <p:blipFill>
-          <a:blip r:embed="rId2">
-            <a:extLst>
-              <a:ext uri="{28A0092B-C50C-407E-A947-70E740481C1C}">
-                <a14:useLocalDpi xmlns:a14="http://schemas.microsoft.com/office/drawing/2010/main" val="0"/>
-              </a:ext>
-            </a:extLst>
-          </a:blip>
+          <a:blip r:embed="rId2"/>
           <a:stretch>
             <a:fillRect/>
           </a:stretch>
         </p:blipFill>
         <p:spPr>
           <a:xfrm>
-            <a:off x="1226366" y="834761"/>
-            <a:ext cx="5469400" cy="2277458"/>
+            <a:off x="1226365" y="16482092"/>
+            <a:ext cx="8944917" cy="3269475"/>
           </a:xfrm>
           <a:prstGeom prst="rect">
             <a:avLst/>
           </a:prstGeom>
         </p:spPr>
       </p:pic>
-      <p:sp>
-        <p:nvSpPr>
-          <p:cNvPr id="28" name="Rectangle: Single Corner Snipped 27"/>
-          <p:cNvSpPr/>
-          <p:nvPr/>
-        </p:nvSpPr>
-        <p:spPr>
-          <a:xfrm>
-            <a:off x="7181440" y="961511"/>
-            <a:ext cx="8628831" cy="1080769"/>
-          </a:xfrm>
-          <a:prstGeom prst="snip1Rect">
-            <a:avLst/>
-          </a:prstGeom>
-          <a:solidFill>
-            <a:srgbClr val="BD0026"/>
-          </a:solidFill>
-        </p:spPr>
-        <p:style>
-          <a:lnRef idx="2">
-            <a:schemeClr val="accent1">
-              <a:shade val="50000"/>
-            </a:schemeClr>
-          </a:lnRef>
-          <a:fillRef idx="1">
-            <a:schemeClr val="accent1"/>
-          </a:fillRef>
-          <a:effectRef idx="0">
-            <a:schemeClr val="accent1"/>
-          </a:effectRef>
-          <a:fontRef idx="minor">
-            <a:schemeClr val="lt1"/>
-          </a:fontRef>
-        </p:style>
-        <p:txBody>
-          <a:bodyPr rtlCol="0" anchor="ctr"/>
-          <a:lstStyle/>
-          <a:p>
-            <a:r>
-              <a:rPr lang="en-US" sz="3970" b="1" smtClean="0">
-                <a:latin typeface="Avenir LT Std 35 Light" panose="020B0402020203020204" pitchFamily="34" charset="0"/>
-              </a:rPr>
-              <a:t>Applied Data Analysis Project 2017</a:t>
-            </a:r>
-            <a:endParaRPr lang="en-US" sz="3970" b="1" dirty="0">
-              <a:latin typeface="Avenir LT Std 35 Light" panose="020B0402020203020204" pitchFamily="34" charset="0"/>
-            </a:endParaRPr>
-          </a:p>
-        </p:txBody>
-      </p:sp>
-      <p:sp>
-        <p:nvSpPr>
-          <p:cNvPr id="29" name="Rectangle: Single Corner Snipped 28"/>
-          <p:cNvSpPr/>
-          <p:nvPr/>
-        </p:nvSpPr>
-        <p:spPr>
-          <a:xfrm>
-            <a:off x="7181440" y="2042280"/>
-            <a:ext cx="9572726" cy="1040805"/>
-          </a:xfrm>
-          <a:prstGeom prst="snip1Rect">
-            <a:avLst/>
-          </a:prstGeom>
-          <a:solidFill>
-            <a:srgbClr val="FF4747"/>
-          </a:solidFill>
-          <a:ln>
-            <a:solidFill>
-              <a:srgbClr val="C00000"/>
-            </a:solidFill>
-          </a:ln>
-        </p:spPr>
-        <p:style>
-          <a:lnRef idx="2">
-            <a:schemeClr val="accent1">
-              <a:shade val="50000"/>
-            </a:schemeClr>
-          </a:lnRef>
-          <a:fillRef idx="1">
-            <a:schemeClr val="accent1"/>
-          </a:fillRef>
-          <a:effectRef idx="0">
-            <a:schemeClr val="accent1"/>
-          </a:effectRef>
-          <a:fontRef idx="minor">
-            <a:schemeClr val="lt1"/>
-          </a:fontRef>
-        </p:style>
-        <p:txBody>
-          <a:bodyPr rtlCol="0" anchor="ctr"/>
-          <a:lstStyle/>
-          <a:p>
-            <a:r>
-              <a:rPr lang="en-US" sz="3176" dirty="0" smtClean="0">
-                <a:latin typeface="Avenir LT Std 35 Light" panose="020B0402020203020204" pitchFamily="34" charset="0"/>
-              </a:rPr>
-              <a:t>Pierre-Antoine Desplaces</a:t>
-            </a:r>
-            <a:r>
-              <a:rPr lang="en-US" sz="3176" dirty="0">
-                <a:latin typeface="Avenir LT Std 35 Light" panose="020B0402020203020204" pitchFamily="34" charset="0"/>
-              </a:rPr>
-              <a:t>, </a:t>
-            </a:r>
-            <a:r>
-              <a:rPr lang="en-US" sz="3176" dirty="0" err="1">
-                <a:latin typeface="Avenir LT Std 35 Light" panose="020B0402020203020204" pitchFamily="34" charset="0"/>
-              </a:rPr>
-              <a:t>Anaïs</a:t>
-            </a:r>
-            <a:r>
-              <a:rPr lang="en-US" sz="3176" dirty="0">
-                <a:latin typeface="Avenir LT Std 35 Light" panose="020B0402020203020204" pitchFamily="34" charset="0"/>
-              </a:rPr>
-              <a:t> </a:t>
-            </a:r>
-            <a:r>
-              <a:rPr lang="en-US" sz="3176" dirty="0" err="1">
-                <a:latin typeface="Avenir LT Std 35 Light" panose="020B0402020203020204" pitchFamily="34" charset="0"/>
-              </a:rPr>
-              <a:t>Ladoy</a:t>
-            </a:r>
-            <a:r>
-              <a:rPr lang="en-US" sz="3176" dirty="0">
-                <a:latin typeface="Avenir LT Std 35 Light" panose="020B0402020203020204" pitchFamily="34" charset="0"/>
-              </a:rPr>
-              <a:t>, Lou </a:t>
-            </a:r>
-            <a:r>
-              <a:rPr lang="en-US" sz="3176" dirty="0" smtClean="0">
-                <a:latin typeface="Avenir LT Std 35 Light" panose="020B0402020203020204" pitchFamily="34" charset="0"/>
-              </a:rPr>
-              <a:t>Richard</a:t>
-            </a:r>
-            <a:endParaRPr lang="en-US" sz="3176" dirty="0">
-              <a:latin typeface="Avenir LT Std 35 Light" panose="020B0402020203020204" pitchFamily="34" charset="0"/>
-            </a:endParaRPr>
-          </a:p>
-        </p:txBody>
-      </p:sp>
-      <p:sp>
-        <p:nvSpPr>
-          <p:cNvPr id="30" name="Rectangle: Diagonal Corners Snipped 29"/>
-          <p:cNvSpPr/>
-          <p:nvPr/>
-        </p:nvSpPr>
-        <p:spPr>
-          <a:xfrm>
-            <a:off x="1226369" y="3387885"/>
-            <a:ext cx="28034430" cy="1647590"/>
-          </a:xfrm>
-          <a:prstGeom prst="snip2DiagRect">
-            <a:avLst/>
-          </a:prstGeom>
-          <a:ln w="28575">
-            <a:solidFill>
-              <a:srgbClr val="C00000"/>
-            </a:solidFill>
-          </a:ln>
-        </p:spPr>
-        <p:style>
-          <a:lnRef idx="2">
-            <a:schemeClr val="dk1"/>
-          </a:lnRef>
-          <a:fillRef idx="1">
-            <a:schemeClr val="lt1"/>
-          </a:fillRef>
-          <a:effectRef idx="0">
-            <a:schemeClr val="dk1"/>
-          </a:effectRef>
-          <a:fontRef idx="minor">
-            <a:schemeClr val="dk1"/>
-          </a:fontRef>
-        </p:style>
-        <p:txBody>
-          <a:bodyPr rtlCol="0" anchor="ctr"/>
-          <a:lstStyle/>
-          <a:p>
-            <a:pPr algn="ctr"/>
-            <a:endParaRPr lang="fr-FR" sz="7146" b="1" dirty="0">
-              <a:solidFill>
-                <a:srgbClr val="BD0026"/>
-              </a:solidFill>
-              <a:latin typeface="Avenir LT Std 35 Light" panose="020B0402020203020204" pitchFamily="34" charset="0"/>
-            </a:endParaRPr>
-          </a:p>
-          <a:p>
-            <a:pPr algn="ctr"/>
-            <a:r>
-              <a:rPr lang="fr-FR" sz="7146" b="1" i="1" dirty="0" err="1" smtClean="0">
-                <a:solidFill>
-                  <a:srgbClr val="7E0018"/>
-                </a:solidFill>
-                <a:latin typeface="Avenir LT Std 35 Light" panose="020B0402020203020204" pitchFamily="34" charset="0"/>
-              </a:rPr>
-              <a:t>My</a:t>
-            </a:r>
-            <a:r>
-              <a:rPr lang="fr-FR" sz="7146" b="1" i="1" dirty="0" smtClean="0">
-                <a:solidFill>
-                  <a:srgbClr val="7E0018"/>
-                </a:solidFill>
-                <a:latin typeface="Avenir LT Std 35 Light" panose="020B0402020203020204" pitchFamily="34" charset="0"/>
-              </a:rPr>
-              <a:t> </a:t>
-            </a:r>
-            <a:r>
-              <a:rPr lang="fr-FR" sz="7146" b="1" i="1" dirty="0" err="1" smtClean="0">
-                <a:solidFill>
-                  <a:srgbClr val="7E0018"/>
-                </a:solidFill>
-                <a:latin typeface="Avenir LT Std 35 Light" panose="020B0402020203020204" pitchFamily="34" charset="0"/>
-              </a:rPr>
-              <a:t>Way</a:t>
-            </a:r>
-            <a:r>
-              <a:rPr lang="fr-FR" sz="7146" b="1" i="1" dirty="0" smtClean="0">
-                <a:solidFill>
-                  <a:srgbClr val="7E0018"/>
-                </a:solidFill>
-                <a:latin typeface="Avenir LT Std 35 Light" panose="020B0402020203020204" pitchFamily="34" charset="0"/>
-              </a:rPr>
-              <a:t> </a:t>
-            </a:r>
-            <a:r>
-              <a:rPr lang="fr-FR" sz="7146" b="1" dirty="0" smtClean="0">
-                <a:solidFill>
-                  <a:srgbClr val="7E0018"/>
-                </a:solidFill>
-                <a:latin typeface="Avenir LT Std 35 Light" panose="020B0402020203020204" pitchFamily="34" charset="0"/>
-              </a:rPr>
-              <a:t>of </a:t>
-            </a:r>
-            <a:r>
-              <a:rPr lang="fr-FR" sz="7146" b="1" dirty="0" err="1" smtClean="0">
-                <a:solidFill>
-                  <a:srgbClr val="7E0018"/>
-                </a:solidFill>
-                <a:latin typeface="Avenir LT Std 35 Light" panose="020B0402020203020204" pitchFamily="34" charset="0"/>
-              </a:rPr>
-              <a:t>seeing</a:t>
-            </a:r>
-            <a:r>
-              <a:rPr lang="fr-FR" sz="7146" b="1" dirty="0" smtClean="0">
-                <a:solidFill>
-                  <a:srgbClr val="7E0018"/>
-                </a:solidFill>
-                <a:latin typeface="Avenir LT Std 35 Light" panose="020B0402020203020204" pitchFamily="34" charset="0"/>
-              </a:rPr>
-              <a:t> </a:t>
-            </a:r>
-            <a:r>
-              <a:rPr lang="fr-FR" sz="7146" b="1" dirty="0" err="1" smtClean="0">
-                <a:solidFill>
-                  <a:srgbClr val="7E0018"/>
-                </a:solidFill>
-                <a:latin typeface="Avenir LT Std 35 Light" panose="020B0402020203020204" pitchFamily="34" charset="0"/>
-              </a:rPr>
-              <a:t>covers</a:t>
-            </a:r>
-            <a:endParaRPr lang="fr-FR" sz="7146" b="1" dirty="0">
-              <a:solidFill>
-                <a:srgbClr val="7E0018"/>
-              </a:solidFill>
-              <a:latin typeface="Avenir LT Std 35 Light" panose="020B0402020203020204" pitchFamily="34" charset="0"/>
-            </a:endParaRPr>
-          </a:p>
-          <a:p>
-            <a:pPr algn="ctr"/>
-            <a:endParaRPr lang="fr-FR" sz="7146" b="1" dirty="0">
-              <a:solidFill>
-                <a:srgbClr val="BD0026"/>
-              </a:solidFill>
-              <a:latin typeface="Avenir LT Std 35 Light" panose="020B0402020203020204" pitchFamily="34" charset="0"/>
-            </a:endParaRPr>
-          </a:p>
-        </p:txBody>
-      </p:sp>
-      <p:sp>
-        <p:nvSpPr>
-          <p:cNvPr id="124" name="Rectangle: Rounded Corners 123"/>
-          <p:cNvSpPr/>
-          <p:nvPr/>
-        </p:nvSpPr>
-        <p:spPr>
-          <a:xfrm>
-            <a:off x="1226367" y="5245543"/>
-            <a:ext cx="28034432" cy="3414676"/>
-          </a:xfrm>
-          <a:prstGeom prst="roundRect">
-            <a:avLst/>
-          </a:prstGeom>
-          <a:noFill/>
-          <a:ln>
-            <a:solidFill>
-              <a:srgbClr val="BD0026"/>
-            </a:solidFill>
-          </a:ln>
-        </p:spPr>
-        <p:style>
-          <a:lnRef idx="2">
-            <a:schemeClr val="accent1">
-              <a:shade val="50000"/>
-            </a:schemeClr>
-          </a:lnRef>
-          <a:fillRef idx="1">
-            <a:schemeClr val="accent1"/>
-          </a:fillRef>
-          <a:effectRef idx="0">
-            <a:schemeClr val="accent1"/>
-          </a:effectRef>
-          <a:fontRef idx="minor">
-            <a:schemeClr val="lt1"/>
-          </a:fontRef>
-        </p:style>
-        <p:txBody>
-          <a:bodyPr rtlCol="0" anchor="ctr"/>
-          <a:lstStyle/>
-          <a:p>
-            <a:pPr algn="ctr"/>
-            <a:endParaRPr lang="en-US" sz="1778"/>
-          </a:p>
-        </p:txBody>
-      </p:sp>
-      <p:sp>
-        <p:nvSpPr>
-          <p:cNvPr id="125" name="Rectangle: Rounded Corners 124"/>
-          <p:cNvSpPr/>
-          <p:nvPr/>
-        </p:nvSpPr>
-        <p:spPr>
-          <a:xfrm>
-            <a:off x="11871893" y="16543614"/>
-            <a:ext cx="6738269" cy="7322226"/>
-          </a:xfrm>
-          <a:prstGeom prst="roundRect">
-            <a:avLst/>
-          </a:prstGeom>
-          <a:noFill/>
-          <a:ln>
-            <a:solidFill>
-              <a:srgbClr val="BD0026"/>
-            </a:solidFill>
-          </a:ln>
-        </p:spPr>
-        <p:style>
-          <a:lnRef idx="2">
-            <a:schemeClr val="accent1">
-              <a:shade val="50000"/>
-            </a:schemeClr>
-          </a:lnRef>
-          <a:fillRef idx="1">
-            <a:schemeClr val="accent1"/>
-          </a:fillRef>
-          <a:effectRef idx="0">
-            <a:schemeClr val="accent1"/>
-          </a:effectRef>
-          <a:fontRef idx="minor">
-            <a:schemeClr val="lt1"/>
-          </a:fontRef>
-        </p:style>
-        <p:txBody>
-          <a:bodyPr rtlCol="0" anchor="ctr"/>
-          <a:lstStyle/>
-          <a:p>
-            <a:pPr algn="ctr"/>
-            <a:endParaRPr lang="en-US" sz="1778"/>
-          </a:p>
-        </p:txBody>
-      </p:sp>
-      <p:sp>
-        <p:nvSpPr>
-          <p:cNvPr id="127" name="Rectangle: Rounded Corners 126"/>
-          <p:cNvSpPr/>
-          <p:nvPr/>
-        </p:nvSpPr>
-        <p:spPr>
-          <a:xfrm>
-            <a:off x="1226367" y="31754989"/>
-            <a:ext cx="28034432" cy="10063571"/>
-          </a:xfrm>
-          <a:prstGeom prst="roundRect">
-            <a:avLst/>
-          </a:prstGeom>
-          <a:noFill/>
-          <a:ln>
-            <a:solidFill>
-              <a:srgbClr val="BD0026"/>
-            </a:solidFill>
-          </a:ln>
-        </p:spPr>
-        <p:style>
-          <a:lnRef idx="2">
-            <a:schemeClr val="accent1">
-              <a:shade val="50000"/>
-            </a:schemeClr>
-          </a:lnRef>
-          <a:fillRef idx="1">
-            <a:schemeClr val="accent1"/>
-          </a:fillRef>
-          <a:effectRef idx="0">
-            <a:schemeClr val="accent1"/>
-          </a:effectRef>
-          <a:fontRef idx="minor">
-            <a:schemeClr val="lt1"/>
-          </a:fontRef>
-        </p:style>
-        <p:txBody>
-          <a:bodyPr rtlCol="0" anchor="ctr"/>
-          <a:lstStyle/>
-          <a:p>
-            <a:pPr algn="ctr"/>
-            <a:endParaRPr lang="en-US" sz="1778"/>
-          </a:p>
-        </p:txBody>
-      </p:sp>
-      <p:sp>
-        <p:nvSpPr>
-          <p:cNvPr id="135" name="Rectangle 134"/>
-          <p:cNvSpPr/>
-          <p:nvPr/>
-        </p:nvSpPr>
-        <p:spPr>
-          <a:xfrm>
-            <a:off x="3245424" y="9086401"/>
-            <a:ext cx="4906800" cy="895990"/>
-          </a:xfrm>
-          <a:prstGeom prst="rect">
-            <a:avLst/>
-          </a:prstGeom>
-          <a:solidFill>
-            <a:srgbClr val="C00000"/>
-          </a:solidFill>
-          <a:ln>
-            <a:solidFill>
-              <a:srgbClr val="C00000"/>
-            </a:solidFill>
-          </a:ln>
-        </p:spPr>
-        <p:style>
-          <a:lnRef idx="2">
-            <a:schemeClr val="accent1">
-              <a:shade val="50000"/>
-            </a:schemeClr>
-          </a:lnRef>
-          <a:fillRef idx="1">
-            <a:schemeClr val="accent1"/>
-          </a:fillRef>
-          <a:effectRef idx="0">
-            <a:schemeClr val="accent1"/>
-          </a:effectRef>
-          <a:fontRef idx="minor">
-            <a:schemeClr val="lt1"/>
-          </a:fontRef>
-        </p:style>
-        <p:txBody>
-          <a:bodyPr rtlCol="0" anchor="ctr"/>
-          <a:lstStyle/>
-          <a:p>
-            <a:pPr algn="ctr"/>
-            <a:r>
-              <a:rPr lang="en-US" sz="3970" smtClean="0">
-                <a:latin typeface="Avenir LT Std 35 Light" panose="020B0402020203020204" pitchFamily="34" charset="0"/>
-              </a:rPr>
-              <a:t>General stats</a:t>
-            </a:r>
-            <a:endParaRPr lang="en-US" sz="3970" dirty="0">
-              <a:latin typeface="Avenir LT Std 35 Light" panose="020B0402020203020204" pitchFamily="34" charset="0"/>
-            </a:endParaRPr>
-          </a:p>
-        </p:txBody>
-      </p:sp>
-      <p:sp>
-        <p:nvSpPr>
-          <p:cNvPr id="138" name="Rectangle 137"/>
-          <p:cNvSpPr/>
-          <p:nvPr/>
-        </p:nvSpPr>
-        <p:spPr>
-          <a:xfrm>
-            <a:off x="11871892" y="31754989"/>
-            <a:ext cx="6738269" cy="890882"/>
-          </a:xfrm>
-          <a:prstGeom prst="rect">
-            <a:avLst/>
-          </a:prstGeom>
-          <a:solidFill>
-            <a:srgbClr val="C00000"/>
-          </a:solidFill>
-          <a:ln>
-            <a:solidFill>
-              <a:srgbClr val="C00000"/>
-            </a:solidFill>
-          </a:ln>
-        </p:spPr>
-        <p:style>
-          <a:lnRef idx="2">
-            <a:schemeClr val="accent1">
-              <a:shade val="50000"/>
-            </a:schemeClr>
-          </a:lnRef>
-          <a:fillRef idx="1">
-            <a:schemeClr val="accent1"/>
-          </a:fillRef>
-          <a:effectRef idx="0">
-            <a:schemeClr val="accent1"/>
-          </a:effectRef>
-          <a:fontRef idx="minor">
-            <a:schemeClr val="lt1"/>
-          </a:fontRef>
-        </p:style>
-        <p:txBody>
-          <a:bodyPr rtlCol="0" anchor="ctr"/>
-          <a:lstStyle/>
-          <a:p>
-            <a:pPr algn="ctr"/>
-            <a:r>
-              <a:rPr lang="en-US" sz="3970" dirty="0" smtClean="0">
-                <a:latin typeface="Avenir LT Std 35 Light" panose="020B0402020203020204" pitchFamily="34" charset="0"/>
-              </a:rPr>
-              <a:t>Song story</a:t>
-            </a:r>
-            <a:endParaRPr lang="en-US" sz="3970" dirty="0">
-              <a:latin typeface="Avenir LT Std 35 Light" panose="020B0402020203020204" pitchFamily="34" charset="0"/>
-            </a:endParaRPr>
-          </a:p>
-        </p:txBody>
-      </p:sp>
       <p:pic>
         <p:nvPicPr>
-          <p:cNvPr id="44" name="Image 43"/>
+          <p:cNvPr id="23" name="Picture 22"/>
           <p:cNvPicPr>
             <a:picLocks noChangeAspect="1"/>
           </p:cNvPicPr>
@@ -3552,66 +3017,31 @@
         </p:blipFill>
         <p:spPr>
           <a:xfrm>
-            <a:off x="20970329" y="16421148"/>
-            <a:ext cx="7624800" cy="4244368"/>
+            <a:off x="1226366" y="834761"/>
+            <a:ext cx="5469400" cy="2277458"/>
           </a:xfrm>
           <a:prstGeom prst="rect">
             <a:avLst/>
           </a:prstGeom>
         </p:spPr>
       </p:pic>
-      <p:pic>
-        <p:nvPicPr>
-          <p:cNvPr id="38" name="Image 37"/>
-          <p:cNvPicPr>
-            <a:picLocks noChangeAspect="1"/>
-          </p:cNvPicPr>
+      <p:sp>
+        <p:nvSpPr>
+          <p:cNvPr id="28" name="Rectangle: Single Corner Snipped 27"/>
+          <p:cNvSpPr/>
           <p:nvPr/>
-        </p:nvPicPr>
-        <p:blipFill rotWithShape="1">
-          <a:blip r:embed="rId4">
-            <a:extLst>
-              <a:ext uri="{28A0092B-C50C-407E-A947-70E740481C1C}">
-                <a14:useLocalDpi xmlns:a14="http://schemas.microsoft.com/office/drawing/2010/main" val="0"/>
-              </a:ext>
-            </a:extLst>
-          </a:blip>
-          <a:srcRect l="16113" r="15034"/>
-          <a:stretch/>
-        </p:blipFill>
-        <p:spPr>
-          <a:xfrm>
-            <a:off x="2213189" y="26080939"/>
-            <a:ext cx="7561944" cy="4654800"/>
-          </a:xfrm>
-          <a:prstGeom prst="rect">
+        </p:nvSpPr>
+        <p:spPr>
+          <a:xfrm>
+            <a:off x="7181440" y="961511"/>
+            <a:ext cx="8628831" cy="1080769"/>
+          </a:xfrm>
+          <a:prstGeom prst="snip1Rect">
             <a:avLst/>
           </a:prstGeom>
-          <a:ln>
-            <a:noFill/>
-          </a:ln>
-        </p:spPr>
-      </p:pic>
-      <p:sp>
-        <p:nvSpPr>
-          <p:cNvPr id="116" name="Rectangle: Rounded Corners 124"/>
-          <p:cNvSpPr/>
-          <p:nvPr/>
-        </p:nvSpPr>
-        <p:spPr>
-          <a:xfrm>
-            <a:off x="10471355" y="9086401"/>
-            <a:ext cx="18789444" cy="6236615"/>
-          </a:xfrm>
-          <a:prstGeom prst="roundRect">
-            <a:avLst/>
-          </a:prstGeom>
-          <a:noFill/>
-          <a:ln>
-            <a:solidFill>
-              <a:srgbClr val="BD0026"/>
-            </a:solidFill>
-          </a:ln>
+          <a:solidFill>
+            <a:srgbClr val="BD0026"/>
+          </a:solidFill>
         </p:spPr>
         <p:style>
           <a:lnRef idx="2">
@@ -3633,29 +3063,38 @@
           <a:bodyPr rtlCol="0" anchor="ctr"/>
           <a:lstStyle/>
           <a:p>
-            <a:pPr algn="ctr"/>
-            <a:endParaRPr lang="en-US" sz="1778"/>
-          </a:p>
-        </p:txBody>
-      </p:sp>
-      <p:sp>
-        <p:nvSpPr>
-          <p:cNvPr id="117" name="Rectangle: Rounded Corners 124"/>
+            <a:r>
+              <a:rPr lang="en-US" sz="3970" b="1" dirty="0" smtClean="0">
+                <a:latin typeface="Avenir LT Std 35 Light" panose="020B0402020203020204" pitchFamily="34" charset="0"/>
+              </a:rPr>
+              <a:t>Applied Data Analysis Project 2017</a:t>
+            </a:r>
+            <a:endParaRPr lang="en-US" sz="3970" b="1" dirty="0">
+              <a:latin typeface="Avenir LT Std 35 Light" panose="020B0402020203020204" pitchFamily="34" charset="0"/>
+            </a:endParaRPr>
+          </a:p>
+        </p:txBody>
+      </p:sp>
+      <p:sp>
+        <p:nvSpPr>
+          <p:cNvPr id="29" name="Rectangle: Single Corner Snipped 28"/>
           <p:cNvSpPr/>
           <p:nvPr/>
         </p:nvSpPr>
         <p:spPr>
           <a:xfrm>
-            <a:off x="1226366" y="9086401"/>
-            <a:ext cx="8944917" cy="15774278"/>
-          </a:xfrm>
-          <a:prstGeom prst="roundRect">
+            <a:off x="7181440" y="2042280"/>
+            <a:ext cx="9572726" cy="1040805"/>
+          </a:xfrm>
+          <a:prstGeom prst="snip1Rect">
             <a:avLst/>
           </a:prstGeom>
-          <a:noFill/>
+          <a:solidFill>
+            <a:srgbClr val="FF4747"/>
+          </a:solidFill>
           <a:ln>
             <a:solidFill>
-              <a:srgbClr val="BD0026"/>
+              <a:srgbClr val="C00000"/>
             </a:solidFill>
           </a:ln>
         </p:spPr>
@@ -3679,21 +3118,148 @@
           <a:bodyPr rtlCol="0" anchor="ctr"/>
           <a:lstStyle/>
           <a:p>
-            <a:pPr algn="ctr"/>
-            <a:endParaRPr lang="en-US" sz="1778"/>
-          </a:p>
-        </p:txBody>
-      </p:sp>
-      <p:sp>
-        <p:nvSpPr>
-          <p:cNvPr id="118" name="Rectangle: Rounded Corners 124"/>
+            <a:r>
+              <a:rPr lang="en-US" sz="3176" dirty="0" smtClean="0">
+                <a:latin typeface="Avenir LT Std 35 Light" panose="020B0402020203020204" pitchFamily="34" charset="0"/>
+              </a:rPr>
+              <a:t>Pierre-Antoine Desplaces</a:t>
+            </a:r>
+            <a:r>
+              <a:rPr lang="en-US" sz="3176" dirty="0">
+                <a:latin typeface="Avenir LT Std 35 Light" panose="020B0402020203020204" pitchFamily="34" charset="0"/>
+              </a:rPr>
+              <a:t>, </a:t>
+            </a:r>
+            <a:r>
+              <a:rPr lang="en-US" sz="3176" dirty="0" err="1">
+                <a:latin typeface="Avenir LT Std 35 Light" panose="020B0402020203020204" pitchFamily="34" charset="0"/>
+              </a:rPr>
+              <a:t>Anaïs</a:t>
+            </a:r>
+            <a:r>
+              <a:rPr lang="en-US" sz="3176" dirty="0">
+                <a:latin typeface="Avenir LT Std 35 Light" panose="020B0402020203020204" pitchFamily="34" charset="0"/>
+              </a:rPr>
+              <a:t> </a:t>
+            </a:r>
+            <a:r>
+              <a:rPr lang="en-US" sz="3176" dirty="0" err="1">
+                <a:latin typeface="Avenir LT Std 35 Light" panose="020B0402020203020204" pitchFamily="34" charset="0"/>
+              </a:rPr>
+              <a:t>Ladoy</a:t>
+            </a:r>
+            <a:r>
+              <a:rPr lang="en-US" sz="3176" dirty="0">
+                <a:latin typeface="Avenir LT Std 35 Light" panose="020B0402020203020204" pitchFamily="34" charset="0"/>
+              </a:rPr>
+              <a:t>, Lou </a:t>
+            </a:r>
+            <a:r>
+              <a:rPr lang="en-US" sz="3176" dirty="0" smtClean="0">
+                <a:latin typeface="Avenir LT Std 35 Light" panose="020B0402020203020204" pitchFamily="34" charset="0"/>
+              </a:rPr>
+              <a:t>Richard</a:t>
+            </a:r>
+            <a:endParaRPr lang="en-US" sz="3176" dirty="0">
+              <a:latin typeface="Avenir LT Std 35 Light" panose="020B0402020203020204" pitchFamily="34" charset="0"/>
+            </a:endParaRPr>
+          </a:p>
+        </p:txBody>
+      </p:sp>
+      <p:sp>
+        <p:nvSpPr>
+          <p:cNvPr id="30" name="Rectangle: Diagonal Corners Snipped 29"/>
           <p:cNvSpPr/>
           <p:nvPr/>
         </p:nvSpPr>
         <p:spPr>
           <a:xfrm>
-            <a:off x="1226366" y="25092192"/>
-            <a:ext cx="18789444" cy="6236615"/>
+            <a:off x="1226369" y="3387885"/>
+            <a:ext cx="28034430" cy="1647590"/>
+          </a:xfrm>
+          <a:prstGeom prst="snip2DiagRect">
+            <a:avLst/>
+          </a:prstGeom>
+          <a:ln w="28575">
+            <a:solidFill>
+              <a:srgbClr val="C00000"/>
+            </a:solidFill>
+          </a:ln>
+        </p:spPr>
+        <p:style>
+          <a:lnRef idx="2">
+            <a:schemeClr val="dk1"/>
+          </a:lnRef>
+          <a:fillRef idx="1">
+            <a:schemeClr val="lt1"/>
+          </a:fillRef>
+          <a:effectRef idx="0">
+            <a:schemeClr val="dk1"/>
+          </a:effectRef>
+          <a:fontRef idx="minor">
+            <a:schemeClr val="dk1"/>
+          </a:fontRef>
+        </p:style>
+        <p:txBody>
+          <a:bodyPr rtlCol="0" anchor="ctr"/>
+          <a:lstStyle/>
+          <a:p>
+            <a:pPr algn="ctr"/>
+            <a:endParaRPr lang="en-US" sz="7146" b="1" dirty="0" smtClean="0">
+              <a:solidFill>
+                <a:srgbClr val="BD0026"/>
+              </a:solidFill>
+              <a:latin typeface="Avenir LT Std 35 Light" panose="020B0402020203020204" pitchFamily="34" charset="0"/>
+            </a:endParaRPr>
+          </a:p>
+          <a:p>
+            <a:pPr algn="ctr"/>
+            <a:r>
+              <a:rPr lang="en-US" sz="7146" b="1" i="1" dirty="0" smtClean="0">
+                <a:solidFill>
+                  <a:srgbClr val="7E0018"/>
+                </a:solidFill>
+                <a:latin typeface="Avenir LT Std 35 Light" panose="020B0402020203020204" pitchFamily="34" charset="0"/>
+              </a:rPr>
+              <a:t>My Way </a:t>
+            </a:r>
+            <a:r>
+              <a:rPr lang="en-US" sz="7146" b="1" dirty="0" smtClean="0">
+                <a:solidFill>
+                  <a:srgbClr val="7E0018"/>
+                </a:solidFill>
+                <a:latin typeface="Avenir LT Std 35 Light" panose="020B0402020203020204" pitchFamily="34" charset="0"/>
+              </a:rPr>
+              <a:t>of seeing covers</a:t>
+            </a:r>
+            <a:endParaRPr lang="en-US" sz="7146" b="1" dirty="0" smtClean="0">
+              <a:solidFill>
+                <a:srgbClr val="7E0018"/>
+              </a:solidFill>
+              <a:latin typeface="Avenir LT Std 35 Light" panose="020B0402020203020204" pitchFamily="34" charset="0"/>
+            </a:endParaRPr>
+          </a:p>
+          <a:p>
+            <a:pPr algn="ctr"/>
+            <a:endParaRPr lang="en-US" sz="7146" b="1" dirty="0">
+              <a:solidFill>
+                <a:srgbClr val="BD0026"/>
+              </a:solidFill>
+              <a:latin typeface="Avenir LT Std 35 Light" panose="020B0402020203020204" pitchFamily="34" charset="0"/>
+            </a:endParaRPr>
+          </a:p>
+        </p:txBody>
+      </p:sp>
+      <p:sp>
+        <p:nvSpPr>
+          <p:cNvPr id="124" name="Rectangle: Rounded Corners 123"/>
+          <p:cNvSpPr/>
+          <p:nvPr/>
+        </p:nvSpPr>
+        <p:spPr>
+          <a:xfrm>
+            <a:off x="1226367" y="5245543"/>
+            <a:ext cx="28034432" cy="3414676"/>
           </a:xfrm>
           <a:prstGeom prst="roundRect">
             <a:avLst/>
@@ -3726,20 +3292,20 @@
           <a:lstStyle/>
           <a:p>
             <a:pPr algn="ctr"/>
-            <a:endParaRPr lang="en-US" sz="1778"/>
-          </a:p>
-        </p:txBody>
-      </p:sp>
-      <p:sp>
-        <p:nvSpPr>
-          <p:cNvPr id="119" name="Rectangle: Rounded Corners 124"/>
+            <a:endParaRPr lang="en-US" sz="1778" dirty="0"/>
+          </a:p>
+        </p:txBody>
+      </p:sp>
+      <p:sp>
+        <p:nvSpPr>
+          <p:cNvPr id="125" name="Rectangle: Rounded Corners 124"/>
           <p:cNvSpPr/>
           <p:nvPr/>
         </p:nvSpPr>
         <p:spPr>
           <a:xfrm>
-            <a:off x="20310772" y="15621026"/>
-            <a:ext cx="8944917" cy="15662797"/>
+            <a:off x="11871893" y="16543614"/>
+            <a:ext cx="6738269" cy="7322226"/>
           </a:xfrm>
           <a:prstGeom prst="roundRect">
             <a:avLst/>
@@ -3772,30 +3338,28 @@
           <a:lstStyle/>
           <a:p>
             <a:pPr algn="ctr"/>
-            <a:endParaRPr lang="en-US" sz="1778"/>
-          </a:p>
-        </p:txBody>
-      </p:sp>
-      <p:sp>
-        <p:nvSpPr>
-          <p:cNvPr id="121" name="Rectangle 120"/>
+            <a:endParaRPr lang="en-US" sz="1778" dirty="0"/>
+          </a:p>
+        </p:txBody>
+      </p:sp>
+      <p:sp>
+        <p:nvSpPr>
+          <p:cNvPr id="127" name="Rectangle: Rounded Corners 126"/>
           <p:cNvSpPr/>
           <p:nvPr/>
         </p:nvSpPr>
         <p:spPr>
           <a:xfrm>
-            <a:off x="17412677" y="9090640"/>
-            <a:ext cx="4906800" cy="895990"/>
-          </a:xfrm>
-          <a:prstGeom prst="rect">
+            <a:off x="1226367" y="31754989"/>
+            <a:ext cx="28034432" cy="10063571"/>
+          </a:xfrm>
+          <a:prstGeom prst="roundRect">
             <a:avLst/>
           </a:prstGeom>
-          <a:solidFill>
-            <a:srgbClr val="C00000"/>
-          </a:solidFill>
+          <a:noFill/>
           <a:ln>
             <a:solidFill>
-              <a:srgbClr val="C00000"/>
+              <a:srgbClr val="BD0026"/>
             </a:solidFill>
           </a:ln>
         </p:spPr>
@@ -3820,27 +3384,19 @@
           <a:lstStyle/>
           <a:p>
             <a:pPr algn="ctr"/>
-            <a:r>
-              <a:rPr lang="en-US" sz="3970" dirty="0" smtClean="0">
-                <a:latin typeface="Avenir LT Std 35 Light" panose="020B0402020203020204" pitchFamily="34" charset="0"/>
-              </a:rPr>
-              <a:t>Location</a:t>
-            </a:r>
-            <a:endParaRPr lang="en-US" sz="3970" dirty="0">
-              <a:latin typeface="Avenir LT Std 35 Light" panose="020B0402020203020204" pitchFamily="34" charset="0"/>
-            </a:endParaRPr>
-          </a:p>
-        </p:txBody>
-      </p:sp>
-      <p:sp>
-        <p:nvSpPr>
-          <p:cNvPr id="123" name="Rectangle 122"/>
+            <a:endParaRPr lang="en-US" sz="1778" dirty="0"/>
+          </a:p>
+        </p:txBody>
+      </p:sp>
+      <p:sp>
+        <p:nvSpPr>
+          <p:cNvPr id="135" name="Rectangle 134"/>
           <p:cNvSpPr/>
           <p:nvPr/>
         </p:nvSpPr>
         <p:spPr>
           <a:xfrm>
-            <a:off x="22334940" y="15647624"/>
+            <a:off x="3245424" y="9086401"/>
             <a:ext cx="4906800" cy="895990"/>
           </a:xfrm>
           <a:prstGeom prst="rect">
@@ -3880,7 +3436,7 @@
               <a:rPr lang="en-US" sz="3970" dirty="0" smtClean="0">
                 <a:latin typeface="Avenir LT Std 35 Light" panose="020B0402020203020204" pitchFamily="34" charset="0"/>
               </a:rPr>
-              <a:t>Time</a:t>
+              <a:t>General stats</a:t>
             </a:r>
             <a:endParaRPr lang="en-US" sz="3970" dirty="0">
               <a:latin typeface="Avenir LT Std 35 Light" panose="020B0402020203020204" pitchFamily="34" charset="0"/>
@@ -3890,14 +3446,14 @@
       </p:sp>
       <p:sp>
         <p:nvSpPr>
-          <p:cNvPr id="128" name="Rectangle 127"/>
+          <p:cNvPr id="138" name="Rectangle 137"/>
           <p:cNvSpPr/>
           <p:nvPr/>
         </p:nvSpPr>
         <p:spPr>
           <a:xfrm>
-            <a:off x="8167688" y="25092192"/>
-            <a:ext cx="4906800" cy="895990"/>
+            <a:off x="11871892" y="31754989"/>
+            <a:ext cx="6738269" cy="890882"/>
           </a:xfrm>
           <a:prstGeom prst="rect">
             <a:avLst/>
@@ -3936,7 +3492,7 @@
               <a:rPr lang="en-US" sz="3970" dirty="0" smtClean="0">
                 <a:latin typeface="Avenir LT Std 35 Light" panose="020B0402020203020204" pitchFamily="34" charset="0"/>
               </a:rPr>
-              <a:t>Genres</a:t>
+              <a:t>Song story</a:t>
             </a:r>
             <a:endParaRPr lang="en-US" sz="3970" dirty="0">
               <a:latin typeface="Avenir LT Std 35 Light" panose="020B0402020203020204" pitchFamily="34" charset="0"/>
@@ -3946,181 +3502,14 @@
       </p:sp>
       <p:pic>
         <p:nvPicPr>
-          <p:cNvPr id="129" name="Shape 71"/>
-          <p:cNvPicPr preferRelativeResize="0"/>
-          <p:nvPr/>
-        </p:nvPicPr>
-        <p:blipFill>
-          <a:blip r:embed="rId5">
-            <a:alphaModFix/>
-          </a:blip>
-          <a:stretch>
-            <a:fillRect/>
-          </a:stretch>
-        </p:blipFill>
-        <p:spPr>
-          <a:xfrm>
-            <a:off x="27241740" y="961511"/>
-            <a:ext cx="2019059" cy="2150708"/>
-          </a:xfrm>
-          <a:prstGeom prst="rect">
-            <a:avLst/>
-          </a:prstGeom>
-          <a:noFill/>
-          <a:ln>
-            <a:noFill/>
-          </a:ln>
-        </p:spPr>
-      </p:pic>
-      <p:sp>
-        <p:nvSpPr>
-          <p:cNvPr id="130" name="ZoneTexte 129"/>
-          <p:cNvSpPr txBox="1"/>
-          <p:nvPr/>
-        </p:nvSpPr>
-        <p:spPr>
-          <a:xfrm>
-            <a:off x="4397515" y="25557719"/>
-            <a:ext cx="2765753" cy="461665"/>
-          </a:xfrm>
-          <a:prstGeom prst="rect">
-            <a:avLst/>
-          </a:prstGeom>
-          <a:noFill/>
-        </p:spPr>
-        <p:txBody>
-          <a:bodyPr wrap="square" rtlCol="0">
-            <a:spAutoFit/>
-          </a:bodyPr>
-          <a:lstStyle/>
-          <a:p>
-            <a:pPr algn="ctr"/>
-            <a:r>
-              <a:rPr lang="fr-FR" sz="2400" dirty="0" smtClean="0">
-                <a:latin typeface="Avenir Book" charset="0"/>
-                <a:ea typeface="Avenir Book" charset="0"/>
-                <a:cs typeface="Avenir Book" charset="0"/>
-              </a:rPr>
-              <a:t>For </a:t>
-            </a:r>
-            <a:r>
-              <a:rPr lang="fr-FR" sz="2400" dirty="0" err="1" smtClean="0">
-                <a:latin typeface="Avenir Book" charset="0"/>
-                <a:ea typeface="Avenir Book" charset="0"/>
-                <a:cs typeface="Avenir Book" charset="0"/>
-              </a:rPr>
-              <a:t>cover</a:t>
-            </a:r>
-            <a:r>
-              <a:rPr lang="fr-FR" sz="2400" dirty="0" smtClean="0">
-                <a:latin typeface="Avenir Book" charset="0"/>
-                <a:ea typeface="Avenir Book" charset="0"/>
-                <a:cs typeface="Avenir Book" charset="0"/>
-              </a:rPr>
-              <a:t> </a:t>
-            </a:r>
-            <a:r>
-              <a:rPr lang="fr-FR" sz="2400" dirty="0" err="1" smtClean="0">
-                <a:latin typeface="Avenir Book" charset="0"/>
-                <a:ea typeface="Avenir Book" charset="0"/>
-                <a:cs typeface="Avenir Book" charset="0"/>
-              </a:rPr>
-              <a:t>songs</a:t>
-            </a:r>
-            <a:endParaRPr lang="fr-FR" sz="2400" dirty="0">
-              <a:latin typeface="Avenir Book" charset="0"/>
-              <a:ea typeface="Avenir Book" charset="0"/>
-              <a:cs typeface="Avenir Book" charset="0"/>
-            </a:endParaRPr>
-          </a:p>
-        </p:txBody>
-      </p:sp>
-      <p:pic>
-        <p:nvPicPr>
-          <p:cNvPr id="41" name="Image 40"/>
-          <p:cNvPicPr>
-            <a:picLocks noChangeAspect="1"/>
-          </p:cNvPicPr>
-          <p:nvPr/>
-        </p:nvPicPr>
-        <p:blipFill rotWithShape="1">
-          <a:blip r:embed="rId6">
-            <a:extLst>
-              <a:ext uri="{28A0092B-C50C-407E-A947-70E740481C1C}">
-                <a14:useLocalDpi xmlns:a14="http://schemas.microsoft.com/office/drawing/2010/main" val="0"/>
-              </a:ext>
-            </a:extLst>
-          </a:blip>
-          <a:srcRect l="10103" r="13830"/>
-          <a:stretch/>
-        </p:blipFill>
-        <p:spPr>
-          <a:xfrm>
-            <a:off x="11063905" y="26080939"/>
-            <a:ext cx="8354242" cy="4654800"/>
-          </a:xfrm>
-          <a:prstGeom prst="rect">
-            <a:avLst/>
-          </a:prstGeom>
-        </p:spPr>
-      </p:pic>
-      <p:sp>
-        <p:nvSpPr>
-          <p:cNvPr id="131" name="ZoneTexte 130"/>
-          <p:cNvSpPr txBox="1"/>
-          <p:nvPr/>
-        </p:nvSpPr>
-        <p:spPr>
-          <a:xfrm>
-            <a:off x="14078908" y="25560750"/>
-            <a:ext cx="3126240" cy="461665"/>
-          </a:xfrm>
-          <a:prstGeom prst="rect">
-            <a:avLst/>
-          </a:prstGeom>
-          <a:noFill/>
-        </p:spPr>
-        <p:txBody>
-          <a:bodyPr wrap="square" rtlCol="0">
-            <a:spAutoFit/>
-          </a:bodyPr>
-          <a:lstStyle/>
-          <a:p>
-            <a:pPr algn="ctr"/>
-            <a:r>
-              <a:rPr lang="fr-FR" sz="2400" dirty="0" smtClean="0">
-                <a:latin typeface="Avenir Book" charset="0"/>
-                <a:ea typeface="Avenir Book" charset="0"/>
-                <a:cs typeface="Avenir Book" charset="0"/>
-              </a:rPr>
-              <a:t>For original </a:t>
-            </a:r>
-            <a:r>
-              <a:rPr lang="fr-FR" sz="2400" dirty="0" err="1" smtClean="0">
-                <a:latin typeface="Avenir Book" charset="0"/>
-                <a:ea typeface="Avenir Book" charset="0"/>
-                <a:cs typeface="Avenir Book" charset="0"/>
-              </a:rPr>
-              <a:t>songs</a:t>
-            </a:r>
-            <a:endParaRPr lang="fr-FR" sz="2400" dirty="0">
-              <a:latin typeface="Avenir Book" charset="0"/>
-              <a:ea typeface="Avenir Book" charset="0"/>
-              <a:cs typeface="Avenir Book" charset="0"/>
-            </a:endParaRPr>
-          </a:p>
-        </p:txBody>
-      </p:sp>
-      <p:pic>
-        <p:nvPicPr>
-          <p:cNvPr id="45" name="Image 44"/>
+          <p:cNvPr id="44" name="Image 43"/>
           <p:cNvPicPr>
             <a:picLocks noChangeAspect="1"/>
           </p:cNvPicPr>
           <p:nvPr/>
         </p:nvPicPr>
         <p:blipFill>
-          <a:blip r:embed="rId7">
+          <a:blip r:embed="rId4">
             <a:extLst>
               <a:ext uri="{28A0092B-C50C-407E-A947-70E740481C1C}">
                 <a14:useLocalDpi xmlns:a14="http://schemas.microsoft.com/office/drawing/2010/main" val="0"/>
@@ -4133,7 +3522,7 @@
         </p:blipFill>
         <p:spPr>
           <a:xfrm>
-            <a:off x="20970329" y="20675017"/>
+            <a:off x="20970329" y="16421148"/>
             <a:ext cx="7624800" cy="4244368"/>
           </a:xfrm>
           <a:prstGeom prst="rect">
@@ -4143,7 +3532,526 @@
       </p:pic>
       <p:pic>
         <p:nvPicPr>
-          <p:cNvPr id="46" name="Image 45"/>
+          <p:cNvPr id="38" name="Image 37"/>
+          <p:cNvPicPr>
+            <a:picLocks noChangeAspect="1"/>
+          </p:cNvPicPr>
+          <p:nvPr/>
+        </p:nvPicPr>
+        <p:blipFill rotWithShape="1">
+          <a:blip r:embed="rId5">
+            <a:extLst>
+              <a:ext uri="{28A0092B-C50C-407E-A947-70E740481C1C}">
+                <a14:useLocalDpi xmlns:a14="http://schemas.microsoft.com/office/drawing/2010/main" val="0"/>
+              </a:ext>
+            </a:extLst>
+          </a:blip>
+          <a:srcRect l="16113" r="15034"/>
+          <a:stretch/>
+        </p:blipFill>
+        <p:spPr>
+          <a:xfrm>
+            <a:off x="2213189" y="26080939"/>
+            <a:ext cx="7561944" cy="4654800"/>
+          </a:xfrm>
+          <a:prstGeom prst="rect">
+            <a:avLst/>
+          </a:prstGeom>
+          <a:ln>
+            <a:noFill/>
+          </a:ln>
+        </p:spPr>
+      </p:pic>
+      <p:sp>
+        <p:nvSpPr>
+          <p:cNvPr id="116" name="Rectangle: Rounded Corners 124"/>
+          <p:cNvSpPr/>
+          <p:nvPr/>
+        </p:nvSpPr>
+        <p:spPr>
+          <a:xfrm>
+            <a:off x="10471355" y="9086401"/>
+            <a:ext cx="18789444" cy="6236615"/>
+          </a:xfrm>
+          <a:prstGeom prst="roundRect">
+            <a:avLst/>
+          </a:prstGeom>
+          <a:noFill/>
+          <a:ln>
+            <a:solidFill>
+              <a:srgbClr val="BD0026"/>
+            </a:solidFill>
+          </a:ln>
+        </p:spPr>
+        <p:style>
+          <a:lnRef idx="2">
+            <a:schemeClr val="accent1">
+              <a:shade val="50000"/>
+            </a:schemeClr>
+          </a:lnRef>
+          <a:fillRef idx="1">
+            <a:schemeClr val="accent1"/>
+          </a:fillRef>
+          <a:effectRef idx="0">
+            <a:schemeClr val="accent1"/>
+          </a:effectRef>
+          <a:fontRef idx="minor">
+            <a:schemeClr val="lt1"/>
+          </a:fontRef>
+        </p:style>
+        <p:txBody>
+          <a:bodyPr rtlCol="0" anchor="ctr"/>
+          <a:lstStyle/>
+          <a:p>
+            <a:pPr algn="ctr"/>
+            <a:endParaRPr lang="en-US" sz="1778" dirty="0"/>
+          </a:p>
+        </p:txBody>
+      </p:sp>
+      <p:sp>
+        <p:nvSpPr>
+          <p:cNvPr id="117" name="Rectangle: Rounded Corners 124"/>
+          <p:cNvSpPr/>
+          <p:nvPr/>
+        </p:nvSpPr>
+        <p:spPr>
+          <a:xfrm>
+            <a:off x="1226366" y="9086401"/>
+            <a:ext cx="8944917" cy="15774278"/>
+          </a:xfrm>
+          <a:prstGeom prst="roundRect">
+            <a:avLst/>
+          </a:prstGeom>
+          <a:noFill/>
+          <a:ln>
+            <a:solidFill>
+              <a:srgbClr val="BD0026"/>
+            </a:solidFill>
+          </a:ln>
+        </p:spPr>
+        <p:style>
+          <a:lnRef idx="2">
+            <a:schemeClr val="accent1">
+              <a:shade val="50000"/>
+            </a:schemeClr>
+          </a:lnRef>
+          <a:fillRef idx="1">
+            <a:schemeClr val="accent1"/>
+          </a:fillRef>
+          <a:effectRef idx="0">
+            <a:schemeClr val="accent1"/>
+          </a:effectRef>
+          <a:fontRef idx="minor">
+            <a:schemeClr val="lt1"/>
+          </a:fontRef>
+        </p:style>
+        <p:txBody>
+          <a:bodyPr rtlCol="0" anchor="ctr"/>
+          <a:lstStyle/>
+          <a:p>
+            <a:pPr algn="ctr"/>
+            <a:endParaRPr lang="en-US" sz="1778" dirty="0"/>
+          </a:p>
+        </p:txBody>
+      </p:sp>
+      <p:sp>
+        <p:nvSpPr>
+          <p:cNvPr id="118" name="Rectangle: Rounded Corners 124"/>
+          <p:cNvSpPr/>
+          <p:nvPr/>
+        </p:nvSpPr>
+        <p:spPr>
+          <a:xfrm>
+            <a:off x="1226366" y="25092192"/>
+            <a:ext cx="18789444" cy="6236615"/>
+          </a:xfrm>
+          <a:prstGeom prst="roundRect">
+            <a:avLst/>
+          </a:prstGeom>
+          <a:noFill/>
+          <a:ln>
+            <a:solidFill>
+              <a:srgbClr val="BD0026"/>
+            </a:solidFill>
+          </a:ln>
+        </p:spPr>
+        <p:style>
+          <a:lnRef idx="2">
+            <a:schemeClr val="accent1">
+              <a:shade val="50000"/>
+            </a:schemeClr>
+          </a:lnRef>
+          <a:fillRef idx="1">
+            <a:schemeClr val="accent1"/>
+          </a:fillRef>
+          <a:effectRef idx="0">
+            <a:schemeClr val="accent1"/>
+          </a:effectRef>
+          <a:fontRef idx="minor">
+            <a:schemeClr val="lt1"/>
+          </a:fontRef>
+        </p:style>
+        <p:txBody>
+          <a:bodyPr rtlCol="0" anchor="ctr"/>
+          <a:lstStyle/>
+          <a:p>
+            <a:pPr algn="ctr"/>
+            <a:endParaRPr lang="en-US" sz="1778" dirty="0"/>
+          </a:p>
+        </p:txBody>
+      </p:sp>
+      <p:sp>
+        <p:nvSpPr>
+          <p:cNvPr id="119" name="Rectangle: Rounded Corners 124"/>
+          <p:cNvSpPr/>
+          <p:nvPr/>
+        </p:nvSpPr>
+        <p:spPr>
+          <a:xfrm>
+            <a:off x="20310772" y="15621026"/>
+            <a:ext cx="8944917" cy="15662797"/>
+          </a:xfrm>
+          <a:prstGeom prst="roundRect">
+            <a:avLst/>
+          </a:prstGeom>
+          <a:noFill/>
+          <a:ln>
+            <a:solidFill>
+              <a:srgbClr val="BD0026"/>
+            </a:solidFill>
+          </a:ln>
+        </p:spPr>
+        <p:style>
+          <a:lnRef idx="2">
+            <a:schemeClr val="accent1">
+              <a:shade val="50000"/>
+            </a:schemeClr>
+          </a:lnRef>
+          <a:fillRef idx="1">
+            <a:schemeClr val="accent1"/>
+          </a:fillRef>
+          <a:effectRef idx="0">
+            <a:schemeClr val="accent1"/>
+          </a:effectRef>
+          <a:fontRef idx="minor">
+            <a:schemeClr val="lt1"/>
+          </a:fontRef>
+        </p:style>
+        <p:txBody>
+          <a:bodyPr rtlCol="0" anchor="ctr"/>
+          <a:lstStyle/>
+          <a:p>
+            <a:pPr algn="ctr"/>
+            <a:endParaRPr lang="en-US" sz="1778" dirty="0"/>
+          </a:p>
+        </p:txBody>
+      </p:sp>
+      <p:sp>
+        <p:nvSpPr>
+          <p:cNvPr id="121" name="Rectangle 120"/>
+          <p:cNvSpPr/>
+          <p:nvPr/>
+        </p:nvSpPr>
+        <p:spPr>
+          <a:xfrm>
+            <a:off x="17412677" y="9090640"/>
+            <a:ext cx="4906800" cy="895990"/>
+          </a:xfrm>
+          <a:prstGeom prst="rect">
+            <a:avLst/>
+          </a:prstGeom>
+          <a:solidFill>
+            <a:srgbClr val="C00000"/>
+          </a:solidFill>
+          <a:ln>
+            <a:solidFill>
+              <a:srgbClr val="C00000"/>
+            </a:solidFill>
+          </a:ln>
+        </p:spPr>
+        <p:style>
+          <a:lnRef idx="2">
+            <a:schemeClr val="accent1">
+              <a:shade val="50000"/>
+            </a:schemeClr>
+          </a:lnRef>
+          <a:fillRef idx="1">
+            <a:schemeClr val="accent1"/>
+          </a:fillRef>
+          <a:effectRef idx="0">
+            <a:schemeClr val="accent1"/>
+          </a:effectRef>
+          <a:fontRef idx="minor">
+            <a:schemeClr val="lt1"/>
+          </a:fontRef>
+        </p:style>
+        <p:txBody>
+          <a:bodyPr rtlCol="0" anchor="ctr"/>
+          <a:lstStyle/>
+          <a:p>
+            <a:pPr algn="ctr"/>
+            <a:r>
+              <a:rPr lang="en-US" sz="3970" dirty="0" smtClean="0">
+                <a:latin typeface="Avenir LT Std 35 Light" panose="020B0402020203020204" pitchFamily="34" charset="0"/>
+              </a:rPr>
+              <a:t>Location</a:t>
+            </a:r>
+            <a:endParaRPr lang="en-US" sz="3970" dirty="0">
+              <a:latin typeface="Avenir LT Std 35 Light" panose="020B0402020203020204" pitchFamily="34" charset="0"/>
+            </a:endParaRPr>
+          </a:p>
+        </p:txBody>
+      </p:sp>
+      <p:sp>
+        <p:nvSpPr>
+          <p:cNvPr id="123" name="Rectangle 122"/>
+          <p:cNvSpPr/>
+          <p:nvPr/>
+        </p:nvSpPr>
+        <p:spPr>
+          <a:xfrm>
+            <a:off x="22334940" y="15647624"/>
+            <a:ext cx="4906800" cy="895990"/>
+          </a:xfrm>
+          <a:prstGeom prst="rect">
+            <a:avLst/>
+          </a:prstGeom>
+          <a:solidFill>
+            <a:srgbClr val="C00000"/>
+          </a:solidFill>
+          <a:ln>
+            <a:solidFill>
+              <a:srgbClr val="C00000"/>
+            </a:solidFill>
+          </a:ln>
+        </p:spPr>
+        <p:style>
+          <a:lnRef idx="2">
+            <a:schemeClr val="accent1">
+              <a:shade val="50000"/>
+            </a:schemeClr>
+          </a:lnRef>
+          <a:fillRef idx="1">
+            <a:schemeClr val="accent1"/>
+          </a:fillRef>
+          <a:effectRef idx="0">
+            <a:schemeClr val="accent1"/>
+          </a:effectRef>
+          <a:fontRef idx="minor">
+            <a:schemeClr val="lt1"/>
+          </a:fontRef>
+        </p:style>
+        <p:txBody>
+          <a:bodyPr rtlCol="0" anchor="ctr"/>
+          <a:lstStyle/>
+          <a:p>
+            <a:pPr algn="ctr"/>
+            <a:r>
+              <a:rPr lang="en-US" sz="3970" dirty="0" smtClean="0">
+                <a:latin typeface="Avenir LT Std 35 Light" panose="020B0402020203020204" pitchFamily="34" charset="0"/>
+              </a:rPr>
+              <a:t>Time</a:t>
+            </a:r>
+            <a:endParaRPr lang="en-US" sz="3970" dirty="0">
+              <a:latin typeface="Avenir LT Std 35 Light" panose="020B0402020203020204" pitchFamily="34" charset="0"/>
+            </a:endParaRPr>
+          </a:p>
+        </p:txBody>
+      </p:sp>
+      <p:sp>
+        <p:nvSpPr>
+          <p:cNvPr id="128" name="Rectangle 127"/>
+          <p:cNvSpPr/>
+          <p:nvPr/>
+        </p:nvSpPr>
+        <p:spPr>
+          <a:xfrm>
+            <a:off x="8167688" y="25092192"/>
+            <a:ext cx="4906800" cy="895990"/>
+          </a:xfrm>
+          <a:prstGeom prst="rect">
+            <a:avLst/>
+          </a:prstGeom>
+          <a:solidFill>
+            <a:srgbClr val="C00000"/>
+          </a:solidFill>
+          <a:ln>
+            <a:solidFill>
+              <a:srgbClr val="C00000"/>
+            </a:solidFill>
+          </a:ln>
+        </p:spPr>
+        <p:style>
+          <a:lnRef idx="2">
+            <a:schemeClr val="accent1">
+              <a:shade val="50000"/>
+            </a:schemeClr>
+          </a:lnRef>
+          <a:fillRef idx="1">
+            <a:schemeClr val="accent1"/>
+          </a:fillRef>
+          <a:effectRef idx="0">
+            <a:schemeClr val="accent1"/>
+          </a:effectRef>
+          <a:fontRef idx="minor">
+            <a:schemeClr val="lt1"/>
+          </a:fontRef>
+        </p:style>
+        <p:txBody>
+          <a:bodyPr rtlCol="0" anchor="ctr"/>
+          <a:lstStyle/>
+          <a:p>
+            <a:pPr algn="ctr"/>
+            <a:r>
+              <a:rPr lang="en-US" sz="3970" dirty="0" smtClean="0">
+                <a:latin typeface="Avenir LT Std 35 Light" panose="020B0402020203020204" pitchFamily="34" charset="0"/>
+              </a:rPr>
+              <a:t>Genres</a:t>
+            </a:r>
+            <a:endParaRPr lang="en-US" sz="3970" dirty="0">
+              <a:latin typeface="Avenir LT Std 35 Light" panose="020B0402020203020204" pitchFamily="34" charset="0"/>
+            </a:endParaRPr>
+          </a:p>
+        </p:txBody>
+      </p:sp>
+      <p:pic>
+        <p:nvPicPr>
+          <p:cNvPr id="129" name="Shape 71"/>
+          <p:cNvPicPr preferRelativeResize="0"/>
+          <p:nvPr/>
+        </p:nvPicPr>
+        <p:blipFill>
+          <a:blip r:embed="rId6">
+            <a:alphaModFix/>
+          </a:blip>
+          <a:stretch>
+            <a:fillRect/>
+          </a:stretch>
+        </p:blipFill>
+        <p:spPr>
+          <a:xfrm>
+            <a:off x="27241740" y="961511"/>
+            <a:ext cx="2019059" cy="2150708"/>
+          </a:xfrm>
+          <a:prstGeom prst="rect">
+            <a:avLst/>
+          </a:prstGeom>
+          <a:noFill/>
+          <a:ln>
+            <a:noFill/>
+          </a:ln>
+        </p:spPr>
+      </p:pic>
+      <p:sp>
+        <p:nvSpPr>
+          <p:cNvPr id="130" name="ZoneTexte 129"/>
+          <p:cNvSpPr txBox="1"/>
+          <p:nvPr/>
+        </p:nvSpPr>
+        <p:spPr>
+          <a:xfrm>
+            <a:off x="4397515" y="25557719"/>
+            <a:ext cx="2765753" cy="461665"/>
+          </a:xfrm>
+          <a:prstGeom prst="rect">
+            <a:avLst/>
+          </a:prstGeom>
+          <a:noFill/>
+        </p:spPr>
+        <p:txBody>
+          <a:bodyPr wrap="square" rtlCol="0">
+            <a:spAutoFit/>
+          </a:bodyPr>
+          <a:lstStyle/>
+          <a:p>
+            <a:pPr algn="ctr"/>
+            <a:r>
+              <a:rPr lang="en-US" sz="2400" dirty="0" smtClean="0">
+                <a:latin typeface="Avenir Book" charset="0"/>
+                <a:ea typeface="Avenir Book" charset="0"/>
+                <a:cs typeface="Avenir Book" charset="0"/>
+              </a:rPr>
+              <a:t>For cover songs</a:t>
+            </a:r>
+            <a:endParaRPr lang="en-US" sz="2400" dirty="0">
+              <a:latin typeface="Avenir Book" charset="0"/>
+              <a:ea typeface="Avenir Book" charset="0"/>
+              <a:cs typeface="Avenir Book" charset="0"/>
+            </a:endParaRPr>
+          </a:p>
+        </p:txBody>
+      </p:sp>
+      <p:pic>
+        <p:nvPicPr>
+          <p:cNvPr id="41" name="Image 40"/>
+          <p:cNvPicPr>
+            <a:picLocks noChangeAspect="1"/>
+          </p:cNvPicPr>
+          <p:nvPr/>
+        </p:nvPicPr>
+        <p:blipFill rotWithShape="1">
+          <a:blip r:embed="rId7">
+            <a:extLst>
+              <a:ext uri="{28A0092B-C50C-407E-A947-70E740481C1C}">
+                <a14:useLocalDpi xmlns:a14="http://schemas.microsoft.com/office/drawing/2010/main" val="0"/>
+              </a:ext>
+            </a:extLst>
+          </a:blip>
+          <a:srcRect l="10103" r="13830"/>
+          <a:stretch/>
+        </p:blipFill>
+        <p:spPr>
+          <a:xfrm>
+            <a:off x="11063905" y="26080939"/>
+            <a:ext cx="8354242" cy="4654800"/>
+          </a:xfrm>
+          <a:prstGeom prst="rect">
+            <a:avLst/>
+          </a:prstGeom>
+        </p:spPr>
+      </p:pic>
+      <p:sp>
+        <p:nvSpPr>
+          <p:cNvPr id="131" name="ZoneTexte 130"/>
+          <p:cNvSpPr txBox="1"/>
+          <p:nvPr/>
+        </p:nvSpPr>
+        <p:spPr>
+          <a:xfrm>
+            <a:off x="14078908" y="25560750"/>
+            <a:ext cx="3126240" cy="461665"/>
+          </a:xfrm>
+          <a:prstGeom prst="rect">
+            <a:avLst/>
+          </a:prstGeom>
+          <a:noFill/>
+        </p:spPr>
+        <p:txBody>
+          <a:bodyPr wrap="square" rtlCol="0">
+            <a:spAutoFit/>
+          </a:bodyPr>
+          <a:lstStyle/>
+          <a:p>
+            <a:pPr algn="ctr"/>
+            <a:r>
+              <a:rPr lang="en-US" sz="2400" dirty="0" smtClean="0">
+                <a:latin typeface="Avenir Book" charset="0"/>
+                <a:ea typeface="Avenir Book" charset="0"/>
+                <a:cs typeface="Avenir Book" charset="0"/>
+              </a:rPr>
+              <a:t>For original songs</a:t>
+            </a:r>
+            <a:endParaRPr lang="en-US" sz="2400" dirty="0">
+              <a:latin typeface="Avenir Book" charset="0"/>
+              <a:ea typeface="Avenir Book" charset="0"/>
+              <a:cs typeface="Avenir Book" charset="0"/>
+            </a:endParaRPr>
+          </a:p>
+        </p:txBody>
+      </p:sp>
+      <p:pic>
+        <p:nvPicPr>
+          <p:cNvPr id="45" name="Image 44"/>
           <p:cNvPicPr>
             <a:picLocks noChangeAspect="1"/>
           </p:cNvPicPr>
@@ -4163,6 +4071,36 @@
         </p:blipFill>
         <p:spPr>
           <a:xfrm>
+            <a:off x="20970329" y="20675017"/>
+            <a:ext cx="7624800" cy="4244368"/>
+          </a:xfrm>
+          <a:prstGeom prst="rect">
+            <a:avLst/>
+          </a:prstGeom>
+        </p:spPr>
+      </p:pic>
+      <p:pic>
+        <p:nvPicPr>
+          <p:cNvPr id="46" name="Image 45"/>
+          <p:cNvPicPr>
+            <a:picLocks noChangeAspect="1"/>
+          </p:cNvPicPr>
+          <p:nvPr/>
+        </p:nvPicPr>
+        <p:blipFill>
+          <a:blip r:embed="rId9">
+            <a:extLst>
+              <a:ext uri="{28A0092B-C50C-407E-A947-70E740481C1C}">
+                <a14:useLocalDpi xmlns:a14="http://schemas.microsoft.com/office/drawing/2010/main" val="0"/>
+              </a:ext>
+            </a:extLst>
+          </a:blip>
+          <a:stretch>
+            <a:fillRect/>
+          </a:stretch>
+        </p:blipFill>
+        <p:spPr>
+          <a:xfrm>
             <a:off x="20970329" y="24928886"/>
             <a:ext cx="7624800" cy="4244368"/>
           </a:xfrm>
@@ -4195,134 +4133,513 @@
           <a:p>
             <a:pPr algn="ctr"/>
             <a:r>
-              <a:rPr lang="fr-FR" sz="2800" b="1" dirty="0" smtClean="0">
+              <a:rPr lang="en-US" sz="2800" b="1" dirty="0" smtClean="0">
                 <a:latin typeface="Avenir Book" charset="0"/>
                 <a:ea typeface="Avenir Book" charset="0"/>
                 <a:cs typeface="Avenir Book" charset="0"/>
               </a:rPr>
-              <a:t>90% </a:t>
-            </a:r>
-            <a:r>
-              <a:rPr lang="fr-FR" sz="2800" b="1" dirty="0">
+              <a:t>90% of covers are in a different genre than the original song</a:t>
+            </a:r>
+            <a:endParaRPr lang="en-US" sz="2800" b="1" dirty="0">
+              <a:latin typeface="Avenir Book" charset="0"/>
+              <a:ea typeface="Avenir Book" charset="0"/>
+              <a:cs typeface="Avenir Book" charset="0"/>
+            </a:endParaRPr>
+          </a:p>
+        </p:txBody>
+      </p:sp>
+      <p:sp>
+        <p:nvSpPr>
+          <p:cNvPr id="49" name="ZoneTexte 48"/>
+          <p:cNvSpPr txBox="1"/>
+          <p:nvPr/>
+        </p:nvSpPr>
+        <p:spPr>
+          <a:xfrm>
+            <a:off x="21658529" y="30000075"/>
+            <a:ext cx="6248400" cy="954107"/>
+          </a:xfrm>
+          <a:prstGeom prst="rect">
+            <a:avLst/>
+          </a:prstGeom>
+          <a:noFill/>
+        </p:spPr>
+        <p:txBody>
+          <a:bodyPr wrap="square" rtlCol="0">
+            <a:spAutoFit/>
+          </a:bodyPr>
+          <a:lstStyle/>
+          <a:p>
+            <a:pPr algn="ctr"/>
+            <a:r>
+              <a:rPr lang="en-US" sz="2800" b="1" dirty="0" smtClean="0">
                 <a:latin typeface="Avenir Book" charset="0"/>
                 <a:ea typeface="Avenir Book" charset="0"/>
                 <a:cs typeface="Avenir Book" charset="0"/>
               </a:rPr>
-              <a:t>of </a:t>
-            </a:r>
-            <a:r>
-              <a:rPr lang="fr-FR" sz="2800" b="1" dirty="0" err="1" smtClean="0">
+              <a:t>80% of covers are recorded more than 10 years after the original</a:t>
+            </a:r>
+            <a:endParaRPr lang="en-US" sz="2800" b="1" dirty="0">
+              <a:latin typeface="Avenir Book" charset="0"/>
+              <a:ea typeface="Avenir Book" charset="0"/>
+              <a:cs typeface="Avenir Book" charset="0"/>
+            </a:endParaRPr>
+          </a:p>
+        </p:txBody>
+      </p:sp>
+      <p:sp>
+        <p:nvSpPr>
+          <p:cNvPr id="133" name="ZoneTexte 132"/>
+          <p:cNvSpPr txBox="1"/>
+          <p:nvPr/>
+        </p:nvSpPr>
+        <p:spPr>
+          <a:xfrm>
+            <a:off x="22439570" y="20416653"/>
+            <a:ext cx="4687320" cy="400110"/>
+          </a:xfrm>
+          <a:prstGeom prst="rect">
+            <a:avLst/>
+          </a:prstGeom>
+          <a:noFill/>
+        </p:spPr>
+        <p:txBody>
+          <a:bodyPr wrap="square" rtlCol="0">
+            <a:spAutoFit/>
+          </a:bodyPr>
+          <a:lstStyle/>
+          <a:p>
+            <a:pPr algn="ctr"/>
+            <a:r>
+              <a:rPr lang="en-US" sz="2000" dirty="0" smtClean="0">
                 <a:latin typeface="Avenir Book" charset="0"/>
                 <a:ea typeface="Avenir Book" charset="0"/>
                 <a:cs typeface="Avenir Book" charset="0"/>
               </a:rPr>
-              <a:t>covers</a:t>
-            </a:r>
-            <a:r>
-              <a:rPr lang="fr-FR" sz="2800" b="1" dirty="0" smtClean="0">
+              <a:t>Distribution of originals</a:t>
+            </a:r>
+            <a:endParaRPr lang="en-US" sz="2000" dirty="0">
+              <a:latin typeface="Avenir Book" charset="0"/>
+              <a:ea typeface="Avenir Book" charset="0"/>
+              <a:cs typeface="Avenir Book" charset="0"/>
+            </a:endParaRPr>
+          </a:p>
+        </p:txBody>
+      </p:sp>
+      <p:sp>
+        <p:nvSpPr>
+          <p:cNvPr id="136" name="ZoneTexte 135"/>
+          <p:cNvSpPr txBox="1"/>
+          <p:nvPr/>
+        </p:nvSpPr>
+        <p:spPr>
+          <a:xfrm>
+            <a:off x="22439570" y="24692082"/>
+            <a:ext cx="4687320" cy="400110"/>
+          </a:xfrm>
+          <a:prstGeom prst="rect">
+            <a:avLst/>
+          </a:prstGeom>
+          <a:noFill/>
+        </p:spPr>
+        <p:txBody>
+          <a:bodyPr wrap="square" rtlCol="0">
+            <a:spAutoFit/>
+          </a:bodyPr>
+          <a:lstStyle/>
+          <a:p>
+            <a:pPr algn="ctr"/>
+            <a:r>
+              <a:rPr lang="en-US" sz="2000" dirty="0" smtClean="0">
                 <a:latin typeface="Avenir Book" charset="0"/>
                 <a:ea typeface="Avenir Book" charset="0"/>
                 <a:cs typeface="Avenir Book" charset="0"/>
               </a:rPr>
-              <a:t> are </a:t>
-            </a:r>
-            <a:r>
-              <a:rPr lang="fr-FR" sz="2800" b="1" dirty="0">
+              <a:t>Distribution of covers</a:t>
+            </a:r>
+            <a:endParaRPr lang="en-US" sz="2000" dirty="0">
+              <a:latin typeface="Avenir Book" charset="0"/>
+              <a:ea typeface="Avenir Book" charset="0"/>
+              <a:cs typeface="Avenir Book" charset="0"/>
+            </a:endParaRPr>
+          </a:p>
+        </p:txBody>
+      </p:sp>
+      <p:sp>
+        <p:nvSpPr>
+          <p:cNvPr id="141" name="ZoneTexte 140"/>
+          <p:cNvSpPr txBox="1"/>
+          <p:nvPr/>
+        </p:nvSpPr>
+        <p:spPr>
+          <a:xfrm>
+            <a:off x="22439570" y="28962548"/>
+            <a:ext cx="4687320" cy="707886"/>
+          </a:xfrm>
+          <a:prstGeom prst="rect">
+            <a:avLst/>
+          </a:prstGeom>
+          <a:noFill/>
+        </p:spPr>
+        <p:txBody>
+          <a:bodyPr wrap="square" rtlCol="0">
+            <a:spAutoFit/>
+          </a:bodyPr>
+          <a:lstStyle/>
+          <a:p>
+            <a:pPr algn="ctr"/>
+            <a:r>
+              <a:rPr lang="en-US" sz="2000" dirty="0" smtClean="0">
                 <a:latin typeface="Avenir Book" charset="0"/>
                 <a:ea typeface="Avenir Book" charset="0"/>
                 <a:cs typeface="Avenir Book" charset="0"/>
               </a:rPr>
-              <a:t>in a </a:t>
-            </a:r>
-            <a:r>
-              <a:rPr lang="fr-FR" sz="2800" b="1" dirty="0" err="1">
+              <a:t>Number of covers of originals recorded in that year</a:t>
+            </a:r>
+            <a:endParaRPr lang="en-US" sz="2000" dirty="0">
+              <a:latin typeface="Avenir Book" charset="0"/>
+              <a:ea typeface="Avenir Book" charset="0"/>
+              <a:cs typeface="Avenir Book" charset="0"/>
+            </a:endParaRPr>
+          </a:p>
+        </p:txBody>
+      </p:sp>
+      <p:sp>
+        <p:nvSpPr>
+          <p:cNvPr id="142" name="ZoneTexte 141"/>
+          <p:cNvSpPr txBox="1"/>
+          <p:nvPr/>
+        </p:nvSpPr>
+        <p:spPr>
+          <a:xfrm>
+            <a:off x="11495855" y="14608127"/>
+            <a:ext cx="16703130" cy="523220"/>
+          </a:xfrm>
+          <a:prstGeom prst="rect">
+            <a:avLst/>
+          </a:prstGeom>
+          <a:noFill/>
+        </p:spPr>
+        <p:txBody>
+          <a:bodyPr wrap="square" rtlCol="0">
+            <a:spAutoFit/>
+          </a:bodyPr>
+          <a:lstStyle/>
+          <a:p>
+            <a:pPr algn="ctr"/>
+            <a:r>
+              <a:rPr lang="en-US" sz="2800" b="1" dirty="0" smtClean="0">
                 <a:latin typeface="Avenir Book" charset="0"/>
                 <a:ea typeface="Avenir Book" charset="0"/>
                 <a:cs typeface="Avenir Book" charset="0"/>
               </a:rPr>
-              <a:t>different</a:t>
-            </a:r>
-            <a:r>
-              <a:rPr lang="fr-FR" sz="2800" b="1" dirty="0">
+              <a:t>65% of covers are recorded in a different country from the original one</a:t>
+            </a:r>
+            <a:endParaRPr lang="en-US" sz="2800" b="1" dirty="0">
+              <a:latin typeface="Avenir Book" charset="0"/>
+              <a:ea typeface="Avenir Book" charset="0"/>
+              <a:cs typeface="Avenir Book" charset="0"/>
+            </a:endParaRPr>
+          </a:p>
+        </p:txBody>
+      </p:sp>
+      <p:sp>
+        <p:nvSpPr>
+          <p:cNvPr id="52" name="ZoneTexte 51"/>
+          <p:cNvSpPr txBox="1"/>
+          <p:nvPr/>
+        </p:nvSpPr>
+        <p:spPr>
+          <a:xfrm>
+            <a:off x="2213188" y="10447918"/>
+            <a:ext cx="7561945" cy="4401205"/>
+          </a:xfrm>
+          <a:prstGeom prst="rect">
+            <a:avLst/>
+          </a:prstGeom>
+          <a:noFill/>
+        </p:spPr>
+        <p:txBody>
+          <a:bodyPr wrap="square" rtlCol="0">
+            <a:spAutoFit/>
+          </a:bodyPr>
+          <a:lstStyle/>
+          <a:p>
+            <a:pPr marL="285750" indent="-285750">
+              <a:buFont typeface="Arial" charset="0"/>
+              <a:buChar char="•"/>
+            </a:pPr>
+            <a:r>
+              <a:rPr lang="en-US" sz="4000" dirty="0" smtClean="0">
                 <a:latin typeface="Avenir Book" charset="0"/>
                 <a:ea typeface="Avenir Book" charset="0"/>
                 <a:cs typeface="Avenir Book" charset="0"/>
               </a:rPr>
-              <a:t> genre </a:t>
-            </a:r>
-            <a:r>
-              <a:rPr lang="fr-FR" sz="2800" b="1" dirty="0" err="1">
+              <a:t>17541 songs</a:t>
+            </a:r>
+          </a:p>
+          <a:p>
+            <a:pPr marL="285750" indent="-285750">
+              <a:buFont typeface="Arial" charset="0"/>
+              <a:buChar char="•"/>
+            </a:pPr>
+            <a:r>
+              <a:rPr lang="en-US" sz="4000" dirty="0" smtClean="0">
                 <a:latin typeface="Avenir Book" charset="0"/>
                 <a:ea typeface="Avenir Book" charset="0"/>
                 <a:cs typeface="Avenir Book" charset="0"/>
               </a:rPr>
-              <a:t>than</a:t>
-            </a:r>
-            <a:r>
-              <a:rPr lang="fr-FR" sz="2800" b="1" dirty="0">
+              <a:t>5420 artists</a:t>
+            </a:r>
+          </a:p>
+          <a:p>
+            <a:pPr marL="285750" indent="-285750">
+              <a:buFont typeface="Arial" charset="0"/>
+              <a:buChar char="•"/>
+            </a:pPr>
+            <a:r>
+              <a:rPr lang="en-US" sz="4000" dirty="0" smtClean="0">
                 <a:latin typeface="Avenir Book" charset="0"/>
                 <a:ea typeface="Avenir Book" charset="0"/>
                 <a:cs typeface="Avenir Book" charset="0"/>
               </a:rPr>
-              <a:t> the original </a:t>
-            </a:r>
-            <a:r>
-              <a:rPr lang="fr-FR" sz="2800" b="1" dirty="0" err="1" smtClean="0">
+              <a:t>5659 cliques</a:t>
+            </a:r>
+          </a:p>
+          <a:p>
+            <a:pPr marL="285750" indent="-285750">
+              <a:buFont typeface="Arial" charset="0"/>
+              <a:buChar char="•"/>
+            </a:pPr>
+            <a:r>
+              <a:rPr lang="en-US" sz="4000" dirty="0" smtClean="0">
                 <a:latin typeface="Avenir Book" charset="0"/>
                 <a:ea typeface="Avenir Book" charset="0"/>
                 <a:cs typeface="Avenir Book" charset="0"/>
               </a:rPr>
-              <a:t>song</a:t>
-            </a:r>
-            <a:endParaRPr lang="fr-FR" sz="2800" b="1" dirty="0">
+              <a:t>From 1911 to 2015</a:t>
+            </a:r>
+          </a:p>
+          <a:p>
+            <a:pPr marL="285750" indent="-285750">
+              <a:buFont typeface="Arial" charset="0"/>
+              <a:buChar char="•"/>
+            </a:pPr>
+            <a:r>
+              <a:rPr lang="en-US" sz="4000" dirty="0" smtClean="0">
+                <a:latin typeface="Avenir Book" charset="0"/>
+                <a:ea typeface="Avenir Book" charset="0"/>
+                <a:cs typeface="Avenir Book" charset="0"/>
+              </a:rPr>
+              <a:t>52 countries</a:t>
+            </a:r>
+          </a:p>
+          <a:p>
+            <a:pPr marL="285750" indent="-285750">
+              <a:buFont typeface="Arial" charset="0"/>
+              <a:buChar char="•"/>
+            </a:pPr>
+            <a:r>
+              <a:rPr lang="en-US" sz="4000" dirty="0" smtClean="0">
+                <a:latin typeface="Avenir Book" charset="0"/>
+                <a:ea typeface="Avenir Book" charset="0"/>
+                <a:cs typeface="Avenir Book" charset="0"/>
+              </a:rPr>
+              <a:t>21 languages</a:t>
+            </a:r>
+          </a:p>
+          <a:p>
+            <a:pPr marL="285750" indent="-285750">
+              <a:buFont typeface="Arial" charset="0"/>
+              <a:buChar char="•"/>
+            </a:pPr>
+            <a:r>
+              <a:rPr lang="en-US" sz="4000" dirty="0" smtClean="0">
+                <a:latin typeface="Avenir Book" charset="0"/>
+                <a:ea typeface="Avenir Book" charset="0"/>
+                <a:cs typeface="Avenir Book" charset="0"/>
+              </a:rPr>
+              <a:t>33 genres</a:t>
+            </a:r>
+          </a:p>
+        </p:txBody>
+      </p:sp>
+      <p:sp>
+        <p:nvSpPr>
+          <p:cNvPr id="53" name="ZoneTexte 52"/>
+          <p:cNvSpPr txBox="1"/>
+          <p:nvPr/>
+        </p:nvSpPr>
+        <p:spPr>
+          <a:xfrm>
+            <a:off x="1332506" y="19502010"/>
+            <a:ext cx="8895769" cy="3970318"/>
+          </a:xfrm>
+          <a:prstGeom prst="rect">
+            <a:avLst/>
+          </a:prstGeom>
+          <a:noFill/>
+        </p:spPr>
+        <p:txBody>
+          <a:bodyPr wrap="none" rtlCol="0">
+            <a:spAutoFit/>
+          </a:bodyPr>
+          <a:lstStyle/>
+          <a:p>
+            <a:endParaRPr lang="en-US" dirty="0" smtClean="0">
               <a:latin typeface="Avenir Book" charset="0"/>
               <a:ea typeface="Avenir Book" charset="0"/>
               <a:cs typeface="Avenir Book" charset="0"/>
             </a:endParaRPr>
           </a:p>
-        </p:txBody>
-      </p:sp>
-      <p:sp>
-        <p:nvSpPr>
-          <p:cNvPr id="49" name="ZoneTexte 48"/>
-          <p:cNvSpPr txBox="1"/>
-          <p:nvPr/>
-        </p:nvSpPr>
-        <p:spPr>
-          <a:xfrm>
-            <a:off x="21658529" y="30000075"/>
-            <a:ext cx="6248400" cy="954107"/>
-          </a:xfrm>
-          <a:prstGeom prst="rect">
-            <a:avLst/>
-          </a:prstGeom>
-          <a:noFill/>
-        </p:spPr>
-        <p:txBody>
-          <a:bodyPr wrap="square" rtlCol="0">
-            <a:spAutoFit/>
-          </a:bodyPr>
-          <a:lstStyle/>
           <a:p>
             <a:pPr algn="ctr"/>
             <a:r>
-              <a:rPr lang="fr-FR" sz="2800" b="1" dirty="0" smtClean="0">
+              <a:rPr lang="en-US" b="1" dirty="0" smtClean="0">
                 <a:latin typeface="Avenir Book" charset="0"/>
                 <a:ea typeface="Avenir Book" charset="0"/>
                 <a:cs typeface="Avenir Book" charset="0"/>
               </a:rPr>
-              <a:t>80% of </a:t>
-            </a:r>
-            <a:r>
-              <a:rPr lang="fr-FR" sz="2800" b="1" dirty="0" err="1">
+              <a:t>TOP 10 SONGS</a:t>
+            </a:r>
+          </a:p>
+          <a:p>
+            <a:pPr algn="ctr"/>
+            <a:endParaRPr lang="en-US" dirty="0" smtClean="0">
+              <a:latin typeface="Avenir Book" charset="0"/>
+              <a:ea typeface="Avenir Book" charset="0"/>
+              <a:cs typeface="Avenir Book" charset="0"/>
+            </a:endParaRPr>
+          </a:p>
+          <a:p>
+            <a:pPr marL="342900" indent="-342900">
+              <a:buAutoNum type="arabicPeriod"/>
+            </a:pPr>
+            <a:r>
+              <a:rPr lang="en-US" dirty="0" smtClean="0">
                 <a:latin typeface="Avenir Book" charset="0"/>
                 <a:ea typeface="Avenir Book" charset="0"/>
                 <a:cs typeface="Avenir Book" charset="0"/>
               </a:rPr>
-              <a:t>covers</a:t>
-            </a:r>
-            <a:r>
-              <a:rPr lang="fr-FR" sz="2800" b="1" dirty="0">
+              <a:t>Silent Night, 1961, Chet Atkins, 42 </a:t>
+            </a:r>
+          </a:p>
+          <a:p>
+            <a:pPr marL="342900" indent="-342900">
+              <a:buAutoNum type="arabicPeriod"/>
+            </a:pPr>
+            <a:r>
+              <a:rPr lang="en-US" dirty="0" smtClean="0">
+                <a:latin typeface="Avenir Book" charset="0"/>
+                <a:ea typeface="Avenir Book" charset="0"/>
+                <a:cs typeface="Avenir Book" charset="0"/>
+              </a:rPr>
+              <a:t>White Christmas, 1942, Bing Crosby, 36 </a:t>
+            </a:r>
+          </a:p>
+          <a:p>
+            <a:pPr marL="342900" indent="-342900">
+              <a:buAutoNum type="arabicPeriod"/>
+            </a:pPr>
+            <a:r>
+              <a:rPr lang="en-US" dirty="0" smtClean="0">
+                <a:latin typeface="Avenir Book" charset="0"/>
+                <a:ea typeface="Avenir Book" charset="0"/>
+                <a:cs typeface="Avenir Book" charset="0"/>
+              </a:rPr>
+              <a:t>Unchained Melody, 1955, Les Baxter, 25 </a:t>
+            </a:r>
+          </a:p>
+          <a:p>
+            <a:pPr marL="342900" indent="-342900">
+              <a:buAutoNum type="arabicPeriod"/>
+            </a:pPr>
+            <a:r>
+              <a:rPr lang="en-US" dirty="0" smtClean="0">
+                <a:latin typeface="Avenir Book" charset="0"/>
+                <a:ea typeface="Avenir Book" charset="0"/>
+                <a:cs typeface="Avenir Book" charset="0"/>
+              </a:rPr>
+              <a:t>O Holy Night, 1958, Tennessee Ernie Ford, 24 </a:t>
+            </a:r>
+          </a:p>
+          <a:p>
+            <a:pPr marL="342900" indent="-342900">
+              <a:buAutoNum type="arabicPeriod"/>
+            </a:pPr>
+            <a:r>
+              <a:rPr lang="en-US" dirty="0" smtClean="0">
+                <a:latin typeface="Avenir Book" charset="0"/>
+                <a:ea typeface="Avenir Book" charset="0"/>
+                <a:cs typeface="Avenir Book" charset="0"/>
+              </a:rPr>
+              <a:t>Georgia On My Mind, 1930, </a:t>
+            </a:r>
+            <a:r>
+              <a:rPr lang="en-US" dirty="0" err="1" smtClean="0">
+                <a:latin typeface="Avenir Book" charset="0"/>
+                <a:ea typeface="Avenir Book" charset="0"/>
+                <a:cs typeface="Avenir Book" charset="0"/>
+              </a:rPr>
+              <a:t>Hoagy</a:t>
+            </a:r>
+            <a:r>
+              <a:rPr lang="en-US" dirty="0" smtClean="0">
+                <a:latin typeface="Avenir Book" charset="0"/>
+                <a:ea typeface="Avenir Book" charset="0"/>
+                <a:cs typeface="Avenir Book" charset="0"/>
+              </a:rPr>
+              <a:t> Carmichael, 22 </a:t>
+            </a:r>
+          </a:p>
+          <a:p>
+            <a:pPr marL="342900" indent="-342900">
+              <a:buAutoNum type="arabicPeriod"/>
+            </a:pPr>
+            <a:r>
+              <a:rPr lang="en-US" dirty="0" smtClean="0">
+                <a:latin typeface="Avenir Book" charset="0"/>
+                <a:ea typeface="Avenir Book" charset="0"/>
+                <a:cs typeface="Avenir Book" charset="0"/>
+              </a:rPr>
+              <a:t>I'll Be Home For Christmas, 1943, Bing Crosby, 21 </a:t>
+            </a:r>
+          </a:p>
+          <a:p>
+            <a:pPr marL="342900" indent="-342900">
+              <a:buAutoNum type="arabicPeriod"/>
+            </a:pPr>
+            <a:r>
+              <a:rPr lang="en-US" dirty="0" smtClean="0">
+                <a:latin typeface="Avenir Book" charset="0"/>
+                <a:ea typeface="Avenir Book" charset="0"/>
+                <a:cs typeface="Avenir Book" charset="0"/>
+              </a:rPr>
+              <a:t>The Christmas Song, 1946, Nat King Cole, 20 </a:t>
+            </a:r>
+          </a:p>
+          <a:p>
+            <a:pPr marL="342900" indent="-342900">
+              <a:buAutoNum type="arabicPeriod"/>
+            </a:pPr>
+            <a:r>
+              <a:rPr lang="en-US" dirty="0" smtClean="0">
+                <a:latin typeface="Avenir Book" charset="0"/>
+                <a:ea typeface="Avenir Book" charset="0"/>
+                <a:cs typeface="Avenir Book" charset="0"/>
+              </a:rPr>
+              <a:t>Have Yourself A Merry Little Christmas, 1967, Barbra </a:t>
+            </a:r>
+            <a:r>
+              <a:rPr lang="en-US" dirty="0" err="1" smtClean="0">
+                <a:latin typeface="Avenir Book" charset="0"/>
+                <a:ea typeface="Avenir Book" charset="0"/>
+                <a:cs typeface="Avenir Book" charset="0"/>
+              </a:rPr>
+              <a:t>Streisand;Yves</a:t>
+            </a:r>
+            <a:r>
+              <a:rPr lang="en-US" dirty="0" smtClean="0">
                 <a:latin typeface="Avenir Book" charset="0"/>
                 <a:ea typeface="Avenir Book" charset="0"/>
                 <a:cs typeface="Avenir Book" charset="0"/>
@@ -4330,1044 +4647,50 @@
               <a:t> </a:t>
             </a:r>
             <a:r>
-              <a:rPr lang="fr-FR" sz="2800" b="1" dirty="0" smtClean="0">
+              <a:rPr lang="en-US" dirty="0" err="1" smtClean="0">
                 <a:latin typeface="Avenir Book" charset="0"/>
                 <a:ea typeface="Avenir Book" charset="0"/>
                 <a:cs typeface="Avenir Book" charset="0"/>
               </a:rPr>
-              <a:t>are </a:t>
-            </a:r>
-            <a:r>
-              <a:rPr lang="fr-FR" sz="2800" b="1" dirty="0" err="1" smtClean="0">
+              <a:t>Montand</a:t>
+            </a:r>
+            <a:r>
+              <a:rPr lang="en-US" dirty="0" smtClean="0">
                 <a:latin typeface="Avenir Book" charset="0"/>
                 <a:ea typeface="Avenir Book" charset="0"/>
                 <a:cs typeface="Avenir Book" charset="0"/>
               </a:rPr>
-              <a:t>recorded</a:t>
-            </a:r>
-            <a:r>
-              <a:rPr lang="fr-FR" sz="2800" b="1" dirty="0" smtClean="0">
+              <a:t>, 20 </a:t>
+            </a:r>
+          </a:p>
+          <a:p>
+            <a:pPr marL="342900" indent="-342900">
+              <a:buAutoNum type="arabicPeriod"/>
+            </a:pPr>
+            <a:r>
+              <a:rPr lang="en-US" dirty="0" smtClean="0">
                 <a:latin typeface="Avenir Book" charset="0"/>
                 <a:ea typeface="Avenir Book" charset="0"/>
                 <a:cs typeface="Avenir Book" charset="0"/>
               </a:rPr>
-              <a:t> </a:t>
-            </a:r>
-            <a:r>
-              <a:rPr lang="fr-FR" sz="2800" b="1" dirty="0">
+              <a:t>Over The Rainbow, 1939, Judy Garland, 18 </a:t>
+            </a:r>
+          </a:p>
+          <a:p>
+            <a:pPr marL="342900" indent="-342900">
+              <a:buAutoNum type="arabicPeriod"/>
+            </a:pPr>
+            <a:r>
+              <a:rPr lang="en-US" dirty="0" smtClean="0">
                 <a:latin typeface="Avenir Book" charset="0"/>
                 <a:ea typeface="Avenir Book" charset="0"/>
                 <a:cs typeface="Avenir Book" charset="0"/>
               </a:rPr>
-              <a:t>more </a:t>
-            </a:r>
-            <a:r>
-              <a:rPr lang="fr-FR" sz="2800" b="1" dirty="0" err="1">
-                <a:latin typeface="Avenir Book" charset="0"/>
-                <a:ea typeface="Avenir Book" charset="0"/>
-                <a:cs typeface="Avenir Book" charset="0"/>
-              </a:rPr>
-              <a:t>than</a:t>
-            </a:r>
-            <a:r>
-              <a:rPr lang="fr-FR" sz="2800" b="1" dirty="0">
-                <a:latin typeface="Avenir Book" charset="0"/>
-                <a:ea typeface="Avenir Book" charset="0"/>
-                <a:cs typeface="Avenir Book" charset="0"/>
-              </a:rPr>
-              <a:t> 10 </a:t>
-            </a:r>
-            <a:r>
-              <a:rPr lang="fr-FR" sz="2800" b="1" dirty="0" err="1">
-                <a:latin typeface="Avenir Book" charset="0"/>
-                <a:ea typeface="Avenir Book" charset="0"/>
-                <a:cs typeface="Avenir Book" charset="0"/>
-              </a:rPr>
-              <a:t>years</a:t>
-            </a:r>
-            <a:r>
-              <a:rPr lang="fr-FR" sz="2800" b="1" dirty="0">
-                <a:latin typeface="Avenir Book" charset="0"/>
-                <a:ea typeface="Avenir Book" charset="0"/>
-                <a:cs typeface="Avenir Book" charset="0"/>
-              </a:rPr>
-              <a:t> </a:t>
-            </a:r>
-            <a:r>
-              <a:rPr lang="fr-FR" sz="2800" b="1" dirty="0" err="1">
-                <a:latin typeface="Avenir Book" charset="0"/>
-                <a:ea typeface="Avenir Book" charset="0"/>
-                <a:cs typeface="Avenir Book" charset="0"/>
-              </a:rPr>
-              <a:t>after</a:t>
-            </a:r>
-            <a:r>
-              <a:rPr lang="fr-FR" sz="2800" b="1" dirty="0">
-                <a:latin typeface="Avenir Book" charset="0"/>
-                <a:ea typeface="Avenir Book" charset="0"/>
-                <a:cs typeface="Avenir Book" charset="0"/>
-              </a:rPr>
-              <a:t> the </a:t>
-            </a:r>
-            <a:r>
-              <a:rPr lang="fr-FR" sz="2800" b="1" dirty="0" smtClean="0">
-                <a:latin typeface="Avenir Book" charset="0"/>
-                <a:ea typeface="Avenir Book" charset="0"/>
-                <a:cs typeface="Avenir Book" charset="0"/>
-              </a:rPr>
-              <a:t>original</a:t>
-            </a:r>
-            <a:endParaRPr lang="fr-FR" sz="2800" b="1" dirty="0">
-              <a:latin typeface="Avenir Book" charset="0"/>
-              <a:ea typeface="Avenir Book" charset="0"/>
-              <a:cs typeface="Avenir Book" charset="0"/>
-            </a:endParaRPr>
-          </a:p>
-        </p:txBody>
-      </p:sp>
-      <p:sp>
-        <p:nvSpPr>
-          <p:cNvPr id="133" name="ZoneTexte 132"/>
-          <p:cNvSpPr txBox="1"/>
-          <p:nvPr/>
-        </p:nvSpPr>
-        <p:spPr>
-          <a:xfrm>
-            <a:off x="22439570" y="20416653"/>
-            <a:ext cx="4687320" cy="400110"/>
-          </a:xfrm>
-          <a:prstGeom prst="rect">
-            <a:avLst/>
-          </a:prstGeom>
-          <a:noFill/>
-        </p:spPr>
-        <p:txBody>
-          <a:bodyPr wrap="square" rtlCol="0">
-            <a:spAutoFit/>
-          </a:bodyPr>
-          <a:lstStyle/>
-          <a:p>
-            <a:pPr algn="ctr"/>
-            <a:r>
-              <a:rPr lang="fr-FR" sz="2000" dirty="0" smtClean="0">
-                <a:latin typeface="Avenir Book" charset="0"/>
-                <a:ea typeface="Avenir Book" charset="0"/>
-                <a:cs typeface="Avenir Book" charset="0"/>
-              </a:rPr>
-              <a:t>Distribution of </a:t>
-            </a:r>
-            <a:r>
-              <a:rPr lang="fr-FR" sz="2000" dirty="0" err="1" smtClean="0">
-                <a:latin typeface="Avenir Book" charset="0"/>
-                <a:ea typeface="Avenir Book" charset="0"/>
-                <a:cs typeface="Avenir Book" charset="0"/>
-              </a:rPr>
-              <a:t>originals</a:t>
-            </a:r>
-            <a:endParaRPr lang="fr-FR" sz="2000" dirty="0">
-              <a:latin typeface="Avenir Book" charset="0"/>
-              <a:ea typeface="Avenir Book" charset="0"/>
-              <a:cs typeface="Avenir Book" charset="0"/>
-            </a:endParaRPr>
-          </a:p>
-        </p:txBody>
-      </p:sp>
-      <p:sp>
-        <p:nvSpPr>
-          <p:cNvPr id="136" name="ZoneTexte 135"/>
-          <p:cNvSpPr txBox="1"/>
-          <p:nvPr/>
-        </p:nvSpPr>
-        <p:spPr>
-          <a:xfrm>
-            <a:off x="22439570" y="24692082"/>
-            <a:ext cx="4687320" cy="400110"/>
-          </a:xfrm>
-          <a:prstGeom prst="rect">
-            <a:avLst/>
-          </a:prstGeom>
-          <a:noFill/>
-        </p:spPr>
-        <p:txBody>
-          <a:bodyPr wrap="square" rtlCol="0">
-            <a:spAutoFit/>
-          </a:bodyPr>
-          <a:lstStyle/>
-          <a:p>
-            <a:pPr algn="ctr"/>
-            <a:r>
-              <a:rPr lang="fr-FR" sz="2000" dirty="0" smtClean="0">
-                <a:latin typeface="Avenir Book" charset="0"/>
-                <a:ea typeface="Avenir Book" charset="0"/>
-                <a:cs typeface="Avenir Book" charset="0"/>
-              </a:rPr>
-              <a:t>Distribution of </a:t>
-            </a:r>
-            <a:r>
-              <a:rPr lang="fr-FR" sz="2000" dirty="0" err="1" smtClean="0">
-                <a:latin typeface="Avenir Book" charset="0"/>
-                <a:ea typeface="Avenir Book" charset="0"/>
-                <a:cs typeface="Avenir Book" charset="0"/>
-              </a:rPr>
-              <a:t>covers</a:t>
-            </a:r>
-            <a:endParaRPr lang="fr-FR" sz="2000" dirty="0">
-              <a:latin typeface="Avenir Book" charset="0"/>
-              <a:ea typeface="Avenir Book" charset="0"/>
-              <a:cs typeface="Avenir Book" charset="0"/>
-            </a:endParaRPr>
-          </a:p>
-        </p:txBody>
-      </p:sp>
-      <p:sp>
-        <p:nvSpPr>
-          <p:cNvPr id="141" name="ZoneTexte 140"/>
-          <p:cNvSpPr txBox="1"/>
-          <p:nvPr/>
-        </p:nvSpPr>
-        <p:spPr>
-          <a:xfrm>
-            <a:off x="22439570" y="28962548"/>
-            <a:ext cx="4687320" cy="707886"/>
-          </a:xfrm>
-          <a:prstGeom prst="rect">
-            <a:avLst/>
-          </a:prstGeom>
-          <a:noFill/>
-        </p:spPr>
-        <p:txBody>
-          <a:bodyPr wrap="square" rtlCol="0">
-            <a:spAutoFit/>
-          </a:bodyPr>
-          <a:lstStyle/>
-          <a:p>
-            <a:pPr algn="ctr"/>
-            <a:r>
-              <a:rPr lang="fr-FR" sz="2000" dirty="0" err="1" smtClean="0">
-                <a:latin typeface="Avenir Book" charset="0"/>
-                <a:ea typeface="Avenir Book" charset="0"/>
-                <a:cs typeface="Avenir Book" charset="0"/>
-              </a:rPr>
-              <a:t>Number</a:t>
-            </a:r>
-            <a:r>
-              <a:rPr lang="fr-FR" sz="2000" dirty="0" smtClean="0">
-                <a:latin typeface="Avenir Book" charset="0"/>
-                <a:ea typeface="Avenir Book" charset="0"/>
-                <a:cs typeface="Avenir Book" charset="0"/>
-              </a:rPr>
-              <a:t> of </a:t>
-            </a:r>
-            <a:r>
-              <a:rPr lang="fr-FR" sz="2000" dirty="0" err="1" smtClean="0">
-                <a:latin typeface="Avenir Book" charset="0"/>
-                <a:ea typeface="Avenir Book" charset="0"/>
-                <a:cs typeface="Avenir Book" charset="0"/>
-              </a:rPr>
-              <a:t>covers</a:t>
-            </a:r>
-            <a:r>
-              <a:rPr lang="fr-FR" sz="2000" dirty="0" smtClean="0">
-                <a:latin typeface="Avenir Book" charset="0"/>
-                <a:ea typeface="Avenir Book" charset="0"/>
-                <a:cs typeface="Avenir Book" charset="0"/>
-              </a:rPr>
-              <a:t> of </a:t>
-            </a:r>
-            <a:r>
-              <a:rPr lang="fr-FR" sz="2000" dirty="0" err="1" smtClean="0">
-                <a:latin typeface="Avenir Book" charset="0"/>
-                <a:ea typeface="Avenir Book" charset="0"/>
-                <a:cs typeface="Avenir Book" charset="0"/>
-              </a:rPr>
-              <a:t>originals</a:t>
-            </a:r>
-            <a:r>
-              <a:rPr lang="fr-FR" sz="2000" dirty="0" smtClean="0">
-                <a:latin typeface="Avenir Book" charset="0"/>
-                <a:ea typeface="Avenir Book" charset="0"/>
-                <a:cs typeface="Avenir Book" charset="0"/>
-              </a:rPr>
-              <a:t> </a:t>
-            </a:r>
-            <a:r>
-              <a:rPr lang="fr-FR" sz="2000" dirty="0" err="1" smtClean="0">
-                <a:latin typeface="Avenir Book" charset="0"/>
-                <a:ea typeface="Avenir Book" charset="0"/>
-                <a:cs typeface="Avenir Book" charset="0"/>
-              </a:rPr>
-              <a:t>recorded</a:t>
-            </a:r>
-            <a:r>
-              <a:rPr lang="fr-FR" sz="2000" dirty="0" smtClean="0">
-                <a:latin typeface="Avenir Book" charset="0"/>
-                <a:ea typeface="Avenir Book" charset="0"/>
-                <a:cs typeface="Avenir Book" charset="0"/>
-              </a:rPr>
-              <a:t> in </a:t>
-            </a:r>
-            <a:r>
-              <a:rPr lang="fr-FR" sz="2000" dirty="0" err="1" smtClean="0">
-                <a:latin typeface="Avenir Book" charset="0"/>
-                <a:ea typeface="Avenir Book" charset="0"/>
-                <a:cs typeface="Avenir Book" charset="0"/>
-              </a:rPr>
-              <a:t>that</a:t>
-            </a:r>
-            <a:r>
-              <a:rPr lang="fr-FR" sz="2000" dirty="0" smtClean="0">
-                <a:latin typeface="Avenir Book" charset="0"/>
-                <a:ea typeface="Avenir Book" charset="0"/>
-                <a:cs typeface="Avenir Book" charset="0"/>
-              </a:rPr>
-              <a:t> </a:t>
-            </a:r>
-            <a:r>
-              <a:rPr lang="fr-FR" sz="2000" dirty="0" err="1" smtClean="0">
-                <a:latin typeface="Avenir Book" charset="0"/>
-                <a:ea typeface="Avenir Book" charset="0"/>
-                <a:cs typeface="Avenir Book" charset="0"/>
-              </a:rPr>
-              <a:t>year</a:t>
-            </a:r>
-            <a:endParaRPr lang="fr-FR" sz="2000" dirty="0">
-              <a:latin typeface="Avenir Book" charset="0"/>
-              <a:ea typeface="Avenir Book" charset="0"/>
-              <a:cs typeface="Avenir Book" charset="0"/>
-            </a:endParaRPr>
-          </a:p>
-        </p:txBody>
-      </p:sp>
-      <p:sp>
-        <p:nvSpPr>
-          <p:cNvPr id="142" name="ZoneTexte 141"/>
-          <p:cNvSpPr txBox="1"/>
-          <p:nvPr/>
-        </p:nvSpPr>
-        <p:spPr>
-          <a:xfrm>
-            <a:off x="11514512" y="14369830"/>
-            <a:ext cx="16703130" cy="523220"/>
-          </a:xfrm>
-          <a:prstGeom prst="rect">
-            <a:avLst/>
-          </a:prstGeom>
-          <a:noFill/>
-        </p:spPr>
-        <p:txBody>
-          <a:bodyPr wrap="square" rtlCol="0">
-            <a:spAutoFit/>
-          </a:bodyPr>
-          <a:lstStyle/>
-          <a:p>
-            <a:pPr algn="ctr"/>
-            <a:r>
-              <a:rPr lang="fr-FR" sz="2800" b="1" dirty="0" smtClean="0">
-                <a:latin typeface="Avenir Book" charset="0"/>
-                <a:ea typeface="Avenir Book" charset="0"/>
-                <a:cs typeface="Avenir Book" charset="0"/>
-              </a:rPr>
-              <a:t>65% </a:t>
-            </a:r>
-            <a:r>
-              <a:rPr lang="fr-FR" sz="2800" b="1" dirty="0">
-                <a:latin typeface="Avenir Book" charset="0"/>
-                <a:ea typeface="Avenir Book" charset="0"/>
-                <a:cs typeface="Avenir Book" charset="0"/>
-              </a:rPr>
-              <a:t>of </a:t>
-            </a:r>
-            <a:r>
-              <a:rPr lang="fr-FR" sz="2800" b="1" dirty="0" err="1" smtClean="0">
-                <a:latin typeface="Avenir Book" charset="0"/>
-                <a:ea typeface="Avenir Book" charset="0"/>
-                <a:cs typeface="Avenir Book" charset="0"/>
-              </a:rPr>
-              <a:t>covers</a:t>
-            </a:r>
-            <a:r>
-              <a:rPr lang="fr-FR" sz="2800" b="1" dirty="0" smtClean="0">
-                <a:latin typeface="Avenir Book" charset="0"/>
-                <a:ea typeface="Avenir Book" charset="0"/>
-                <a:cs typeface="Avenir Book" charset="0"/>
-              </a:rPr>
-              <a:t> are </a:t>
-            </a:r>
-            <a:r>
-              <a:rPr lang="fr-FR" sz="2800" b="1" dirty="0" err="1" smtClean="0">
-                <a:latin typeface="Avenir Book" charset="0"/>
-                <a:ea typeface="Avenir Book" charset="0"/>
-                <a:cs typeface="Avenir Book" charset="0"/>
-              </a:rPr>
-              <a:t>recorded</a:t>
-            </a:r>
-            <a:r>
-              <a:rPr lang="fr-FR" sz="2800" b="1" dirty="0" smtClean="0">
-                <a:latin typeface="Avenir Book" charset="0"/>
-                <a:ea typeface="Avenir Book" charset="0"/>
-                <a:cs typeface="Avenir Book" charset="0"/>
-              </a:rPr>
-              <a:t> in </a:t>
-            </a:r>
-            <a:r>
-              <a:rPr lang="fr-FR" sz="2800" b="1" dirty="0">
-                <a:latin typeface="Avenir Book" charset="0"/>
-                <a:ea typeface="Avenir Book" charset="0"/>
-                <a:cs typeface="Avenir Book" charset="0"/>
-              </a:rPr>
-              <a:t>a </a:t>
-            </a:r>
-            <a:r>
-              <a:rPr lang="fr-FR" sz="2800" b="1" dirty="0" err="1">
-                <a:latin typeface="Avenir Book" charset="0"/>
-                <a:ea typeface="Avenir Book" charset="0"/>
-                <a:cs typeface="Avenir Book" charset="0"/>
-              </a:rPr>
-              <a:t>different</a:t>
-            </a:r>
-            <a:r>
-              <a:rPr lang="fr-FR" sz="2800" b="1" dirty="0">
-                <a:latin typeface="Avenir Book" charset="0"/>
-                <a:ea typeface="Avenir Book" charset="0"/>
-                <a:cs typeface="Avenir Book" charset="0"/>
-              </a:rPr>
-              <a:t> </a:t>
-            </a:r>
-            <a:r>
-              <a:rPr lang="fr-FR" sz="2800" b="1" dirty="0" smtClean="0">
-                <a:latin typeface="Avenir Book" charset="0"/>
-                <a:ea typeface="Avenir Book" charset="0"/>
-                <a:cs typeface="Avenir Book" charset="0"/>
-              </a:rPr>
-              <a:t>country </a:t>
-            </a:r>
-            <a:r>
-              <a:rPr lang="fr-FR" sz="2800" b="1" dirty="0" err="1" smtClean="0">
-                <a:latin typeface="Avenir Book" charset="0"/>
-                <a:ea typeface="Avenir Book" charset="0"/>
-                <a:cs typeface="Avenir Book" charset="0"/>
-              </a:rPr>
-              <a:t>from</a:t>
-            </a:r>
-            <a:r>
-              <a:rPr lang="fr-FR" sz="2800" b="1" dirty="0" smtClean="0">
-                <a:latin typeface="Avenir Book" charset="0"/>
-                <a:ea typeface="Avenir Book" charset="0"/>
-                <a:cs typeface="Avenir Book" charset="0"/>
-              </a:rPr>
-              <a:t> the </a:t>
-            </a:r>
-            <a:r>
-              <a:rPr lang="fr-FR" sz="2800" b="1" dirty="0">
-                <a:latin typeface="Avenir Book" charset="0"/>
-                <a:ea typeface="Avenir Book" charset="0"/>
-                <a:cs typeface="Avenir Book" charset="0"/>
-              </a:rPr>
-              <a:t>original </a:t>
-            </a:r>
-            <a:r>
-              <a:rPr lang="fr-FR" sz="2800" b="1" dirty="0" smtClean="0">
-                <a:latin typeface="Avenir Book" charset="0"/>
-                <a:ea typeface="Avenir Book" charset="0"/>
-                <a:cs typeface="Avenir Book" charset="0"/>
-              </a:rPr>
-              <a:t>one</a:t>
-            </a:r>
-            <a:endParaRPr lang="fr-FR" sz="2800" b="1" dirty="0">
-              <a:latin typeface="Avenir Book" charset="0"/>
-              <a:ea typeface="Avenir Book" charset="0"/>
-              <a:cs typeface="Avenir Book" charset="0"/>
-            </a:endParaRPr>
-          </a:p>
-        </p:txBody>
-      </p:sp>
-      <p:sp>
-        <p:nvSpPr>
-          <p:cNvPr id="52" name="ZoneTexte 51"/>
-          <p:cNvSpPr txBox="1"/>
-          <p:nvPr/>
-        </p:nvSpPr>
-        <p:spPr>
-          <a:xfrm>
-            <a:off x="2213188" y="10447918"/>
-            <a:ext cx="7561945" cy="4401205"/>
-          </a:xfrm>
-          <a:prstGeom prst="rect">
-            <a:avLst/>
-          </a:prstGeom>
-          <a:noFill/>
-        </p:spPr>
-        <p:txBody>
-          <a:bodyPr wrap="square" rtlCol="0">
-            <a:spAutoFit/>
-          </a:bodyPr>
-          <a:lstStyle/>
-          <a:p>
-            <a:pPr marL="285750" indent="-285750">
-              <a:buFont typeface="Arial" charset="0"/>
-              <a:buChar char="•"/>
-            </a:pPr>
-            <a:r>
-              <a:rPr lang="fr-FR" sz="4000" dirty="0" smtClean="0">
-                <a:latin typeface="Avenir Book" charset="0"/>
-                <a:ea typeface="Avenir Book" charset="0"/>
-                <a:cs typeface="Avenir Book" charset="0"/>
-              </a:rPr>
-              <a:t>17541 </a:t>
-            </a:r>
-            <a:r>
-              <a:rPr lang="fr-FR" sz="4000" dirty="0" err="1" smtClean="0">
-                <a:latin typeface="Avenir Book" charset="0"/>
-                <a:ea typeface="Avenir Book" charset="0"/>
-                <a:cs typeface="Avenir Book" charset="0"/>
-              </a:rPr>
-              <a:t>songs</a:t>
-            </a:r>
-            <a:endParaRPr lang="fr-FR" sz="4000" dirty="0" smtClean="0">
-              <a:latin typeface="Avenir Book" charset="0"/>
-              <a:ea typeface="Avenir Book" charset="0"/>
-              <a:cs typeface="Avenir Book" charset="0"/>
-            </a:endParaRPr>
-          </a:p>
-          <a:p>
-            <a:pPr marL="285750" indent="-285750">
-              <a:buFont typeface="Arial" charset="0"/>
-              <a:buChar char="•"/>
-            </a:pPr>
-            <a:r>
-              <a:rPr lang="is-IS" sz="4000" dirty="0" smtClean="0">
-                <a:latin typeface="Avenir Book" charset="0"/>
-                <a:ea typeface="Avenir Book" charset="0"/>
-                <a:cs typeface="Avenir Book" charset="0"/>
-              </a:rPr>
-              <a:t>5420 artists</a:t>
-            </a:r>
-          </a:p>
-          <a:p>
-            <a:pPr marL="285750" indent="-285750">
-              <a:buFont typeface="Arial" charset="0"/>
-              <a:buChar char="•"/>
-            </a:pPr>
-            <a:r>
-              <a:rPr lang="is-IS" sz="4000" dirty="0" smtClean="0">
-                <a:latin typeface="Avenir Book" charset="0"/>
-                <a:ea typeface="Avenir Book" charset="0"/>
-                <a:cs typeface="Avenir Book" charset="0"/>
-              </a:rPr>
-              <a:t>5659 cliques</a:t>
-            </a:r>
-          </a:p>
-          <a:p>
-            <a:pPr marL="285750" indent="-285750">
-              <a:buFont typeface="Arial" charset="0"/>
-              <a:buChar char="•"/>
-            </a:pPr>
-            <a:r>
-              <a:rPr lang="is-IS" sz="4000" dirty="0" smtClean="0">
-                <a:latin typeface="Avenir Book" charset="0"/>
-                <a:ea typeface="Avenir Book" charset="0"/>
-                <a:cs typeface="Avenir Book" charset="0"/>
-              </a:rPr>
-              <a:t>From 1911 to 2015</a:t>
-            </a:r>
-          </a:p>
-          <a:p>
-            <a:pPr marL="285750" indent="-285750">
-              <a:buFont typeface="Arial" charset="0"/>
-              <a:buChar char="•"/>
-            </a:pPr>
-            <a:r>
-              <a:rPr lang="fr-FR" sz="4000" dirty="0" smtClean="0">
-                <a:latin typeface="Avenir Book" charset="0"/>
-                <a:ea typeface="Avenir Book" charset="0"/>
-                <a:cs typeface="Avenir Book" charset="0"/>
-              </a:rPr>
-              <a:t>52 countries</a:t>
-            </a:r>
-          </a:p>
-          <a:p>
-            <a:pPr marL="285750" indent="-285750">
-              <a:buFont typeface="Arial" charset="0"/>
-              <a:buChar char="•"/>
-            </a:pPr>
-            <a:r>
-              <a:rPr lang="fr-FR" sz="4000" dirty="0" smtClean="0">
-                <a:latin typeface="Avenir Book" charset="0"/>
-                <a:ea typeface="Avenir Book" charset="0"/>
-                <a:cs typeface="Avenir Book" charset="0"/>
-              </a:rPr>
-              <a:t>21 </a:t>
-            </a:r>
-            <a:r>
-              <a:rPr lang="fr-FR" sz="4000" dirty="0" err="1" smtClean="0">
-                <a:latin typeface="Avenir Book" charset="0"/>
-                <a:ea typeface="Avenir Book" charset="0"/>
-                <a:cs typeface="Avenir Book" charset="0"/>
-              </a:rPr>
-              <a:t>languages</a:t>
-            </a:r>
-            <a:endParaRPr lang="fr-FR" sz="4000" dirty="0" smtClean="0">
-              <a:latin typeface="Avenir Book" charset="0"/>
-              <a:ea typeface="Avenir Book" charset="0"/>
-              <a:cs typeface="Avenir Book" charset="0"/>
-            </a:endParaRPr>
-          </a:p>
-          <a:p>
-            <a:pPr marL="285750" indent="-285750">
-              <a:buFont typeface="Arial" charset="0"/>
-              <a:buChar char="•"/>
-            </a:pPr>
-            <a:r>
-              <a:rPr lang="fr-FR" sz="4000" dirty="0" smtClean="0">
-                <a:latin typeface="Avenir Book" charset="0"/>
-                <a:ea typeface="Avenir Book" charset="0"/>
-                <a:cs typeface="Avenir Book" charset="0"/>
-              </a:rPr>
-              <a:t>33 genres</a:t>
-            </a:r>
-          </a:p>
-        </p:txBody>
-      </p:sp>
-      <p:sp>
-        <p:nvSpPr>
-          <p:cNvPr id="53" name="ZoneTexte 52"/>
-          <p:cNvSpPr txBox="1"/>
-          <p:nvPr/>
-        </p:nvSpPr>
-        <p:spPr>
-          <a:xfrm>
-            <a:off x="1332506" y="16503533"/>
-            <a:ext cx="8895769" cy="3970318"/>
-          </a:xfrm>
-          <a:prstGeom prst="rect">
-            <a:avLst/>
-          </a:prstGeom>
-          <a:noFill/>
-        </p:spPr>
-        <p:txBody>
-          <a:bodyPr wrap="none" rtlCol="0">
-            <a:spAutoFit/>
-          </a:bodyPr>
-          <a:lstStyle/>
-          <a:p>
-            <a:endParaRPr lang="fr-FR" dirty="0">
-              <a:latin typeface="Avenir Book" charset="0"/>
-              <a:ea typeface="Avenir Book" charset="0"/>
-              <a:cs typeface="Avenir Book" charset="0"/>
-            </a:endParaRPr>
-          </a:p>
-          <a:p>
-            <a:pPr algn="ctr"/>
-            <a:r>
-              <a:rPr lang="fr-FR" b="1" dirty="0">
-                <a:latin typeface="Avenir Book" charset="0"/>
-                <a:ea typeface="Avenir Book" charset="0"/>
-                <a:cs typeface="Avenir Book" charset="0"/>
-              </a:rPr>
-              <a:t>TOP 10 </a:t>
-            </a:r>
-            <a:r>
-              <a:rPr lang="fr-FR" b="1" dirty="0" smtClean="0">
-                <a:latin typeface="Avenir Book" charset="0"/>
-                <a:ea typeface="Avenir Book" charset="0"/>
-                <a:cs typeface="Avenir Book" charset="0"/>
-              </a:rPr>
-              <a:t>SONGS</a:t>
-            </a:r>
-          </a:p>
-          <a:p>
-            <a:pPr algn="ctr"/>
-            <a:endParaRPr lang="fr-FR" dirty="0" smtClean="0">
-              <a:latin typeface="Avenir Book" charset="0"/>
-              <a:ea typeface="Avenir Book" charset="0"/>
-              <a:cs typeface="Avenir Book" charset="0"/>
-            </a:endParaRPr>
-          </a:p>
-          <a:p>
-            <a:pPr marL="342900" indent="-342900">
-              <a:buAutoNum type="arabicPeriod"/>
-            </a:pPr>
-            <a:r>
-              <a:rPr lang="fr-FR" dirty="0" err="1" smtClean="0">
-                <a:latin typeface="Avenir Book" charset="0"/>
-                <a:ea typeface="Avenir Book" charset="0"/>
-                <a:cs typeface="Avenir Book" charset="0"/>
-              </a:rPr>
-              <a:t>Silent</a:t>
-            </a:r>
-            <a:r>
-              <a:rPr lang="fr-FR" dirty="0" smtClean="0">
-                <a:latin typeface="Avenir Book" charset="0"/>
-                <a:ea typeface="Avenir Book" charset="0"/>
-                <a:cs typeface="Avenir Book" charset="0"/>
-              </a:rPr>
-              <a:t> </a:t>
-            </a:r>
-            <a:r>
-              <a:rPr lang="fr-FR" dirty="0">
-                <a:latin typeface="Avenir Book" charset="0"/>
-                <a:ea typeface="Avenir Book" charset="0"/>
-                <a:cs typeface="Avenir Book" charset="0"/>
-              </a:rPr>
-              <a:t>Night, 1961, </a:t>
-            </a:r>
-            <a:r>
-              <a:rPr lang="fr-FR" dirty="0" err="1">
-                <a:latin typeface="Avenir Book" charset="0"/>
-                <a:ea typeface="Avenir Book" charset="0"/>
-                <a:cs typeface="Avenir Book" charset="0"/>
-              </a:rPr>
-              <a:t>Chet</a:t>
-            </a:r>
-            <a:r>
-              <a:rPr lang="fr-FR" dirty="0">
-                <a:latin typeface="Avenir Book" charset="0"/>
-                <a:ea typeface="Avenir Book" charset="0"/>
-                <a:cs typeface="Avenir Book" charset="0"/>
-              </a:rPr>
-              <a:t> Atkins, 42 </a:t>
-            </a:r>
-            <a:endParaRPr lang="fr-FR" dirty="0" smtClean="0">
-              <a:latin typeface="Avenir Book" charset="0"/>
-              <a:ea typeface="Avenir Book" charset="0"/>
-              <a:cs typeface="Avenir Book" charset="0"/>
-            </a:endParaRPr>
-          </a:p>
-          <a:p>
-            <a:pPr marL="342900" indent="-342900">
-              <a:buAutoNum type="arabicPeriod"/>
-            </a:pPr>
-            <a:r>
-              <a:rPr lang="fr-FR" dirty="0" smtClean="0">
-                <a:latin typeface="Avenir Book" charset="0"/>
-                <a:ea typeface="Avenir Book" charset="0"/>
-                <a:cs typeface="Avenir Book" charset="0"/>
-              </a:rPr>
-              <a:t>White </a:t>
-            </a:r>
-            <a:r>
-              <a:rPr lang="fr-FR" dirty="0">
-                <a:latin typeface="Avenir Book" charset="0"/>
-                <a:ea typeface="Avenir Book" charset="0"/>
-                <a:cs typeface="Avenir Book" charset="0"/>
-              </a:rPr>
-              <a:t>Christmas, 1942, Bing Crosby, 36 </a:t>
-            </a:r>
-          </a:p>
-          <a:p>
-            <a:pPr marL="342900" indent="-342900">
-              <a:buAutoNum type="arabicPeriod"/>
-            </a:pPr>
-            <a:r>
-              <a:rPr lang="fr-FR" dirty="0" err="1" smtClean="0">
-                <a:latin typeface="Avenir Book" charset="0"/>
-                <a:ea typeface="Avenir Book" charset="0"/>
-                <a:cs typeface="Avenir Book" charset="0"/>
-              </a:rPr>
-              <a:t>Unchained</a:t>
-            </a:r>
-            <a:r>
-              <a:rPr lang="fr-FR" dirty="0" smtClean="0">
-                <a:latin typeface="Avenir Book" charset="0"/>
-                <a:ea typeface="Avenir Book" charset="0"/>
-                <a:cs typeface="Avenir Book" charset="0"/>
-              </a:rPr>
-              <a:t> </a:t>
-            </a:r>
-            <a:r>
-              <a:rPr lang="fr-FR" dirty="0">
-                <a:latin typeface="Avenir Book" charset="0"/>
-                <a:ea typeface="Avenir Book" charset="0"/>
-                <a:cs typeface="Avenir Book" charset="0"/>
-              </a:rPr>
-              <a:t>Melody, 1955, Les Baxter, 25 </a:t>
-            </a:r>
-          </a:p>
-          <a:p>
-            <a:pPr marL="342900" indent="-342900">
-              <a:buAutoNum type="arabicPeriod"/>
-            </a:pPr>
-            <a:r>
-              <a:rPr lang="fr-FR" dirty="0" smtClean="0">
-                <a:latin typeface="Avenir Book" charset="0"/>
-                <a:ea typeface="Avenir Book" charset="0"/>
-                <a:cs typeface="Avenir Book" charset="0"/>
-              </a:rPr>
-              <a:t>O </a:t>
-            </a:r>
-            <a:r>
-              <a:rPr lang="fr-FR" dirty="0">
-                <a:latin typeface="Avenir Book" charset="0"/>
-                <a:ea typeface="Avenir Book" charset="0"/>
-                <a:cs typeface="Avenir Book" charset="0"/>
-              </a:rPr>
-              <a:t>Holy Night, 1958, Tennessee Ernie Ford, 24 </a:t>
-            </a:r>
-          </a:p>
-          <a:p>
-            <a:pPr marL="342900" indent="-342900">
-              <a:buAutoNum type="arabicPeriod"/>
-            </a:pPr>
-            <a:r>
-              <a:rPr lang="fr-FR" dirty="0" smtClean="0">
-                <a:latin typeface="Avenir Book" charset="0"/>
-                <a:ea typeface="Avenir Book" charset="0"/>
-                <a:cs typeface="Avenir Book" charset="0"/>
-              </a:rPr>
-              <a:t>Georgia </a:t>
-            </a:r>
-            <a:r>
-              <a:rPr lang="fr-FR" dirty="0">
-                <a:latin typeface="Avenir Book" charset="0"/>
-                <a:ea typeface="Avenir Book" charset="0"/>
-                <a:cs typeface="Avenir Book" charset="0"/>
-              </a:rPr>
-              <a:t>On </a:t>
-            </a:r>
-            <a:r>
-              <a:rPr lang="fr-FR" dirty="0" err="1">
-                <a:latin typeface="Avenir Book" charset="0"/>
-                <a:ea typeface="Avenir Book" charset="0"/>
-                <a:cs typeface="Avenir Book" charset="0"/>
-              </a:rPr>
-              <a:t>My</a:t>
-            </a:r>
-            <a:r>
-              <a:rPr lang="fr-FR" dirty="0">
-                <a:latin typeface="Avenir Book" charset="0"/>
-                <a:ea typeface="Avenir Book" charset="0"/>
-                <a:cs typeface="Avenir Book" charset="0"/>
-              </a:rPr>
-              <a:t> </a:t>
-            </a:r>
-            <a:r>
-              <a:rPr lang="fr-FR" dirty="0" err="1">
-                <a:latin typeface="Avenir Book" charset="0"/>
-                <a:ea typeface="Avenir Book" charset="0"/>
-                <a:cs typeface="Avenir Book" charset="0"/>
-              </a:rPr>
-              <a:t>Mind</a:t>
-            </a:r>
-            <a:r>
-              <a:rPr lang="fr-FR" dirty="0">
-                <a:latin typeface="Avenir Book" charset="0"/>
-                <a:ea typeface="Avenir Book" charset="0"/>
-                <a:cs typeface="Avenir Book" charset="0"/>
-              </a:rPr>
-              <a:t>, 1930, </a:t>
-            </a:r>
-            <a:r>
-              <a:rPr lang="fr-FR" dirty="0" err="1">
-                <a:latin typeface="Avenir Book" charset="0"/>
-                <a:ea typeface="Avenir Book" charset="0"/>
-                <a:cs typeface="Avenir Book" charset="0"/>
-              </a:rPr>
-              <a:t>Hoagy</a:t>
-            </a:r>
-            <a:r>
-              <a:rPr lang="fr-FR" dirty="0">
-                <a:latin typeface="Avenir Book" charset="0"/>
-                <a:ea typeface="Avenir Book" charset="0"/>
-                <a:cs typeface="Avenir Book" charset="0"/>
-              </a:rPr>
-              <a:t> Carmichael, 22 </a:t>
-            </a:r>
-          </a:p>
-          <a:p>
-            <a:pPr marL="342900" indent="-342900">
-              <a:buAutoNum type="arabicPeriod"/>
-            </a:pPr>
-            <a:r>
-              <a:rPr lang="fr-FR" dirty="0" err="1" smtClean="0">
-                <a:latin typeface="Avenir Book" charset="0"/>
-                <a:ea typeface="Avenir Book" charset="0"/>
-                <a:cs typeface="Avenir Book" charset="0"/>
-              </a:rPr>
-              <a:t>I'll</a:t>
-            </a:r>
-            <a:r>
-              <a:rPr lang="fr-FR" dirty="0" smtClean="0">
-                <a:latin typeface="Avenir Book" charset="0"/>
-                <a:ea typeface="Avenir Book" charset="0"/>
-                <a:cs typeface="Avenir Book" charset="0"/>
-              </a:rPr>
-              <a:t> </a:t>
-            </a:r>
-            <a:r>
-              <a:rPr lang="fr-FR" dirty="0">
-                <a:latin typeface="Avenir Book" charset="0"/>
-                <a:ea typeface="Avenir Book" charset="0"/>
-                <a:cs typeface="Avenir Book" charset="0"/>
-              </a:rPr>
-              <a:t>Be Home For Christmas, 1943, Bing Crosby, 21 </a:t>
-            </a:r>
-          </a:p>
-          <a:p>
-            <a:pPr marL="342900" indent="-342900">
-              <a:buAutoNum type="arabicPeriod"/>
-            </a:pPr>
-            <a:r>
-              <a:rPr lang="fr-FR" dirty="0" smtClean="0">
-                <a:latin typeface="Avenir Book" charset="0"/>
-                <a:ea typeface="Avenir Book" charset="0"/>
-                <a:cs typeface="Avenir Book" charset="0"/>
-              </a:rPr>
-              <a:t>The </a:t>
-            </a:r>
-            <a:r>
-              <a:rPr lang="fr-FR" dirty="0">
-                <a:latin typeface="Avenir Book" charset="0"/>
-                <a:ea typeface="Avenir Book" charset="0"/>
-                <a:cs typeface="Avenir Book" charset="0"/>
-              </a:rPr>
-              <a:t>Christmas Song, 1946, Nat King Cole, 20 </a:t>
-            </a:r>
-          </a:p>
-          <a:p>
-            <a:pPr marL="342900" indent="-342900">
-              <a:buAutoNum type="arabicPeriod"/>
-            </a:pPr>
-            <a:r>
-              <a:rPr lang="fr-FR" dirty="0" smtClean="0">
-                <a:latin typeface="Avenir Book" charset="0"/>
-                <a:ea typeface="Avenir Book" charset="0"/>
-                <a:cs typeface="Avenir Book" charset="0"/>
-              </a:rPr>
-              <a:t>Have </a:t>
-            </a:r>
-            <a:r>
-              <a:rPr lang="fr-FR" dirty="0" err="1">
-                <a:latin typeface="Avenir Book" charset="0"/>
-                <a:ea typeface="Avenir Book" charset="0"/>
-                <a:cs typeface="Avenir Book" charset="0"/>
-              </a:rPr>
-              <a:t>Yourself</a:t>
-            </a:r>
-            <a:r>
-              <a:rPr lang="fr-FR" dirty="0">
-                <a:latin typeface="Avenir Book" charset="0"/>
-                <a:ea typeface="Avenir Book" charset="0"/>
-                <a:cs typeface="Avenir Book" charset="0"/>
-              </a:rPr>
-              <a:t> A </a:t>
-            </a:r>
-            <a:r>
-              <a:rPr lang="fr-FR" dirty="0" err="1">
-                <a:latin typeface="Avenir Book" charset="0"/>
-                <a:ea typeface="Avenir Book" charset="0"/>
-                <a:cs typeface="Avenir Book" charset="0"/>
-              </a:rPr>
-              <a:t>Merry</a:t>
-            </a:r>
-            <a:r>
-              <a:rPr lang="fr-FR" dirty="0">
-                <a:latin typeface="Avenir Book" charset="0"/>
-                <a:ea typeface="Avenir Book" charset="0"/>
-                <a:cs typeface="Avenir Book" charset="0"/>
-              </a:rPr>
-              <a:t> </a:t>
-            </a:r>
-            <a:r>
-              <a:rPr lang="fr-FR" dirty="0" err="1">
-                <a:latin typeface="Avenir Book" charset="0"/>
-                <a:ea typeface="Avenir Book" charset="0"/>
-                <a:cs typeface="Avenir Book" charset="0"/>
-              </a:rPr>
-              <a:t>Little</a:t>
-            </a:r>
-            <a:r>
-              <a:rPr lang="fr-FR" dirty="0">
-                <a:latin typeface="Avenir Book" charset="0"/>
-                <a:ea typeface="Avenir Book" charset="0"/>
-                <a:cs typeface="Avenir Book" charset="0"/>
-              </a:rPr>
-              <a:t> Christmas, 1967, Barbra </a:t>
-            </a:r>
-            <a:r>
-              <a:rPr lang="fr-FR" dirty="0" err="1">
-                <a:latin typeface="Avenir Book" charset="0"/>
-                <a:ea typeface="Avenir Book" charset="0"/>
-                <a:cs typeface="Avenir Book" charset="0"/>
-              </a:rPr>
-              <a:t>Streisand;Yves</a:t>
-            </a:r>
-            <a:r>
-              <a:rPr lang="fr-FR" dirty="0">
-                <a:latin typeface="Avenir Book" charset="0"/>
-                <a:ea typeface="Avenir Book" charset="0"/>
-                <a:cs typeface="Avenir Book" charset="0"/>
-              </a:rPr>
-              <a:t> Montand, 20 </a:t>
-            </a:r>
-          </a:p>
-          <a:p>
-            <a:pPr marL="342900" indent="-342900">
-              <a:buAutoNum type="arabicPeriod"/>
-            </a:pPr>
-            <a:r>
-              <a:rPr lang="fr-FR" dirty="0" smtClean="0">
-                <a:latin typeface="Avenir Book" charset="0"/>
-                <a:ea typeface="Avenir Book" charset="0"/>
-                <a:cs typeface="Avenir Book" charset="0"/>
-              </a:rPr>
-              <a:t>Over </a:t>
-            </a:r>
-            <a:r>
-              <a:rPr lang="fr-FR" dirty="0">
-                <a:latin typeface="Avenir Book" charset="0"/>
-                <a:ea typeface="Avenir Book" charset="0"/>
-                <a:cs typeface="Avenir Book" charset="0"/>
-              </a:rPr>
-              <a:t>The Rainbow, 1939, Judy Garland, 18 </a:t>
-            </a:r>
-          </a:p>
-          <a:p>
-            <a:pPr marL="342900" indent="-342900">
-              <a:buAutoNum type="arabicPeriod"/>
-            </a:pPr>
-            <a:r>
-              <a:rPr lang="fr-FR" dirty="0" smtClean="0">
-                <a:latin typeface="Avenir Book" charset="0"/>
-                <a:ea typeface="Avenir Book" charset="0"/>
-                <a:cs typeface="Avenir Book" charset="0"/>
-              </a:rPr>
-              <a:t>The </a:t>
-            </a:r>
-            <a:r>
-              <a:rPr lang="fr-FR" dirty="0" err="1">
-                <a:latin typeface="Avenir Book" charset="0"/>
-                <a:ea typeface="Avenir Book" charset="0"/>
-                <a:cs typeface="Avenir Book" charset="0"/>
-              </a:rPr>
-              <a:t>Way</a:t>
-            </a:r>
-            <a:r>
-              <a:rPr lang="fr-FR" dirty="0">
-                <a:latin typeface="Avenir Book" charset="0"/>
-                <a:ea typeface="Avenir Book" charset="0"/>
-                <a:cs typeface="Avenir Book" charset="0"/>
-              </a:rPr>
-              <a:t> You Look </a:t>
-            </a:r>
-            <a:r>
-              <a:rPr lang="fr-FR" dirty="0" err="1">
-                <a:latin typeface="Avenir Book" charset="0"/>
-                <a:ea typeface="Avenir Book" charset="0"/>
-                <a:cs typeface="Avenir Book" charset="0"/>
-              </a:rPr>
-              <a:t>Tonight</a:t>
-            </a:r>
-            <a:r>
-              <a:rPr lang="fr-FR" dirty="0">
-                <a:latin typeface="Avenir Book" charset="0"/>
-                <a:ea typeface="Avenir Book" charset="0"/>
-                <a:cs typeface="Avenir Book" charset="0"/>
-              </a:rPr>
-              <a:t>, 1936, Fred Astaire and Ginger Rogers, 17 </a:t>
-            </a:r>
-          </a:p>
-          <a:p>
-            <a:endParaRPr lang="fr-FR" dirty="0">
+              <a:t>The Way You Look Tonight, 1936, Fred Astaire and Ginger Rogers, 17 </a:t>
+            </a:r>
+          </a:p>
+          <a:p>
+            <a:endParaRPr lang="en-US" dirty="0">
               <a:latin typeface="Avenir Book" charset="0"/>
               <a:ea typeface="Avenir Book" charset="0"/>
               <a:cs typeface="Avenir Book" charset="0"/>

</xml_diff>